<commit_message>
Introduccion hecha de la presentacion
</commit_message>
<xml_diff>
--- a/Docs/presentacion.pptx
+++ b/Docs/presentacion.pptx
@@ -13,6 +13,11 @@
     <p:sldId id="258" r:id="rId10"/>
     <p:sldId id="259" r:id="rId11"/>
     <p:sldId id="260" r:id="rId12"/>
+    <p:sldId id="261" r:id="rId13"/>
+    <p:sldId id="262" r:id="rId14"/>
+    <p:sldId id="263" r:id="rId15"/>
+    <p:sldId id="264" r:id="rId16"/>
+    <p:sldId id="265" r:id="rId17"/>
   </p:sldIdLst>
   <p:sldSz cx="9144000" cy="6858000"/>
   <p:notesSz cx="6858000" cy="9144000"/>
@@ -22,98 +27,98 @@
         <a:solidFill>
           <a:srgbClr val="333333"/>
         </a:solidFill>
-        <a:latin typeface="Verdana"/>
-        <a:ea typeface="Verdana"/>
-        <a:cs typeface="Verdana"/>
-        <a:sym typeface="Verdana"/>
+        <a:latin typeface="+mj-lt"/>
+        <a:ea typeface="+mj-ea"/>
+        <a:cs typeface="+mj-cs"/>
+        <a:sym typeface="Avenir Roman"/>
       </a:defRPr>
     </a:lvl1pPr>
-    <a:lvl2pPr indent="457200">
+    <a:lvl2pPr>
       <a:defRPr sz="2400">
         <a:solidFill>
           <a:srgbClr val="333333"/>
         </a:solidFill>
-        <a:latin typeface="Verdana"/>
-        <a:ea typeface="Verdana"/>
-        <a:cs typeface="Verdana"/>
-        <a:sym typeface="Verdana"/>
+        <a:latin typeface="+mj-lt"/>
+        <a:ea typeface="+mj-ea"/>
+        <a:cs typeface="+mj-cs"/>
+        <a:sym typeface="Avenir Roman"/>
       </a:defRPr>
     </a:lvl2pPr>
-    <a:lvl3pPr indent="914400">
+    <a:lvl3pPr>
       <a:defRPr sz="2400">
         <a:solidFill>
           <a:srgbClr val="333333"/>
         </a:solidFill>
-        <a:latin typeface="Verdana"/>
-        <a:ea typeface="Verdana"/>
-        <a:cs typeface="Verdana"/>
-        <a:sym typeface="Verdana"/>
+        <a:latin typeface="+mj-lt"/>
+        <a:ea typeface="+mj-ea"/>
+        <a:cs typeface="+mj-cs"/>
+        <a:sym typeface="Avenir Roman"/>
       </a:defRPr>
     </a:lvl3pPr>
-    <a:lvl4pPr indent="1371600">
+    <a:lvl4pPr>
       <a:defRPr sz="2400">
         <a:solidFill>
           <a:srgbClr val="333333"/>
         </a:solidFill>
-        <a:latin typeface="Verdana"/>
-        <a:ea typeface="Verdana"/>
-        <a:cs typeface="Verdana"/>
-        <a:sym typeface="Verdana"/>
+        <a:latin typeface="+mj-lt"/>
+        <a:ea typeface="+mj-ea"/>
+        <a:cs typeface="+mj-cs"/>
+        <a:sym typeface="Avenir Roman"/>
       </a:defRPr>
     </a:lvl4pPr>
-    <a:lvl5pPr indent="1828800">
+    <a:lvl5pPr>
       <a:defRPr sz="2400">
         <a:solidFill>
           <a:srgbClr val="333333"/>
         </a:solidFill>
-        <a:latin typeface="Verdana"/>
-        <a:ea typeface="Verdana"/>
-        <a:cs typeface="Verdana"/>
-        <a:sym typeface="Verdana"/>
+        <a:latin typeface="+mj-lt"/>
+        <a:ea typeface="+mj-ea"/>
+        <a:cs typeface="+mj-cs"/>
+        <a:sym typeface="Avenir Roman"/>
       </a:defRPr>
     </a:lvl5pPr>
-    <a:lvl6pPr indent="2286000">
+    <a:lvl6pPr>
       <a:defRPr sz="2400">
         <a:solidFill>
           <a:srgbClr val="333333"/>
         </a:solidFill>
-        <a:latin typeface="Verdana"/>
-        <a:ea typeface="Verdana"/>
-        <a:cs typeface="Verdana"/>
-        <a:sym typeface="Verdana"/>
+        <a:latin typeface="+mj-lt"/>
+        <a:ea typeface="+mj-ea"/>
+        <a:cs typeface="+mj-cs"/>
+        <a:sym typeface="Avenir Roman"/>
       </a:defRPr>
     </a:lvl6pPr>
-    <a:lvl7pPr indent="2743200">
+    <a:lvl7pPr>
       <a:defRPr sz="2400">
         <a:solidFill>
           <a:srgbClr val="333333"/>
         </a:solidFill>
-        <a:latin typeface="Verdana"/>
-        <a:ea typeface="Verdana"/>
-        <a:cs typeface="Verdana"/>
-        <a:sym typeface="Verdana"/>
+        <a:latin typeface="+mj-lt"/>
+        <a:ea typeface="+mj-ea"/>
+        <a:cs typeface="+mj-cs"/>
+        <a:sym typeface="Avenir Roman"/>
       </a:defRPr>
     </a:lvl7pPr>
-    <a:lvl8pPr indent="3200400">
+    <a:lvl8pPr>
       <a:defRPr sz="2400">
         <a:solidFill>
           <a:srgbClr val="333333"/>
         </a:solidFill>
-        <a:latin typeface="Verdana"/>
-        <a:ea typeface="Verdana"/>
-        <a:cs typeface="Verdana"/>
-        <a:sym typeface="Verdana"/>
+        <a:latin typeface="+mj-lt"/>
+        <a:ea typeface="+mj-ea"/>
+        <a:cs typeface="+mj-cs"/>
+        <a:sym typeface="Avenir Roman"/>
       </a:defRPr>
     </a:lvl8pPr>
-    <a:lvl9pPr indent="3657600">
+    <a:lvl9pPr>
       <a:defRPr sz="2400">
         <a:solidFill>
           <a:srgbClr val="333333"/>
         </a:solidFill>
-        <a:latin typeface="Verdana"/>
-        <a:ea typeface="Verdana"/>
-        <a:cs typeface="Verdana"/>
-        <a:sym typeface="Verdana"/>
+        <a:latin typeface="+mj-lt"/>
+        <a:ea typeface="+mj-ea"/>
+        <a:cs typeface="+mj-cs"/>
+        <a:sym typeface="Avenir Roman"/>
       </a:defRPr>
     </a:lvl9pPr>
   </p:defaultTextStyle>
@@ -200,9 +205,9 @@
         <a:spcPct val="125000"/>
       </a:lnSpc>
       <a:defRPr sz="2400">
-        <a:latin typeface="+mn-lt"/>
-        <a:ea typeface="+mn-ea"/>
-        <a:cs typeface="+mn-cs"/>
+        <a:latin typeface="+mj-lt"/>
+        <a:ea typeface="+mj-ea"/>
+        <a:cs typeface="+mj-cs"/>
         <a:sym typeface="Avenir Roman"/>
       </a:defRPr>
     </a:lvl1pPr>
@@ -211,9 +216,9 @@
         <a:spcPct val="125000"/>
       </a:lnSpc>
       <a:defRPr sz="2400">
-        <a:latin typeface="+mn-lt"/>
-        <a:ea typeface="+mn-ea"/>
-        <a:cs typeface="+mn-cs"/>
+        <a:latin typeface="+mj-lt"/>
+        <a:ea typeface="+mj-ea"/>
+        <a:cs typeface="+mj-cs"/>
         <a:sym typeface="Avenir Roman"/>
       </a:defRPr>
     </a:lvl2pPr>
@@ -222,9 +227,9 @@
         <a:spcPct val="125000"/>
       </a:lnSpc>
       <a:defRPr sz="2400">
-        <a:latin typeface="+mn-lt"/>
-        <a:ea typeface="+mn-ea"/>
-        <a:cs typeface="+mn-cs"/>
+        <a:latin typeface="+mj-lt"/>
+        <a:ea typeface="+mj-ea"/>
+        <a:cs typeface="+mj-cs"/>
         <a:sym typeface="Avenir Roman"/>
       </a:defRPr>
     </a:lvl3pPr>
@@ -233,9 +238,9 @@
         <a:spcPct val="125000"/>
       </a:lnSpc>
       <a:defRPr sz="2400">
-        <a:latin typeface="+mn-lt"/>
-        <a:ea typeface="+mn-ea"/>
-        <a:cs typeface="+mn-cs"/>
+        <a:latin typeface="+mj-lt"/>
+        <a:ea typeface="+mj-ea"/>
+        <a:cs typeface="+mj-cs"/>
         <a:sym typeface="Avenir Roman"/>
       </a:defRPr>
     </a:lvl4pPr>
@@ -244,9 +249,9 @@
         <a:spcPct val="125000"/>
       </a:lnSpc>
       <a:defRPr sz="2400">
-        <a:latin typeface="+mn-lt"/>
-        <a:ea typeface="+mn-ea"/>
-        <a:cs typeface="+mn-cs"/>
+        <a:latin typeface="+mj-lt"/>
+        <a:ea typeface="+mj-ea"/>
+        <a:cs typeface="+mj-cs"/>
         <a:sym typeface="Avenir Roman"/>
       </a:defRPr>
     </a:lvl5pPr>
@@ -255,9 +260,9 @@
         <a:spcPct val="125000"/>
       </a:lnSpc>
       <a:defRPr sz="2400">
-        <a:latin typeface="+mn-lt"/>
-        <a:ea typeface="+mn-ea"/>
-        <a:cs typeface="+mn-cs"/>
+        <a:latin typeface="+mj-lt"/>
+        <a:ea typeface="+mj-ea"/>
+        <a:cs typeface="+mj-cs"/>
         <a:sym typeface="Avenir Roman"/>
       </a:defRPr>
     </a:lvl6pPr>
@@ -266,9 +271,9 @@
         <a:spcPct val="125000"/>
       </a:lnSpc>
       <a:defRPr sz="2400">
-        <a:latin typeface="+mn-lt"/>
-        <a:ea typeface="+mn-ea"/>
-        <a:cs typeface="+mn-cs"/>
+        <a:latin typeface="+mj-lt"/>
+        <a:ea typeface="+mj-ea"/>
+        <a:cs typeface="+mj-cs"/>
         <a:sym typeface="Avenir Roman"/>
       </a:defRPr>
     </a:lvl7pPr>
@@ -277,9 +282,9 @@
         <a:spcPct val="125000"/>
       </a:lnSpc>
       <a:defRPr sz="2400">
-        <a:latin typeface="+mn-lt"/>
-        <a:ea typeface="+mn-ea"/>
-        <a:cs typeface="+mn-cs"/>
+        <a:latin typeface="+mj-lt"/>
+        <a:ea typeface="+mj-ea"/>
+        <a:cs typeface="+mj-cs"/>
         <a:sym typeface="Avenir Roman"/>
       </a:defRPr>
     </a:lvl8pPr>
@@ -288,9 +293,9 @@
         <a:spcPct val="125000"/>
       </a:lnSpc>
       <a:defRPr sz="2400">
-        <a:latin typeface="+mn-lt"/>
-        <a:ea typeface="+mn-ea"/>
-        <a:cs typeface="+mn-cs"/>
+        <a:latin typeface="+mj-lt"/>
+        <a:ea typeface="+mj-ea"/>
+        <a:cs typeface="+mj-cs"/>
         <a:sym typeface="Avenir Roman"/>
       </a:defRPr>
     </a:lvl9pPr>
@@ -543,7 +548,7 @@
         <p:spPr>
           <a:xfrm>
             <a:off x="1792288" y="4800600"/>
-            <a:ext cx="5486401" cy="566738"/>
+            <a:ext cx="5486402" cy="566738"/>
           </a:xfrm>
           <a:prstGeom prst="rect">
             <a:avLst/>
@@ -591,7 +596,7 @@
         <p:spPr>
           <a:xfrm>
             <a:off x="1792288" y="5367337"/>
-            <a:ext cx="5486401" cy="804863"/>
+            <a:ext cx="5486402" cy="804864"/>
           </a:xfrm>
           <a:prstGeom prst="rect">
             <a:avLst/>
@@ -606,7 +611,7 @@
               </a:spcBef>
               <a:defRPr sz="1400"/>
             </a:lvl1pPr>
-            <a:lvl2pPr marL="0" indent="457200" algn="l">
+            <a:lvl2pPr marL="0" indent="0" algn="l">
               <a:spcBef>
                 <a:spcPts val="300"/>
               </a:spcBef>
@@ -614,7 +619,7 @@
               <a:buNone/>
               <a:defRPr sz="1400"/>
             </a:lvl2pPr>
-            <a:lvl3pPr marL="0" indent="914400" algn="l">
+            <a:lvl3pPr marL="0" indent="0" algn="l">
               <a:spcBef>
                 <a:spcPts val="300"/>
               </a:spcBef>
@@ -622,7 +627,7 @@
               <a:buNone/>
               <a:defRPr sz="1400"/>
             </a:lvl3pPr>
-            <a:lvl4pPr marL="0" indent="1371600" algn="l">
+            <a:lvl4pPr marL="0" indent="0" algn="l">
               <a:spcBef>
                 <a:spcPts val="300"/>
               </a:spcBef>
@@ -630,7 +635,7 @@
               <a:buNone/>
               <a:defRPr sz="1400"/>
             </a:lvl4pPr>
-            <a:lvl5pPr marL="0" indent="1828800" algn="l">
+            <a:lvl5pPr marL="0" indent="0" algn="l">
               <a:spcBef>
                 <a:spcPts val="300"/>
               </a:spcBef>
@@ -1611,7 +1616,7 @@
         <p:spPr>
           <a:xfrm>
             <a:off x="722312" y="2906713"/>
-            <a:ext cx="7772401" cy="1500188"/>
+            <a:ext cx="7772401" cy="1500189"/>
           </a:xfrm>
           <a:prstGeom prst="rect">
             <a:avLst/>
@@ -1626,7 +1631,7 @@
               </a:spcBef>
               <a:defRPr sz="2000"/>
             </a:lvl1pPr>
-            <a:lvl2pPr marL="0" indent="457200" algn="l">
+            <a:lvl2pPr marL="0" indent="0" algn="l">
               <a:spcBef>
                 <a:spcPts val="400"/>
               </a:spcBef>
@@ -1634,7 +1639,7 @@
               <a:buNone/>
               <a:defRPr sz="2000"/>
             </a:lvl2pPr>
-            <a:lvl3pPr marL="0" indent="914400" algn="l">
+            <a:lvl3pPr marL="0" indent="0" algn="l">
               <a:spcBef>
                 <a:spcPts val="400"/>
               </a:spcBef>
@@ -1642,7 +1647,7 @@
               <a:buNone/>
               <a:defRPr sz="2000"/>
             </a:lvl3pPr>
-            <a:lvl4pPr marL="0" indent="1371600" algn="l">
+            <a:lvl4pPr marL="0" indent="0" algn="l">
               <a:spcBef>
                 <a:spcPts val="400"/>
               </a:spcBef>
@@ -1650,7 +1655,7 @@
               <a:buNone/>
               <a:defRPr sz="2000"/>
             </a:lvl4pPr>
-            <a:lvl5pPr marL="0" indent="1828800" algn="l">
+            <a:lvl5pPr marL="0" indent="0" algn="l">
               <a:spcBef>
                 <a:spcPts val="400"/>
               </a:spcBef>
@@ -1876,7 +1881,7 @@
               </a:buClr>
               <a:defRPr sz="2800"/>
             </a:lvl2pPr>
-            <a:lvl3pPr marL="1234439" indent="-320039" algn="l">
+            <a:lvl3pPr marL="1234438" indent="-320038" algn="l">
               <a:buClr>
                 <a:srgbClr val="A50021"/>
               </a:buClr>
@@ -2088,8 +2093,8 @@
         </p:nvSpPr>
         <p:spPr>
           <a:xfrm>
-            <a:off x="457200" y="1435465"/>
-            <a:ext cx="4040188" cy="739411"/>
+            <a:off x="457200" y="1435464"/>
+            <a:ext cx="4040188" cy="739413"/>
           </a:xfrm>
           <a:prstGeom prst="rect">
             <a:avLst/>
@@ -2109,7 +2114,7 @@
                 <a:sym typeface="Verdana Bold"/>
               </a:defRPr>
             </a:lvl1pPr>
-            <a:lvl2pPr marL="0" indent="457200" algn="l">
+            <a:lvl2pPr marL="0" indent="0" algn="l">
               <a:spcBef>
                 <a:spcPts val="500"/>
               </a:spcBef>
@@ -2122,7 +2127,7 @@
                 <a:sym typeface="Verdana Bold"/>
               </a:defRPr>
             </a:lvl2pPr>
-            <a:lvl3pPr marL="0" indent="914400" algn="l">
+            <a:lvl3pPr marL="0" indent="0" algn="l">
               <a:spcBef>
                 <a:spcPts val="500"/>
               </a:spcBef>
@@ -2135,7 +2140,7 @@
                 <a:sym typeface="Verdana Bold"/>
               </a:defRPr>
             </a:lvl3pPr>
-            <a:lvl4pPr marL="0" indent="1371600" algn="l">
+            <a:lvl4pPr marL="0" indent="0" algn="l">
               <a:spcBef>
                 <a:spcPts val="500"/>
               </a:spcBef>
@@ -2148,7 +2153,7 @@
                 <a:sym typeface="Verdana Bold"/>
               </a:defRPr>
             </a:lvl4pPr>
-            <a:lvl5pPr marL="0" indent="1828800" algn="l">
+            <a:lvl5pPr marL="0" indent="0" algn="l">
               <a:spcBef>
                 <a:spcPts val="500"/>
               </a:spcBef>
@@ -2430,7 +2435,7 @@
         <p:spPr>
           <a:xfrm>
             <a:off x="457200" y="0"/>
-            <a:ext cx="3008314" cy="1435100"/>
+            <a:ext cx="3008315" cy="1435100"/>
           </a:xfrm>
           <a:prstGeom prst="rect">
             <a:avLst/>
@@ -2683,10 +2688,10 @@
         </p:nvGrpSpPr>
         <p:grpSpPr>
           <a:xfrm>
-            <a:off x="-31751" y="0"/>
-            <a:ext cx="9178133" cy="6924675"/>
+            <a:off x="-31752" y="-1"/>
+            <a:ext cx="9178135" cy="6924676"/>
             <a:chOff x="0" y="0"/>
-            <a:chExt cx="9178131" cy="6924675"/>
+            <a:chExt cx="9178133" cy="6924675"/>
           </a:xfrm>
         </p:grpSpPr>
         <p:sp>
@@ -2698,7 +2703,7 @@
           <p:spPr>
             <a:xfrm>
               <a:off x="7937" y="7937"/>
-              <a:ext cx="9167813" cy="6843713"/>
+              <a:ext cx="9167815" cy="6843713"/>
             </a:xfrm>
             <a:prstGeom prst="rect">
               <a:avLst/>
@@ -2739,8 +2744,8 @@
           </p:nvSpPr>
           <p:spPr>
             <a:xfrm>
-              <a:off x="31749" y="0"/>
-              <a:ext cx="1179514" cy="6880225"/>
+              <a:off x="31748" y="-1"/>
+              <a:ext cx="1179516" cy="6880226"/>
             </a:xfrm>
             <a:prstGeom prst="rect">
               <a:avLst/>
@@ -2791,7 +2796,7 @@
           <p:spPr>
             <a:xfrm>
               <a:off x="1135062" y="0"/>
-              <a:ext cx="79376" cy="6924675"/>
+              <a:ext cx="79377" cy="6924675"/>
             </a:xfrm>
             <a:prstGeom prst="rect">
               <a:avLst/>
@@ -2824,7 +2829,7 @@
         </p:sp>
         <p:pic>
           <p:nvPicPr>
-            <p:cNvPr id="5" name="image3.png" descr="Astonbnr"/>
+            <p:cNvPr id="5" name="image2.png" descr="Astonbnr"/>
             <p:cNvPicPr/>
             <p:nvPr/>
           </p:nvPicPr>
@@ -2839,8 +2844,8 @@
           </p:blipFill>
           <p:spPr>
             <a:xfrm>
-              <a:off x="31750" y="2706687"/>
-              <a:ext cx="9144001" cy="790576"/>
+              <a:off x="31749" y="2706687"/>
+              <a:ext cx="9144004" cy="790577"/>
             </a:xfrm>
             <a:prstGeom prst="rect">
               <a:avLst/>
@@ -2860,8 +2865,8 @@
           </p:nvSpPr>
           <p:spPr>
             <a:xfrm rot="5400000">
-              <a:off x="5118100" y="-628651"/>
-              <a:ext cx="74613" cy="8040689"/>
+              <a:off x="5118101" y="-628652"/>
+              <a:ext cx="74614" cy="8040691"/>
             </a:xfrm>
             <a:prstGeom prst="rect">
               <a:avLst/>
@@ -2900,8 +2905,8 @@
           </p:nvSpPr>
           <p:spPr>
             <a:xfrm rot="5400000">
-              <a:off x="5118100" y="-1352551"/>
-              <a:ext cx="74613" cy="8045451"/>
+              <a:off x="5118101" y="-1352552"/>
+              <a:ext cx="74614" cy="8045453"/>
             </a:xfrm>
             <a:prstGeom prst="rect">
               <a:avLst/>
@@ -2940,8 +2945,8 @@
           </p:nvSpPr>
           <p:spPr>
             <a:xfrm>
-              <a:off x="0" y="0"/>
-              <a:ext cx="74613" cy="6892925"/>
+              <a:off x="-1" y="-1"/>
+              <a:ext cx="74614" cy="6892926"/>
             </a:xfrm>
             <a:prstGeom prst="rect">
               <a:avLst/>
@@ -2981,7 +2986,7 @@
           <p:spPr>
             <a:xfrm>
               <a:off x="688975" y="3362325"/>
-              <a:ext cx="446088" cy="0"/>
+              <a:ext cx="446089" cy="0"/>
             </a:xfrm>
             <a:prstGeom prst="line">
               <a:avLst/>
@@ -3007,9 +3012,9 @@
                   <a:solidFill>
                     <a:srgbClr val="000000"/>
                   </a:solidFill>
-                  <a:latin typeface="+mj-lt"/>
-                  <a:ea typeface="+mj-ea"/>
-                  <a:cs typeface="+mj-cs"/>
+                  <a:latin typeface="+mn-lt"/>
+                  <a:ea typeface="+mn-ea"/>
+                  <a:cs typeface="+mn-cs"/>
                   <a:sym typeface="Helvetica"/>
                 </a:defRPr>
               </a:pPr>
@@ -3024,8 +3029,8 @@
           </p:nvSpPr>
           <p:spPr>
             <a:xfrm flipV="1">
-              <a:off x="74612" y="3359150"/>
-              <a:ext cx="365126" cy="1588"/>
+              <a:off x="74611" y="3359150"/>
+              <a:ext cx="365127" cy="1589"/>
             </a:xfrm>
             <a:prstGeom prst="line">
               <a:avLst/>
@@ -3051,9 +3056,9 @@
                   <a:solidFill>
                     <a:srgbClr val="000000"/>
                   </a:solidFill>
-                  <a:latin typeface="+mj-lt"/>
-                  <a:ea typeface="+mj-ea"/>
-                  <a:cs typeface="+mj-cs"/>
+                  <a:latin typeface="+mn-lt"/>
+                  <a:ea typeface="+mn-ea"/>
+                  <a:cs typeface="+mn-cs"/>
                   <a:sym typeface="Helvetica"/>
                 </a:defRPr>
               </a:pPr>
@@ -3069,7 +3074,7 @@
           <p:spPr>
             <a:xfrm>
               <a:off x="436562" y="3357562"/>
-              <a:ext cx="103188" cy="136526"/>
+              <a:ext cx="103189" cy="136527"/>
             </a:xfrm>
             <a:custGeom>
               <a:avLst/>
@@ -3168,8 +3173,8 @@
           </p:nvSpPr>
           <p:spPr>
             <a:xfrm>
-              <a:off x="579261" y="3362325"/>
-              <a:ext cx="108127" cy="133350"/>
+              <a:off x="579262" y="3362325"/>
+              <a:ext cx="108132" cy="133350"/>
             </a:xfrm>
             <a:custGeom>
               <a:avLst/>
@@ -3191,7 +3196,7 @@
               </a:cxnLst>
               <a:rect l="0" t="0" r="r" b="b"/>
               <a:pathLst>
-                <a:path w="20721" h="21600" fill="norm" stroke="1" extrusionOk="0">
+                <a:path w="20722" h="21600" fill="norm" stroke="1" extrusionOk="0">
                   <a:moveTo>
                     <a:pt x="20722" y="0"/>
                   </a:moveTo>
@@ -3292,7 +3297,7 @@
           </a:extLst>
         </p:spPr>
         <p:txBody>
-          <a:bodyPr lIns="45719" rIns="45719" anchor="b"/>
+          <a:bodyPr lIns="45718" tIns="45718" rIns="45718" bIns="45718" anchor="b"/>
           <a:lstStyle/>
           <a:p>
             <a:pPr lvl="0">
@@ -3339,7 +3344,7 @@
           </a:extLst>
         </p:spPr>
         <p:txBody>
-          <a:bodyPr lIns="45719" rIns="45719"/>
+          <a:bodyPr lIns="45718" tIns="45718" rIns="45718" bIns="45718"/>
           <a:lstStyle/>
           <a:p>
             <a:pPr lvl="0">
@@ -3459,7 +3464,7 @@
         <p:spPr>
           <a:xfrm>
             <a:off x="7129463" y="6416776"/>
-            <a:ext cx="1905001" cy="288825"/>
+            <a:ext cx="1905002" cy="288822"/>
           </a:xfrm>
           <a:prstGeom prst="rect">
             <a:avLst/>
@@ -3469,7 +3474,7 @@
           </a:ln>
         </p:spPr>
         <p:txBody>
-          <a:bodyPr lIns="45719" rIns="45719" anchor="b">
+          <a:bodyPr lIns="45718" tIns="45718" rIns="45718" bIns="45718" anchor="b">
             <a:spAutoFit/>
           </a:bodyPr>
           <a:lstStyle>
@@ -3566,7 +3571,7 @@
           <a:sym typeface="Verdana"/>
         </a:defRPr>
       </a:lvl5pPr>
-      <a:lvl6pPr indent="457200" algn="ctr">
+      <a:lvl6pPr algn="ctr">
         <a:defRPr sz="2800">
           <a:solidFill>
             <a:srgbClr val="FFFFFF"/>
@@ -3577,7 +3582,7 @@
           <a:sym typeface="Verdana"/>
         </a:defRPr>
       </a:lvl6pPr>
-      <a:lvl7pPr indent="914400" algn="ctr">
+      <a:lvl7pPr algn="ctr">
         <a:defRPr sz="2800">
           <a:solidFill>
             <a:srgbClr val="FFFFFF"/>
@@ -3588,7 +3593,7 @@
           <a:sym typeface="Verdana"/>
         </a:defRPr>
       </a:lvl7pPr>
-      <a:lvl8pPr indent="1371600" algn="ctr">
+      <a:lvl8pPr algn="ctr">
         <a:defRPr sz="2800">
           <a:solidFill>
             <a:srgbClr val="FFFFFF"/>
@@ -3599,7 +3604,7 @@
           <a:sym typeface="Verdana"/>
         </a:defRPr>
       </a:lvl8pPr>
-      <a:lvl9pPr indent="1828800" algn="ctr">
+      <a:lvl9pPr algn="ctr">
         <a:defRPr sz="2800">
           <a:solidFill>
             <a:srgbClr val="FFFFFF"/>
@@ -3642,7 +3647,7 @@
           <a:sym typeface="Verdana"/>
         </a:defRPr>
       </a:lvl2pPr>
-      <a:lvl3pPr marL="1184563" indent="-270163" algn="ctr">
+      <a:lvl3pPr marL="1184562" indent="-270162" algn="ctr">
         <a:spcBef>
           <a:spcPts val="600"/>
         </a:spcBef>
@@ -3658,7 +3663,7 @@
           <a:sym typeface="Verdana"/>
         </a:defRPr>
       </a:lvl3pPr>
-      <a:lvl4pPr marL="1668779" indent="-297179" algn="ctr">
+      <a:lvl4pPr marL="1668778" indent="-297178" algn="ctr">
         <a:spcBef>
           <a:spcPts val="600"/>
         </a:spcBef>
@@ -3674,7 +3679,7 @@
           <a:sym typeface="Verdana"/>
         </a:defRPr>
       </a:lvl4pPr>
-      <a:lvl5pPr marL="2125979" indent="-297179" algn="ctr">
+      <a:lvl5pPr marL="2125978" indent="-297178" algn="ctr">
         <a:spcBef>
           <a:spcPts val="600"/>
         </a:spcBef>
@@ -3690,7 +3695,7 @@
           <a:sym typeface="Verdana"/>
         </a:defRPr>
       </a:lvl5pPr>
-      <a:lvl6pPr marL="2583179" indent="-297179" algn="ctr">
+      <a:lvl6pPr marL="2583178" indent="-297178" algn="ctr">
         <a:spcBef>
           <a:spcPts val="600"/>
         </a:spcBef>
@@ -3706,7 +3711,7 @@
           <a:sym typeface="Verdana"/>
         </a:defRPr>
       </a:lvl6pPr>
-      <a:lvl7pPr marL="3040379" indent="-297179" algn="ctr">
+      <a:lvl7pPr marL="3040378" indent="-297178" algn="ctr">
         <a:spcBef>
           <a:spcPts val="600"/>
         </a:spcBef>
@@ -3722,7 +3727,7 @@
           <a:sym typeface="Verdana"/>
         </a:defRPr>
       </a:lvl7pPr>
-      <a:lvl8pPr marL="3497579" indent="-297179" algn="ctr">
+      <a:lvl8pPr marL="3497579" indent="-297178" algn="ctr">
         <a:spcBef>
           <a:spcPts val="600"/>
         </a:spcBef>
@@ -3767,7 +3772,7 @@
           <a:sym typeface="Arial"/>
         </a:defRPr>
       </a:lvl1pPr>
-      <a:lvl2pPr indent="457200" algn="r">
+      <a:lvl2pPr algn="r">
         <a:defRPr sz="1400">
           <a:solidFill>
             <a:schemeClr val="tx1"/>
@@ -3778,7 +3783,7 @@
           <a:sym typeface="Arial"/>
         </a:defRPr>
       </a:lvl2pPr>
-      <a:lvl3pPr indent="914400" algn="r">
+      <a:lvl3pPr algn="r">
         <a:defRPr sz="1400">
           <a:solidFill>
             <a:schemeClr val="tx1"/>
@@ -3789,7 +3794,7 @@
           <a:sym typeface="Arial"/>
         </a:defRPr>
       </a:lvl3pPr>
-      <a:lvl4pPr indent="1371600" algn="r">
+      <a:lvl4pPr algn="r">
         <a:defRPr sz="1400">
           <a:solidFill>
             <a:schemeClr val="tx1"/>
@@ -3800,7 +3805,7 @@
           <a:sym typeface="Arial"/>
         </a:defRPr>
       </a:lvl4pPr>
-      <a:lvl5pPr indent="1828800" algn="r">
+      <a:lvl5pPr algn="r">
         <a:defRPr sz="1400">
           <a:solidFill>
             <a:schemeClr val="tx1"/>
@@ -3811,7 +3816,7 @@
           <a:sym typeface="Arial"/>
         </a:defRPr>
       </a:lvl5pPr>
-      <a:lvl6pPr indent="2286000" algn="r">
+      <a:lvl6pPr algn="r">
         <a:defRPr sz="1400">
           <a:solidFill>
             <a:schemeClr val="tx1"/>
@@ -3822,7 +3827,7 @@
           <a:sym typeface="Arial"/>
         </a:defRPr>
       </a:lvl6pPr>
-      <a:lvl7pPr indent="2743200" algn="r">
+      <a:lvl7pPr algn="r">
         <a:defRPr sz="1400">
           <a:solidFill>
             <a:schemeClr val="tx1"/>
@@ -3833,7 +3838,7 @@
           <a:sym typeface="Arial"/>
         </a:defRPr>
       </a:lvl7pPr>
-      <a:lvl8pPr indent="3200400" algn="r">
+      <a:lvl8pPr algn="r">
         <a:defRPr sz="1400">
           <a:solidFill>
             <a:schemeClr val="tx1"/>
@@ -3844,7 +3849,7 @@
           <a:sym typeface="Arial"/>
         </a:defRPr>
       </a:lvl8pPr>
-      <a:lvl9pPr indent="3657600" algn="r">
+      <a:lvl9pPr algn="r">
         <a:defRPr sz="1400">
           <a:solidFill>
             <a:schemeClr val="tx1"/>
@@ -3911,7 +3916,7 @@
           </a:bodyPr>
           <a:lstStyle>
             <a:lvl1pPr defTabSz="795527">
-              <a:defRPr sz="2436"/>
+              <a:defRPr sz="2400"/>
             </a:lvl1pPr>
           </a:lstStyle>
           <a:p>
@@ -3923,7 +3928,7 @@
               </a:defRPr>
             </a:pPr>
             <a:r>
-              <a:rPr sz="2436">
+              <a:rPr sz="2400">
                 <a:solidFill>
                   <a:srgbClr val="FFFFFF"/>
                 </a:solidFill>
@@ -3970,17 +3975,25 @@
               </a:defRPr>
             </a:pPr>
             <a:r>
-              <a:rPr sz="2508">
+              <a:rPr sz="2500">
                 <a:solidFill>
                   <a:srgbClr val="FFFFFF"/>
                 </a:solidFill>
+                <a:latin typeface="Verdana"/>
+                <a:ea typeface="Verdana"/>
+                <a:cs typeface="Verdana"/>
+                <a:sym typeface="Verdana"/>
               </a:rPr>
               <a:t>Alejandro Catalán Cebollada</a:t>
             </a:r>
-            <a:endParaRPr sz="2508">
+            <a:endParaRPr sz="2500">
               <a:solidFill>
                 <a:srgbClr val="FFFFFF"/>
               </a:solidFill>
+              <a:latin typeface="Verdana"/>
+              <a:ea typeface="Verdana"/>
+              <a:cs typeface="Verdana"/>
+              <a:sym typeface="Verdana"/>
             </a:endParaRPr>
           </a:p>
           <a:p>
@@ -3992,17 +4005,25 @@
               </a:defRPr>
             </a:pPr>
             <a:r>
-              <a:rPr sz="1140">
+              <a:rPr sz="1100">
                 <a:solidFill>
                   <a:srgbClr val="FFFFFF"/>
                 </a:solidFill>
+                <a:latin typeface="Verdana"/>
+                <a:ea typeface="Verdana"/>
+                <a:cs typeface="Verdana"/>
+                <a:sym typeface="Verdana"/>
               </a:rPr>
               <a:t>Treball Fi de Grau en Enginyeria Informatica</a:t>
             </a:r>
-            <a:endParaRPr sz="1140">
+            <a:endParaRPr sz="1100">
               <a:solidFill>
                 <a:srgbClr val="FFFFFF"/>
               </a:solidFill>
+              <a:latin typeface="Verdana"/>
+              <a:ea typeface="Verdana"/>
+              <a:cs typeface="Verdana"/>
+              <a:sym typeface="Verdana"/>
             </a:endParaRPr>
           </a:p>
           <a:p>
@@ -4014,17 +4035,25 @@
               </a:defRPr>
             </a:pPr>
             <a:r>
-              <a:rPr sz="1140">
+              <a:rPr sz="1100">
                 <a:solidFill>
                   <a:srgbClr val="FFFFFF"/>
                 </a:solidFill>
+                <a:latin typeface="Verdana"/>
+                <a:ea typeface="Verdana"/>
+                <a:cs typeface="Verdana"/>
+                <a:sym typeface="Verdana"/>
               </a:rPr>
               <a:t>Escola Superior Politècnica UPF</a:t>
             </a:r>
-            <a:endParaRPr sz="1140">
+            <a:endParaRPr sz="1100">
               <a:solidFill>
                 <a:srgbClr val="FFFFFF"/>
               </a:solidFill>
+              <a:latin typeface="Verdana"/>
+              <a:ea typeface="Verdana"/>
+              <a:cs typeface="Verdana"/>
+              <a:sym typeface="Verdana"/>
             </a:endParaRPr>
           </a:p>
           <a:p>
@@ -4036,17 +4065,25 @@
               </a:defRPr>
             </a:pPr>
             <a:r>
-              <a:rPr sz="1140">
+              <a:rPr sz="1100">
                 <a:solidFill>
                   <a:srgbClr val="FFFFFF"/>
                 </a:solidFill>
+                <a:latin typeface="Verdana"/>
+                <a:ea typeface="Verdana"/>
+                <a:cs typeface="Verdana"/>
+                <a:sym typeface="Verdana"/>
               </a:rPr>
               <a:t>Any 2015</a:t>
             </a:r>
-            <a:endParaRPr sz="1140">
+            <a:endParaRPr sz="1100">
               <a:solidFill>
                 <a:srgbClr val="FFFFFF"/>
               </a:solidFill>
+              <a:latin typeface="Verdana"/>
+              <a:ea typeface="Verdana"/>
+              <a:cs typeface="Verdana"/>
+              <a:sym typeface="Verdana"/>
             </a:endParaRPr>
           </a:p>
           <a:p>
@@ -4058,16 +4095,57 @@
               </a:defRPr>
             </a:pPr>
             <a:r>
-              <a:rPr sz="1140">
+              <a:rPr sz="1100">
                 <a:solidFill>
                   <a:srgbClr val="FFFFFF"/>
                 </a:solidFill>
+                <a:latin typeface="Verdana"/>
+                <a:ea typeface="Verdana"/>
+                <a:cs typeface="Verdana"/>
+                <a:sym typeface="Verdana"/>
               </a:rPr>
               <a:t>Director del treball: Javier Agenjo, Departament GTI</a:t>
             </a:r>
           </a:p>
         </p:txBody>
       </p:sp>
+    </p:spTree>
+  </p:cSld>
+  <p:clrMapOvr>
+    <a:masterClrMapping/>
+  </p:clrMapOvr>
+  <p:transition spd="med" advClick="1"/>
+</p:sld>
+</file>
+
+<file path=ppt/slides/slide10.xml><?xml version="1.0" encoding="utf-8"?>
+<p:sld xmlns:a="http://schemas.openxmlformats.org/drawingml/2006/main" xmlns:r="http://schemas.openxmlformats.org/officeDocument/2006/relationships" xmlns:p="http://schemas.openxmlformats.org/presentationml/2006/main" showMasterSp="1" showMasterPhAnim="1">
+  <p:cSld>
+    <p:bg>
+      <p:bgPr>
+        <a:blipFill rotWithShape="1">
+          <a:blip r:embed="rId2"/>
+          <a:srcRect l="0" t="0" r="0" b="0"/>
+          <a:stretch>
+            <a:fillRect/>
+          </a:stretch>
+        </a:blipFill>
+      </p:bgPr>
+    </p:bg>
+    <p:spTree>
+      <p:nvGrpSpPr>
+        <p:cNvPr id="1" name=""/>
+        <p:cNvGrpSpPr/>
+        <p:nvPr/>
+      </p:nvGrpSpPr>
+      <p:grpSpPr>
+        <a:xfrm>
+          <a:off x="0" y="0"/>
+          <a:ext cx="0" cy="0"/>
+          <a:chOff x="0" y="0"/>
+          <a:chExt cx="0" cy="0"/>
+        </a:xfrm>
+      </p:grpSpPr>
     </p:spTree>
   </p:cSld>
   <p:clrMapOvr>
@@ -4153,13 +4231,13 @@
             <a:normAutofit fontScale="100000" lnSpcReduction="0"/>
           </a:bodyPr>
           <a:lstStyle>
-            <a:lvl1pPr marL="0" indent="0">
+            <a:lvl1pPr marL="0" indent="0" algn="just">
               <a:lnSpc>
                 <a:spcPct val="150000"/>
               </a:lnSpc>
-              <a:buClrTx/>
               <a:buSzTx/>
               <a:buNone/>
+              <a:defRPr sz="2400"/>
             </a:lvl1pPr>
           </a:lstStyle>
           <a:p>
@@ -4171,7 +4249,7 @@
               </a:defRPr>
             </a:pPr>
             <a:r>
-              <a:rPr sz="2600">
+              <a:rPr sz="2400">
                 <a:solidFill>
                   <a:srgbClr val="333333"/>
                 </a:solidFill>
@@ -4267,9 +4345,12 @@
           </a:bodyPr>
           <a:lstStyle/>
           <a:p>
-            <a:pPr lvl="0" marL="271111" indent="-271111" defTabSz="713231">
+            <a:pPr lvl="0" marL="173511" indent="-173511" defTabSz="456467">
+              <a:lnSpc>
+                <a:spcPct val="150000"/>
+              </a:lnSpc>
               <a:spcBef>
-                <a:spcPts val="400"/>
+                <a:spcPts val="200"/>
               </a:spcBef>
               <a:buClrTx/>
               <a:buSzPct val="100000"/>
@@ -4281,15 +4362,18 @@
               </a:defRPr>
             </a:pPr>
             <a:r>
-              <a:rPr sz="2027"/>
+              <a:rPr sz="1536"/>
               <a:t>Introducción</a:t>
             </a:r>
-            <a:endParaRPr sz="2027"/>
-          </a:p>
-          <a:p>
-            <a:pPr lvl="0" marL="271111" indent="-271111" defTabSz="713231">
+            <a:endParaRPr sz="1536"/>
+          </a:p>
+          <a:p>
+            <a:pPr lvl="0" marL="173511" indent="-173511" defTabSz="456467">
+              <a:lnSpc>
+                <a:spcPct val="150000"/>
+              </a:lnSpc>
               <a:spcBef>
-                <a:spcPts val="400"/>
+                <a:spcPts val="200"/>
               </a:spcBef>
               <a:buClrTx/>
               <a:buSzPct val="100000"/>
@@ -4301,15 +4385,18 @@
               </a:defRPr>
             </a:pPr>
             <a:r>
-              <a:rPr sz="2027"/>
+              <a:rPr sz="1536"/>
               <a:t>La Web</a:t>
             </a:r>
-            <a:endParaRPr sz="2027"/>
-          </a:p>
-          <a:p>
-            <a:pPr lvl="0" marL="271111" indent="-271111" defTabSz="713231">
+            <a:endParaRPr sz="1536"/>
+          </a:p>
+          <a:p>
+            <a:pPr lvl="0" marL="173511" indent="-173511" defTabSz="456467">
+              <a:lnSpc>
+                <a:spcPct val="150000"/>
+              </a:lnSpc>
               <a:spcBef>
-                <a:spcPts val="400"/>
+                <a:spcPts val="200"/>
               </a:spcBef>
               <a:buClrTx/>
               <a:buSzPct val="100000"/>
@@ -4321,15 +4408,18 @@
               </a:defRPr>
             </a:pPr>
             <a:r>
-              <a:rPr sz="2027"/>
+              <a:rPr sz="1536"/>
               <a:t>Graphics Pipeline</a:t>
             </a:r>
-            <a:endParaRPr sz="2027"/>
-          </a:p>
-          <a:p>
-            <a:pPr lvl="1" marL="500513" indent="-203333" defTabSz="713231">
+            <a:endParaRPr sz="1536"/>
+          </a:p>
+          <a:p>
+            <a:pPr lvl="1" marL="320328" indent="-130133" defTabSz="456467">
+              <a:lnSpc>
+                <a:spcPct val="150000"/>
+              </a:lnSpc>
               <a:spcBef>
-                <a:spcPts val="400"/>
+                <a:spcPts val="200"/>
               </a:spcBef>
               <a:buClrTx/>
               <a:buSzPct val="100000"/>
@@ -4341,15 +4431,18 @@
               </a:defRPr>
             </a:pPr>
             <a:r>
-              <a:rPr sz="2027"/>
+              <a:rPr sz="1536"/>
               <a:t>Forward Rendering</a:t>
             </a:r>
-            <a:endParaRPr sz="2027"/>
-          </a:p>
-          <a:p>
-            <a:pPr lvl="1" marL="500513" indent="-203333" defTabSz="713231">
+            <a:endParaRPr sz="1536"/>
+          </a:p>
+          <a:p>
+            <a:pPr lvl="1" marL="320328" indent="-130133" defTabSz="456467">
+              <a:lnSpc>
+                <a:spcPct val="150000"/>
+              </a:lnSpc>
               <a:spcBef>
-                <a:spcPts val="400"/>
+                <a:spcPts val="200"/>
               </a:spcBef>
               <a:buClrTx/>
               <a:buSzPct val="100000"/>
@@ -4361,15 +4454,18 @@
               </a:defRPr>
             </a:pPr>
             <a:r>
-              <a:rPr sz="2027"/>
+              <a:rPr sz="1536"/>
               <a:t>Deferred Rendering</a:t>
             </a:r>
-            <a:endParaRPr sz="2027"/>
-          </a:p>
-          <a:p>
-            <a:pPr lvl="0" marL="271111" indent="-271111" defTabSz="713231">
+            <a:endParaRPr sz="1536"/>
+          </a:p>
+          <a:p>
+            <a:pPr lvl="0" marL="173511" indent="-173511" defTabSz="456467">
+              <a:lnSpc>
+                <a:spcPct val="150000"/>
+              </a:lnSpc>
               <a:spcBef>
-                <a:spcPts val="400"/>
+                <a:spcPts val="200"/>
               </a:spcBef>
               <a:buClrTx/>
               <a:buSzPct val="100000"/>
@@ -4381,15 +4477,18 @@
               </a:defRPr>
             </a:pPr>
             <a:r>
-              <a:rPr sz="2027"/>
+              <a:rPr sz="1536"/>
               <a:t>WebGL</a:t>
             </a:r>
-            <a:endParaRPr sz="2027"/>
-          </a:p>
-          <a:p>
-            <a:pPr lvl="0" marL="271111" indent="-271111" defTabSz="713231">
+            <a:endParaRPr sz="1536"/>
+          </a:p>
+          <a:p>
+            <a:pPr lvl="0" marL="173511" indent="-173511" defTabSz="456467">
+              <a:lnSpc>
+                <a:spcPct val="150000"/>
+              </a:lnSpc>
               <a:spcBef>
-                <a:spcPts val="400"/>
+                <a:spcPts val="200"/>
               </a:spcBef>
               <a:buClrTx/>
               <a:buSzPct val="100000"/>
@@ -4401,15 +4500,18 @@
               </a:defRPr>
             </a:pPr>
             <a:r>
-              <a:rPr sz="2027"/>
+              <a:rPr sz="1536"/>
               <a:t>Engine Desarrollado</a:t>
             </a:r>
-            <a:endParaRPr sz="2027"/>
-          </a:p>
-          <a:p>
-            <a:pPr lvl="1" marL="500513" indent="-203333" defTabSz="713231">
+            <a:endParaRPr sz="1536"/>
+          </a:p>
+          <a:p>
+            <a:pPr lvl="1" marL="320328" indent="-130133" defTabSz="456467">
+              <a:lnSpc>
+                <a:spcPct val="150000"/>
+              </a:lnSpc>
               <a:spcBef>
-                <a:spcPts val="400"/>
+                <a:spcPts val="200"/>
               </a:spcBef>
               <a:buClrTx/>
               <a:buSzPct val="100000"/>
@@ -4421,15 +4523,18 @@
               </a:defRPr>
             </a:pPr>
             <a:r>
-              <a:rPr sz="2027"/>
+              <a:rPr sz="1536"/>
               <a:t>Diseño</a:t>
             </a:r>
-            <a:endParaRPr sz="2027"/>
-          </a:p>
-          <a:p>
-            <a:pPr lvl="1" marL="500513" indent="-203333" defTabSz="713231">
+            <a:endParaRPr sz="1536"/>
+          </a:p>
+          <a:p>
+            <a:pPr lvl="1" marL="320328" indent="-130133" defTabSz="456467">
+              <a:lnSpc>
+                <a:spcPct val="150000"/>
+              </a:lnSpc>
               <a:spcBef>
-                <a:spcPts val="400"/>
+                <a:spcPts val="200"/>
               </a:spcBef>
               <a:buClrTx/>
               <a:buSzPct val="100000"/>
@@ -4441,15 +4546,18 @@
               </a:defRPr>
             </a:pPr>
             <a:r>
-              <a:rPr sz="2027"/>
+              <a:rPr sz="1536"/>
               <a:t>Estructura</a:t>
             </a:r>
-            <a:endParaRPr sz="2027"/>
-          </a:p>
-          <a:p>
-            <a:pPr lvl="0" marL="271111" indent="-271111" defTabSz="713231">
+            <a:endParaRPr sz="1536"/>
+          </a:p>
+          <a:p>
+            <a:pPr lvl="0" marL="173511" indent="-173511" defTabSz="456467">
+              <a:lnSpc>
+                <a:spcPct val="150000"/>
+              </a:lnSpc>
               <a:spcBef>
-                <a:spcPts val="400"/>
+                <a:spcPts val="200"/>
               </a:spcBef>
               <a:buClrTx/>
               <a:buSzPct val="100000"/>
@@ -4461,15 +4569,18 @@
               </a:defRPr>
             </a:pPr>
             <a:r>
-              <a:rPr sz="2027"/>
+              <a:rPr sz="1536"/>
               <a:t>Resultados</a:t>
             </a:r>
-            <a:endParaRPr sz="2027"/>
-          </a:p>
-          <a:p>
-            <a:pPr lvl="0" marL="271111" indent="-271111" defTabSz="713231">
+            <a:endParaRPr sz="1536"/>
+          </a:p>
+          <a:p>
+            <a:pPr lvl="0" marL="173511" indent="-173511" defTabSz="456467">
+              <a:lnSpc>
+                <a:spcPct val="150000"/>
+              </a:lnSpc>
               <a:spcBef>
-                <a:spcPts val="400"/>
+                <a:spcPts val="200"/>
               </a:spcBef>
               <a:buClrTx/>
               <a:buSzPct val="100000"/>
@@ -4481,7 +4592,7 @@
               </a:defRPr>
             </a:pPr>
             <a:r>
-              <a:rPr sz="2027"/>
+              <a:rPr sz="1536"/>
               <a:t>Conclusiones</a:t>
             </a:r>
           </a:p>
@@ -4513,6 +4624,184 @@
           <a:chExt cx="0" cy="0"/>
         </a:xfrm>
       </p:grpSpPr>
+      <p:sp>
+        <p:nvSpPr>
+          <p:cNvPr id="62" name="Shape 62"/>
+          <p:cNvSpPr/>
+          <p:nvPr>
+            <p:ph type="title"/>
+          </p:nvPr>
+        </p:nvSpPr>
+        <p:spPr>
+          <a:prstGeom prst="rect">
+            <a:avLst/>
+          </a:prstGeom>
+        </p:spPr>
+        <p:txBody>
+          <a:bodyPr/>
+          <a:lstStyle/>
+          <a:p>
+            <a:pPr lvl="0">
+              <a:defRPr sz="1800">
+                <a:solidFill>
+                  <a:srgbClr val="000000"/>
+                </a:solidFill>
+              </a:defRPr>
+            </a:pPr>
+            <a:r>
+              <a:rPr sz="2800">
+                <a:solidFill>
+                  <a:srgbClr val="FFFFFF"/>
+                </a:solidFill>
+              </a:rPr>
+              <a:t>Introducción</a:t>
+            </a:r>
+          </a:p>
+        </p:txBody>
+      </p:sp>
+      <p:sp>
+        <p:nvSpPr>
+          <p:cNvPr id="63" name="Shape 63"/>
+          <p:cNvSpPr/>
+          <p:nvPr>
+            <p:ph type="body" idx="1"/>
+          </p:nvPr>
+        </p:nvSpPr>
+        <p:spPr>
+          <a:xfrm>
+            <a:off x="1295400" y="1930400"/>
+            <a:ext cx="7048500" cy="4876800"/>
+          </a:xfrm>
+          <a:prstGeom prst="rect">
+            <a:avLst/>
+          </a:prstGeom>
+        </p:spPr>
+        <p:txBody>
+          <a:bodyPr lIns="0" tIns="0" rIns="0" bIns="0" anchor="ctr"/>
+          <a:lstStyle/>
+          <a:p>
+            <a:pPr lvl="0" marL="0" indent="0" algn="just">
+              <a:lnSpc>
+                <a:spcPct val="150000"/>
+              </a:lnSpc>
+              <a:buClrTx/>
+              <a:buSzTx/>
+              <a:buNone/>
+              <a:defRPr sz="1800">
+                <a:solidFill>
+                  <a:srgbClr val="000000"/>
+                </a:solidFill>
+              </a:defRPr>
+            </a:pPr>
+            <a:r>
+              <a:rPr sz="2400">
+                <a:solidFill>
+                  <a:srgbClr val="333333"/>
+                </a:solidFill>
+              </a:rPr>
+              <a:t>La gran evolución de los navegadores web nos permite renderizar imágenes 2D/3D.</a:t>
+            </a:r>
+            <a:endParaRPr sz="2400">
+              <a:solidFill>
+                <a:srgbClr val="333333"/>
+              </a:solidFill>
+            </a:endParaRPr>
+          </a:p>
+          <a:p>
+            <a:pPr lvl="0" marL="0" indent="0" algn="just">
+              <a:lnSpc>
+                <a:spcPct val="150000"/>
+              </a:lnSpc>
+              <a:buClrTx/>
+              <a:buSzTx/>
+              <a:buNone/>
+              <a:defRPr sz="1800">
+                <a:solidFill>
+                  <a:srgbClr val="000000"/>
+                </a:solidFill>
+              </a:defRPr>
+            </a:pPr>
+            <a:r>
+              <a:rPr sz="2400">
+                <a:solidFill>
+                  <a:srgbClr val="333333"/>
+                </a:solidFill>
+              </a:rPr>
+              <a:t>2 subcampos dentro de la generación de imágenes:</a:t>
+            </a:r>
+            <a:endParaRPr sz="2400">
+              <a:solidFill>
+                <a:srgbClr val="333333"/>
+              </a:solidFill>
+            </a:endParaRPr>
+          </a:p>
+          <a:p>
+            <a:pPr lvl="1" marL="800100" indent="-342900" algn="just">
+              <a:lnSpc>
+                <a:spcPct val="150000"/>
+              </a:lnSpc>
+              <a:buSzPct val="150000"/>
+              <a:buChar char="•"/>
+              <a:defRPr sz="1800">
+                <a:solidFill>
+                  <a:srgbClr val="000000"/>
+                </a:solidFill>
+              </a:defRPr>
+            </a:pPr>
+            <a:r>
+              <a:rPr b="1" sz="1900">
+                <a:solidFill>
+                  <a:srgbClr val="333333"/>
+                </a:solidFill>
+              </a:rPr>
+              <a:t>Generación off-line:</a:t>
+            </a:r>
+            <a:r>
+              <a:rPr sz="1900">
+                <a:solidFill>
+                  <a:srgbClr val="333333"/>
+                </a:solidFill>
+              </a:rPr>
+              <a:t> proceso mas elaborado y detallado.</a:t>
+            </a:r>
+            <a:endParaRPr sz="1900">
+              <a:solidFill>
+                <a:srgbClr val="333333"/>
+              </a:solidFill>
+            </a:endParaRPr>
+          </a:p>
+          <a:p>
+            <a:pPr lvl="1" marL="800100" indent="-342900" algn="just">
+              <a:lnSpc>
+                <a:spcPct val="150000"/>
+              </a:lnSpc>
+              <a:buSzPct val="150000"/>
+              <a:buChar char="•"/>
+              <a:defRPr sz="1800">
+                <a:solidFill>
+                  <a:srgbClr val="000000"/>
+                </a:solidFill>
+              </a:defRPr>
+            </a:pPr>
+            <a:r>
+              <a:rPr b="1" sz="1900">
+                <a:solidFill>
+                  <a:srgbClr val="333333"/>
+                </a:solidFill>
+              </a:rPr>
+              <a:t>Generación en tiempo real:</a:t>
+            </a:r>
+            <a:r>
+              <a:rPr sz="1900">
+                <a:solidFill>
+                  <a:srgbClr val="333333"/>
+                </a:solidFill>
+              </a:rPr>
+              <a:t> a partir de un modelo 2D o 3D, utilizando la GPU para la mayoría de los cálculos.</a:t>
+            </a:r>
+          </a:p>
+        </p:txBody>
+      </p:sp>
     </p:spTree>
   </p:cSld>
   <p:clrMapOvr>
@@ -4525,17 +4814,6 @@
 <file path=ppt/slides/slide5.xml><?xml version="1.0" encoding="utf-8"?>
 <p:sld xmlns:a="http://schemas.openxmlformats.org/drawingml/2006/main" xmlns:r="http://schemas.openxmlformats.org/officeDocument/2006/relationships" xmlns:p="http://schemas.openxmlformats.org/presentationml/2006/main" showMasterSp="1" showMasterPhAnim="1">
   <p:cSld>
-    <p:bg>
-      <p:bgPr>
-        <a:blipFill rotWithShape="1">
-          <a:blip r:embed="rId2"/>
-          <a:srcRect l="0" t="0" r="0" b="0"/>
-          <a:stretch>
-            <a:fillRect/>
-          </a:stretch>
-        </a:blipFill>
-      </p:bgPr>
-    </p:bg>
     <p:spTree>
       <p:nvGrpSpPr>
         <p:cNvPr id="1" name=""/>
@@ -4550,6 +4828,711 @@
           <a:chExt cx="0" cy="0"/>
         </a:xfrm>
       </p:grpSpPr>
+      <p:sp>
+        <p:nvSpPr>
+          <p:cNvPr id="65" name="Shape 65"/>
+          <p:cNvSpPr/>
+          <p:nvPr>
+            <p:ph type="title"/>
+          </p:nvPr>
+        </p:nvSpPr>
+        <p:spPr>
+          <a:prstGeom prst="rect">
+            <a:avLst/>
+          </a:prstGeom>
+        </p:spPr>
+        <p:txBody>
+          <a:bodyPr/>
+          <a:lstStyle/>
+          <a:p>
+            <a:pPr lvl="0">
+              <a:defRPr sz="1800">
+                <a:solidFill>
+                  <a:srgbClr val="000000"/>
+                </a:solidFill>
+              </a:defRPr>
+            </a:pPr>
+            <a:r>
+              <a:rPr sz="2800">
+                <a:solidFill>
+                  <a:srgbClr val="FFFFFF"/>
+                </a:solidFill>
+              </a:rPr>
+              <a:t>Introducción</a:t>
+            </a:r>
+          </a:p>
+        </p:txBody>
+      </p:sp>
+      <p:sp>
+        <p:nvSpPr>
+          <p:cNvPr id="66" name="Shape 66"/>
+          <p:cNvSpPr/>
+          <p:nvPr>
+            <p:ph type="body" idx="1"/>
+          </p:nvPr>
+        </p:nvSpPr>
+        <p:spPr>
+          <a:prstGeom prst="rect">
+            <a:avLst/>
+          </a:prstGeom>
+        </p:spPr>
+        <p:txBody>
+          <a:bodyPr lIns="0" tIns="0" rIns="0" bIns="0" anchor="ctr"/>
+          <a:lstStyle/>
+          <a:p>
+            <a:pPr lvl="0" algn="just">
+              <a:lnSpc>
+                <a:spcPct val="150000"/>
+              </a:lnSpc>
+              <a:defRPr sz="1800">
+                <a:solidFill>
+                  <a:srgbClr val="000000"/>
+                </a:solidFill>
+              </a:defRPr>
+            </a:pPr>
+            <a:r>
+              <a:rPr b="1" sz="2400">
+                <a:solidFill>
+                  <a:srgbClr val="333333"/>
+                </a:solidFill>
+              </a:rPr>
+              <a:t>Motivación:</a:t>
+            </a:r>
+            <a:r>
+              <a:rPr sz="2400">
+                <a:solidFill>
+                  <a:srgbClr val="333333"/>
+                </a:solidFill>
+              </a:rPr>
+              <a:t> estudiar diferentes técnicas de renderizado, y su rendimiento en WebGL sobre un engine desarrollado expresamente para el proyecto.</a:t>
+            </a:r>
+            <a:endParaRPr sz="2400">
+              <a:solidFill>
+                <a:srgbClr val="333333"/>
+              </a:solidFill>
+            </a:endParaRPr>
+          </a:p>
+          <a:p>
+            <a:pPr lvl="0" marL="0" indent="0" algn="just">
+              <a:lnSpc>
+                <a:spcPct val="150000"/>
+              </a:lnSpc>
+              <a:buClrTx/>
+              <a:buSzTx/>
+              <a:buNone/>
+              <a:defRPr sz="1800">
+                <a:solidFill>
+                  <a:srgbClr val="000000"/>
+                </a:solidFill>
+              </a:defRPr>
+            </a:pPr>
+            <a:endParaRPr sz="2400">
+              <a:solidFill>
+                <a:srgbClr val="333333"/>
+              </a:solidFill>
+            </a:endParaRPr>
+          </a:p>
+          <a:p>
+            <a:pPr lvl="0" algn="just">
+              <a:lnSpc>
+                <a:spcPct val="150000"/>
+              </a:lnSpc>
+              <a:defRPr sz="1800">
+                <a:solidFill>
+                  <a:srgbClr val="000000"/>
+                </a:solidFill>
+              </a:defRPr>
+            </a:pPr>
+            <a:r>
+              <a:rPr b="1" sz="2400">
+                <a:solidFill>
+                  <a:srgbClr val="333333"/>
+                </a:solidFill>
+              </a:rPr>
+              <a:t>Background personal:</a:t>
+            </a:r>
+            <a:r>
+              <a:rPr sz="2400">
+                <a:solidFill>
+                  <a:srgbClr val="333333"/>
+                </a:solidFill>
+              </a:rPr>
+              <a:t> gran interés por la Computación Gráfica y la Ingeniería de Videojuegos.</a:t>
+            </a:r>
+          </a:p>
+        </p:txBody>
+      </p:sp>
+    </p:spTree>
+  </p:cSld>
+  <p:clrMapOvr>
+    <a:masterClrMapping/>
+  </p:clrMapOvr>
+  <p:transition spd="med" advClick="1"/>
+</p:sld>
+</file>
+
+<file path=ppt/slides/slide6.xml><?xml version="1.0" encoding="utf-8"?>
+<p:sld xmlns:a="http://schemas.openxmlformats.org/drawingml/2006/main" xmlns:r="http://schemas.openxmlformats.org/officeDocument/2006/relationships" xmlns:p="http://schemas.openxmlformats.org/presentationml/2006/main" showMasterSp="1" showMasterPhAnim="1">
+  <p:cSld>
+    <p:spTree>
+      <p:nvGrpSpPr>
+        <p:cNvPr id="1" name=""/>
+        <p:cNvGrpSpPr/>
+        <p:nvPr/>
+      </p:nvGrpSpPr>
+      <p:grpSpPr>
+        <a:xfrm>
+          <a:off x="0" y="0"/>
+          <a:ext cx="0" cy="0"/>
+          <a:chOff x="0" y="0"/>
+          <a:chExt cx="0" cy="0"/>
+        </a:xfrm>
+      </p:grpSpPr>
+      <p:sp>
+        <p:nvSpPr>
+          <p:cNvPr id="68" name="Shape 68"/>
+          <p:cNvSpPr/>
+          <p:nvPr>
+            <p:ph type="title"/>
+          </p:nvPr>
+        </p:nvSpPr>
+        <p:spPr>
+          <a:xfrm>
+            <a:off x="685800" y="25400"/>
+            <a:ext cx="8458200" cy="1143000"/>
+          </a:xfrm>
+          <a:prstGeom prst="rect">
+            <a:avLst/>
+          </a:prstGeom>
+        </p:spPr>
+        <p:txBody>
+          <a:bodyPr/>
+          <a:lstStyle/>
+          <a:p>
+            <a:pPr lvl="0"/>
+          </a:p>
+        </p:txBody>
+      </p:sp>
+    </p:spTree>
+  </p:cSld>
+  <p:clrMapOvr>
+    <a:masterClrMapping/>
+  </p:clrMapOvr>
+  <p:transition spd="med" advClick="1"/>
+</p:sld>
+</file>
+
+<file path=ppt/slides/slide7.xml><?xml version="1.0" encoding="utf-8"?>
+<p:sld xmlns:a="http://schemas.openxmlformats.org/drawingml/2006/main" xmlns:r="http://schemas.openxmlformats.org/officeDocument/2006/relationships" xmlns:p="http://schemas.openxmlformats.org/presentationml/2006/main" showMasterSp="1" showMasterPhAnim="1">
+  <p:cSld>
+    <p:spTree>
+      <p:nvGrpSpPr>
+        <p:cNvPr id="1" name=""/>
+        <p:cNvGrpSpPr/>
+        <p:nvPr/>
+      </p:nvGrpSpPr>
+      <p:grpSpPr>
+        <a:xfrm>
+          <a:off x="0" y="0"/>
+          <a:ext cx="0" cy="0"/>
+          <a:chOff x="0" y="0"/>
+          <a:chExt cx="0" cy="0"/>
+        </a:xfrm>
+      </p:grpSpPr>
+      <p:sp>
+        <p:nvSpPr>
+          <p:cNvPr id="70" name="Shape 70"/>
+          <p:cNvSpPr/>
+          <p:nvPr>
+            <p:ph type="title"/>
+          </p:nvPr>
+        </p:nvSpPr>
+        <p:spPr>
+          <a:prstGeom prst="rect">
+            <a:avLst/>
+          </a:prstGeom>
+        </p:spPr>
+        <p:txBody>
+          <a:bodyPr/>
+          <a:lstStyle/>
+          <a:p>
+            <a:pPr lvl="0">
+              <a:defRPr sz="1800">
+                <a:solidFill>
+                  <a:srgbClr val="000000"/>
+                </a:solidFill>
+              </a:defRPr>
+            </a:pPr>
+            <a:r>
+              <a:rPr sz="2800">
+                <a:solidFill>
+                  <a:srgbClr val="FFFFFF"/>
+                </a:solidFill>
+              </a:rPr>
+              <a:t>La Web</a:t>
+            </a:r>
+          </a:p>
+        </p:txBody>
+      </p:sp>
+      <p:sp>
+        <p:nvSpPr>
+          <p:cNvPr id="71" name="Shape 71"/>
+          <p:cNvSpPr/>
+          <p:nvPr>
+            <p:ph type="body" idx="1"/>
+          </p:nvPr>
+        </p:nvSpPr>
+        <p:spPr>
+          <a:prstGeom prst="rect">
+            <a:avLst/>
+          </a:prstGeom>
+        </p:spPr>
+        <p:txBody>
+          <a:bodyPr lIns="0" tIns="0" rIns="0" bIns="0" anchor="ctr"/>
+          <a:lstStyle/>
+          <a:p>
+            <a:pPr lvl="0" marL="0" indent="0" algn="just">
+              <a:lnSpc>
+                <a:spcPct val="150000"/>
+              </a:lnSpc>
+              <a:buClrTx/>
+              <a:buSzTx/>
+              <a:buNone/>
+              <a:defRPr sz="1800">
+                <a:solidFill>
+                  <a:srgbClr val="000000"/>
+                </a:solidFill>
+              </a:defRPr>
+            </a:pPr>
+            <a:r>
+              <a:rPr b="1" sz="2400">
+                <a:solidFill>
+                  <a:srgbClr val="333333"/>
+                </a:solidFill>
+              </a:rPr>
+              <a:t>W</a:t>
+            </a:r>
+            <a:r>
+              <a:rPr sz="2400">
+                <a:solidFill>
+                  <a:srgbClr val="333333"/>
+                </a:solidFill>
+              </a:rPr>
+              <a:t>orld </a:t>
+            </a:r>
+            <a:r>
+              <a:rPr b="1" sz="2400">
+                <a:solidFill>
+                  <a:srgbClr val="333333"/>
+                </a:solidFill>
+              </a:rPr>
+              <a:t>W</a:t>
+            </a:r>
+            <a:r>
+              <a:rPr sz="2400">
+                <a:solidFill>
+                  <a:srgbClr val="333333"/>
+                </a:solidFill>
+              </a:rPr>
+              <a:t>ide </a:t>
+            </a:r>
+            <a:r>
+              <a:rPr b="1" sz="2400">
+                <a:solidFill>
+                  <a:srgbClr val="333333"/>
+                </a:solidFill>
+              </a:rPr>
+              <a:t>W</a:t>
+            </a:r>
+            <a:r>
+              <a:rPr sz="2400">
+                <a:solidFill>
+                  <a:srgbClr val="333333"/>
+                </a:solidFill>
+              </a:rPr>
+              <a:t>eb (</a:t>
+            </a:r>
+            <a:r>
+              <a:rPr b="1" sz="2400">
+                <a:solidFill>
+                  <a:srgbClr val="333333"/>
+                </a:solidFill>
+              </a:rPr>
+              <a:t>WWW</a:t>
+            </a:r>
+            <a:r>
+              <a:rPr sz="2400">
+                <a:solidFill>
+                  <a:srgbClr val="333333"/>
+                </a:solidFill>
+              </a:rPr>
+              <a:t>):   conjunto de documentos y otros recursos interconectados.</a:t>
+            </a:r>
+            <a:endParaRPr sz="2400">
+              <a:solidFill>
+                <a:srgbClr val="333333"/>
+              </a:solidFill>
+            </a:endParaRPr>
+          </a:p>
+          <a:p>
+            <a:pPr lvl="0" marL="0" indent="0" algn="just">
+              <a:lnSpc>
+                <a:spcPct val="150000"/>
+              </a:lnSpc>
+              <a:buClrTx/>
+              <a:buSzTx/>
+              <a:buNone/>
+              <a:defRPr sz="1800">
+                <a:solidFill>
+                  <a:srgbClr val="000000"/>
+                </a:solidFill>
+              </a:defRPr>
+            </a:pPr>
+            <a:r>
+              <a:rPr sz="2400">
+                <a:solidFill>
+                  <a:srgbClr val="333333"/>
+                </a:solidFill>
+              </a:rPr>
+              <a:t>Documentos web inicialmente estáticos formados por texto plano.</a:t>
+            </a:r>
+            <a:endParaRPr sz="2400">
+              <a:solidFill>
+                <a:srgbClr val="333333"/>
+              </a:solidFill>
+            </a:endParaRPr>
+          </a:p>
+          <a:p>
+            <a:pPr lvl="0" marL="0" indent="0" algn="just">
+              <a:lnSpc>
+                <a:spcPct val="150000"/>
+              </a:lnSpc>
+              <a:buClrTx/>
+              <a:buSzTx/>
+              <a:buNone/>
+              <a:defRPr sz="1800">
+                <a:solidFill>
+                  <a:srgbClr val="000000"/>
+                </a:solidFill>
+              </a:defRPr>
+            </a:pPr>
+            <a:r>
+              <a:rPr sz="2400">
+                <a:solidFill>
+                  <a:srgbClr val="333333"/>
+                </a:solidFill>
+              </a:rPr>
+              <a:t>Con los años aparecieron lenguajes de programación, librerías y elementos que mejoraron las capacidades de la web.</a:t>
+            </a:r>
+          </a:p>
+        </p:txBody>
+      </p:sp>
+    </p:spTree>
+  </p:cSld>
+  <p:clrMapOvr>
+    <a:masterClrMapping/>
+  </p:clrMapOvr>
+  <p:transition spd="med" advClick="1"/>
+</p:sld>
+</file>
+
+<file path=ppt/slides/slide8.xml><?xml version="1.0" encoding="utf-8"?>
+<p:sld xmlns:a="http://schemas.openxmlformats.org/drawingml/2006/main" xmlns:r="http://schemas.openxmlformats.org/officeDocument/2006/relationships" xmlns:p="http://schemas.openxmlformats.org/presentationml/2006/main" showMasterSp="1" showMasterPhAnim="1">
+  <p:cSld>
+    <p:spTree>
+      <p:nvGrpSpPr>
+        <p:cNvPr id="1" name=""/>
+        <p:cNvGrpSpPr/>
+        <p:nvPr/>
+      </p:nvGrpSpPr>
+      <p:grpSpPr>
+        <a:xfrm>
+          <a:off x="0" y="0"/>
+          <a:ext cx="0" cy="0"/>
+          <a:chOff x="0" y="0"/>
+          <a:chExt cx="0" cy="0"/>
+        </a:xfrm>
+      </p:grpSpPr>
+      <p:sp>
+        <p:nvSpPr>
+          <p:cNvPr id="73" name="Shape 73"/>
+          <p:cNvSpPr/>
+          <p:nvPr>
+            <p:ph type="title"/>
+          </p:nvPr>
+        </p:nvSpPr>
+        <p:spPr>
+          <a:prstGeom prst="rect">
+            <a:avLst/>
+          </a:prstGeom>
+        </p:spPr>
+        <p:txBody>
+          <a:bodyPr/>
+          <a:lstStyle/>
+          <a:p>
+            <a:pPr lvl="0">
+              <a:defRPr sz="1800">
+                <a:solidFill>
+                  <a:srgbClr val="000000"/>
+                </a:solidFill>
+              </a:defRPr>
+            </a:pPr>
+            <a:r>
+              <a:rPr sz="2800">
+                <a:solidFill>
+                  <a:srgbClr val="FFFFFF"/>
+                </a:solidFill>
+              </a:rPr>
+              <a:t>La Web</a:t>
+            </a:r>
+          </a:p>
+        </p:txBody>
+      </p:sp>
+      <p:sp>
+        <p:nvSpPr>
+          <p:cNvPr id="74" name="Shape 74"/>
+          <p:cNvSpPr/>
+          <p:nvPr>
+            <p:ph type="body" idx="1"/>
+          </p:nvPr>
+        </p:nvSpPr>
+        <p:spPr>
+          <a:prstGeom prst="rect">
+            <a:avLst/>
+          </a:prstGeom>
+        </p:spPr>
+        <p:txBody>
+          <a:bodyPr lIns="0" tIns="0" rIns="0" bIns="0" anchor="ctr"/>
+          <a:lstStyle/>
+          <a:p>
+            <a:pPr lvl="0">
+              <a:lnSpc>
+                <a:spcPct val="150000"/>
+              </a:lnSpc>
+              <a:defRPr sz="1800">
+                <a:solidFill>
+                  <a:srgbClr val="000000"/>
+                </a:solidFill>
+              </a:defRPr>
+            </a:pPr>
+            <a:r>
+              <a:rPr b="1" sz="2600">
+                <a:solidFill>
+                  <a:srgbClr val="333333"/>
+                </a:solidFill>
+              </a:rPr>
+              <a:t>HyperText Markup Language (HTML)</a:t>
+            </a:r>
+            <a:endParaRPr b="1" sz="2600">
+              <a:solidFill>
+                <a:srgbClr val="333333"/>
+              </a:solidFill>
+            </a:endParaRPr>
+          </a:p>
+          <a:p>
+            <a:pPr lvl="0">
+              <a:lnSpc>
+                <a:spcPct val="150000"/>
+              </a:lnSpc>
+              <a:defRPr sz="1800">
+                <a:solidFill>
+                  <a:srgbClr val="000000"/>
+                </a:solidFill>
+              </a:defRPr>
+            </a:pPr>
+            <a:r>
+              <a:rPr b="1" sz="2600">
+                <a:solidFill>
+                  <a:srgbClr val="333333"/>
+                </a:solidFill>
+              </a:rPr>
+              <a:t>Cascading Style Sheets (CSS)</a:t>
+            </a:r>
+            <a:endParaRPr b="1" sz="2600">
+              <a:solidFill>
+                <a:srgbClr val="333333"/>
+              </a:solidFill>
+            </a:endParaRPr>
+          </a:p>
+          <a:p>
+            <a:pPr lvl="0">
+              <a:lnSpc>
+                <a:spcPct val="150000"/>
+              </a:lnSpc>
+              <a:defRPr sz="1800">
+                <a:solidFill>
+                  <a:srgbClr val="000000"/>
+                </a:solidFill>
+              </a:defRPr>
+            </a:pPr>
+            <a:r>
+              <a:rPr b="1" sz="2600">
+                <a:solidFill>
+                  <a:srgbClr val="333333"/>
+                </a:solidFill>
+              </a:rPr>
+              <a:t>JavaScript</a:t>
+            </a:r>
+            <a:endParaRPr b="1" sz="2600">
+              <a:solidFill>
+                <a:srgbClr val="333333"/>
+              </a:solidFill>
+            </a:endParaRPr>
+          </a:p>
+          <a:p>
+            <a:pPr lvl="0">
+              <a:lnSpc>
+                <a:spcPct val="150000"/>
+              </a:lnSpc>
+              <a:defRPr sz="1800">
+                <a:solidFill>
+                  <a:srgbClr val="000000"/>
+                </a:solidFill>
+              </a:defRPr>
+            </a:pPr>
+            <a:r>
+              <a:rPr b="1" sz="2600">
+                <a:solidFill>
+                  <a:srgbClr val="333333"/>
+                </a:solidFill>
+              </a:rPr>
+              <a:t>&lt;canvas&gt;</a:t>
+            </a:r>
+            <a:endParaRPr b="1" sz="2600">
+              <a:solidFill>
+                <a:srgbClr val="333333"/>
+              </a:solidFill>
+            </a:endParaRPr>
+          </a:p>
+          <a:p>
+            <a:pPr lvl="0">
+              <a:lnSpc>
+                <a:spcPct val="150000"/>
+              </a:lnSpc>
+              <a:defRPr sz="1800">
+                <a:solidFill>
+                  <a:srgbClr val="000000"/>
+                </a:solidFill>
+              </a:defRPr>
+            </a:pPr>
+            <a:r>
+              <a:rPr b="1" sz="2600">
+                <a:solidFill>
+                  <a:srgbClr val="333333"/>
+                </a:solidFill>
+              </a:rPr>
+              <a:t>CSS3</a:t>
+            </a:r>
+            <a:endParaRPr b="1" sz="2600">
+              <a:solidFill>
+                <a:srgbClr val="333333"/>
+              </a:solidFill>
+            </a:endParaRPr>
+          </a:p>
+          <a:p>
+            <a:pPr lvl="0">
+              <a:lnSpc>
+                <a:spcPct val="150000"/>
+              </a:lnSpc>
+              <a:defRPr sz="1800">
+                <a:solidFill>
+                  <a:srgbClr val="000000"/>
+                </a:solidFill>
+              </a:defRPr>
+            </a:pPr>
+            <a:r>
+              <a:rPr b="1" sz="2600">
+                <a:solidFill>
+                  <a:srgbClr val="333333"/>
+                </a:solidFill>
+              </a:rPr>
+              <a:t>WebGL</a:t>
+            </a:r>
+          </a:p>
+        </p:txBody>
+      </p:sp>
+    </p:spTree>
+  </p:cSld>
+  <p:clrMapOvr>
+    <a:masterClrMapping/>
+  </p:clrMapOvr>
+  <p:transition spd="med" advClick="1"/>
+</p:sld>
+</file>
+
+<file path=ppt/slides/slide9.xml><?xml version="1.0" encoding="utf-8"?>
+<p:sld xmlns:a="http://schemas.openxmlformats.org/drawingml/2006/main" xmlns:r="http://schemas.openxmlformats.org/officeDocument/2006/relationships" xmlns:p="http://schemas.openxmlformats.org/presentationml/2006/main" showMasterSp="1" showMasterPhAnim="1">
+  <p:cSld>
+    <p:spTree>
+      <p:nvGrpSpPr>
+        <p:cNvPr id="1" name=""/>
+        <p:cNvGrpSpPr/>
+        <p:nvPr/>
+      </p:nvGrpSpPr>
+      <p:grpSpPr>
+        <a:xfrm>
+          <a:off x="0" y="0"/>
+          <a:ext cx="0" cy="0"/>
+          <a:chOff x="0" y="0"/>
+          <a:chExt cx="0" cy="0"/>
+        </a:xfrm>
+      </p:grpSpPr>
+      <p:sp>
+        <p:nvSpPr>
+          <p:cNvPr id="76" name="Shape 76"/>
+          <p:cNvSpPr/>
+          <p:nvPr>
+            <p:ph type="title"/>
+          </p:nvPr>
+        </p:nvSpPr>
+        <p:spPr>
+          <a:prstGeom prst="rect">
+            <a:avLst/>
+          </a:prstGeom>
+        </p:spPr>
+        <p:txBody>
+          <a:bodyPr/>
+          <a:lstStyle/>
+          <a:p>
+            <a:pPr lvl="0">
+              <a:defRPr sz="1800">
+                <a:solidFill>
+                  <a:srgbClr val="000000"/>
+                </a:solidFill>
+              </a:defRPr>
+            </a:pPr>
+            <a:r>
+              <a:rPr sz="2800">
+                <a:solidFill>
+                  <a:srgbClr val="FFFFFF"/>
+                </a:solidFill>
+              </a:rPr>
+              <a:t>Graphics Pipeline</a:t>
+            </a:r>
+          </a:p>
+        </p:txBody>
+      </p:sp>
+      <p:sp>
+        <p:nvSpPr>
+          <p:cNvPr id="77" name="Shape 77"/>
+          <p:cNvSpPr/>
+          <p:nvPr>
+            <p:ph type="body" idx="1"/>
+          </p:nvPr>
+        </p:nvSpPr>
+        <p:spPr>
+          <a:prstGeom prst="rect">
+            <a:avLst/>
+          </a:prstGeom>
+        </p:spPr>
+        <p:txBody>
+          <a:bodyPr/>
+          <a:lstStyle/>
+          <a:p>
+            <a:pPr lvl="0"/>
+          </a:p>
+        </p:txBody>
+      </p:sp>
     </p:spTree>
   </p:cSld>
   <p:clrMapOvr>
@@ -4602,14 +5585,14 @@
     </a:clrScheme>
     <a:fontScheme name="Default">
       <a:majorFont>
+        <a:latin typeface="Avenir Roman"/>
+        <a:ea typeface="Avenir Roman"/>
+        <a:cs typeface="Avenir Roman"/>
+      </a:majorFont>
+      <a:minorFont>
         <a:latin typeface="Helvetica"/>
         <a:ea typeface="Helvetica"/>
         <a:cs typeface="Helvetica"/>
-      </a:majorFont>
-      <a:minorFont>
-        <a:latin typeface="Avenir Roman"/>
-        <a:ea typeface="Avenir Roman"/>
-        <a:cs typeface="Avenir Roman"/>
       </a:minorFont>
     </a:fontScheme>
     <a:fmtScheme name="Default">
@@ -4691,13 +5674,7 @@
           <a:effectLst/>
         </a:effectStyle>
         <a:effectStyle>
-          <a:effectLst>
-            <a:outerShdw sx="100000" sy="100000" kx="0" ky="0" algn="b" rotWithShape="0" blurRad="38100" dist="20000" dir="5400000">
-              <a:srgbClr val="000000">
-                <a:alpha val="38000"/>
-              </a:srgbClr>
-            </a:outerShdw>
-          </a:effectLst>
+          <a:effectLst/>
         </a:effectStyle>
       </a:effectStyleLst>
       <a:bgFillStyleLst>
@@ -4756,7 +5733,7 @@
     <a:spDef>
       <a:spPr>
         <a:solidFill>
-          <a:srgbClr val="BAB9A0"/>
+          <a:srgbClr val="FFFFFF"/>
         </a:solidFill>
         <a:ln w="25400" cap="flat">
           <a:solidFill>
@@ -4767,7 +5744,7 @@
         </a:ln>
         <a:effectLst/>
       </a:spPr>
-      <a:bodyPr rot="0" spcFirstLastPara="1" vertOverflow="overflow" horzOverflow="overflow" vert="horz" wrap="square" lIns="45719" tIns="45719" rIns="45719" bIns="45719" numCol="1" spcCol="38100" rtlCol="0" anchor="t" upright="0">
+      <a:bodyPr rot="0" spcFirstLastPara="1" vertOverflow="overflow" horzOverflow="overflow" vert="horz" wrap="square" lIns="45718" tIns="45718" rIns="45718" bIns="45718" numCol="1" spcCol="38100" rtlCol="0" anchor="t" upright="0">
         <a:spAutoFit/>
       </a:bodyPr>
       <a:lstStyle>
@@ -4795,10 +5772,10 @@
             </a:solidFill>
             <a:effectLst/>
             <a:uFillTx/>
-            <a:latin typeface="Verdana"/>
-            <a:ea typeface="Verdana"/>
-            <a:cs typeface="Verdana"/>
-            <a:sym typeface="Verdana"/>
+            <a:latin typeface="+mj-lt"/>
+            <a:ea typeface="+mj-ea"/>
+            <a:cs typeface="+mj-cs"/>
+            <a:sym typeface="Avenir Roman"/>
           </a:defRPr>
         </a:defPPr>
         <a:lvl1pPr marL="0" marR="0" indent="0" algn="l" defTabSz="914400" rtl="0" fontAlgn="auto" latinLnBrk="1" hangingPunct="0">
@@ -5053,13 +6030,7 @@
           <a:prstDash val="solid"/>
           <a:bevel/>
         </a:ln>
-        <a:effectLst>
-          <a:outerShdw sx="100000" sy="100000" kx="0" ky="0" algn="b" rotWithShape="0" blurRad="38100" dist="20000" dir="5400000">
-            <a:srgbClr val="000000">
-              <a:alpha val="38000"/>
-            </a:srgbClr>
-          </a:outerShdw>
-        </a:effectLst>
+        <a:effectLst/>
       </a:spPr>
       <a:bodyPr rot="0" spcFirstLastPara="1" vertOverflow="overflow" horzOverflow="overflow" vert="horz" wrap="square" lIns="91439" tIns="45719" rIns="91439" bIns="45719" numCol="1" spcCol="38100" rtlCol="0" anchor="t" upright="0">
         <a:noAutofit/>
@@ -5342,7 +6313,7 @@
         </a:ln>
         <a:effectLst/>
       </a:spPr>
-      <a:bodyPr rot="0" spcFirstLastPara="1" vertOverflow="overflow" horzOverflow="overflow" vert="horz" wrap="square" lIns="45719" tIns="45719" rIns="45719" bIns="45719" numCol="1" spcCol="38100" rtlCol="0" anchor="t" upright="0">
+      <a:bodyPr rot="0" spcFirstLastPara="1" vertOverflow="overflow" horzOverflow="overflow" vert="horz" wrap="square" lIns="45718" tIns="45718" rIns="45718" bIns="45718" numCol="1" spcCol="38100" rtlCol="0" anchor="t" upright="0">
         <a:spAutoFit/>
       </a:bodyPr>
       <a:lstStyle>
@@ -5370,10 +6341,10 @@
             </a:solidFill>
             <a:effectLst/>
             <a:uFillTx/>
-            <a:latin typeface="Verdana"/>
-            <a:ea typeface="Verdana"/>
-            <a:cs typeface="Verdana"/>
-            <a:sym typeface="Verdana"/>
+            <a:latin typeface="+mj-lt"/>
+            <a:ea typeface="+mj-ea"/>
+            <a:cs typeface="+mj-cs"/>
+            <a:sym typeface="Avenir Roman"/>
           </a:defRPr>
         </a:defPPr>
         <a:lvl1pPr marL="0" marR="0" indent="0" algn="l" defTabSz="914400" rtl="0" fontAlgn="auto" latinLnBrk="1" hangingPunct="0">
@@ -5665,14 +6636,14 @@
     </a:clrScheme>
     <a:fontScheme name="Default">
       <a:majorFont>
+        <a:latin typeface="Avenir Roman"/>
+        <a:ea typeface="Avenir Roman"/>
+        <a:cs typeface="Avenir Roman"/>
+      </a:majorFont>
+      <a:minorFont>
         <a:latin typeface="Helvetica"/>
         <a:ea typeface="Helvetica"/>
         <a:cs typeface="Helvetica"/>
-      </a:majorFont>
-      <a:minorFont>
-        <a:latin typeface="Avenir Roman"/>
-        <a:ea typeface="Avenir Roman"/>
-        <a:cs typeface="Avenir Roman"/>
       </a:minorFont>
     </a:fontScheme>
     <a:fmtScheme name="Default">
@@ -5754,13 +6725,7 @@
           <a:effectLst/>
         </a:effectStyle>
         <a:effectStyle>
-          <a:effectLst>
-            <a:outerShdw sx="100000" sy="100000" kx="0" ky="0" algn="b" rotWithShape="0" blurRad="38100" dist="20000" dir="5400000">
-              <a:srgbClr val="000000">
-                <a:alpha val="38000"/>
-              </a:srgbClr>
-            </a:outerShdw>
-          </a:effectLst>
+          <a:effectLst/>
         </a:effectStyle>
       </a:effectStyleLst>
       <a:bgFillStyleLst>
@@ -5819,7 +6784,7 @@
     <a:spDef>
       <a:spPr>
         <a:solidFill>
-          <a:srgbClr val="BAB9A0"/>
+          <a:srgbClr val="FFFFFF"/>
         </a:solidFill>
         <a:ln w="25400" cap="flat">
           <a:solidFill>
@@ -5830,7 +6795,7 @@
         </a:ln>
         <a:effectLst/>
       </a:spPr>
-      <a:bodyPr rot="0" spcFirstLastPara="1" vertOverflow="overflow" horzOverflow="overflow" vert="horz" wrap="square" lIns="45719" tIns="45719" rIns="45719" bIns="45719" numCol="1" spcCol="38100" rtlCol="0" anchor="t" upright="0">
+      <a:bodyPr rot="0" spcFirstLastPara="1" vertOverflow="overflow" horzOverflow="overflow" vert="horz" wrap="square" lIns="45718" tIns="45718" rIns="45718" bIns="45718" numCol="1" spcCol="38100" rtlCol="0" anchor="t" upright="0">
         <a:spAutoFit/>
       </a:bodyPr>
       <a:lstStyle>
@@ -5858,10 +6823,10 @@
             </a:solidFill>
             <a:effectLst/>
             <a:uFillTx/>
-            <a:latin typeface="Verdana"/>
-            <a:ea typeface="Verdana"/>
-            <a:cs typeface="Verdana"/>
-            <a:sym typeface="Verdana"/>
+            <a:latin typeface="+mj-lt"/>
+            <a:ea typeface="+mj-ea"/>
+            <a:cs typeface="+mj-cs"/>
+            <a:sym typeface="Avenir Roman"/>
           </a:defRPr>
         </a:defPPr>
         <a:lvl1pPr marL="0" marR="0" indent="0" algn="l" defTabSz="914400" rtl="0" fontAlgn="auto" latinLnBrk="1" hangingPunct="0">
@@ -6116,13 +7081,7 @@
           <a:prstDash val="solid"/>
           <a:bevel/>
         </a:ln>
-        <a:effectLst>
-          <a:outerShdw sx="100000" sy="100000" kx="0" ky="0" algn="b" rotWithShape="0" blurRad="38100" dist="20000" dir="5400000">
-            <a:srgbClr val="000000">
-              <a:alpha val="38000"/>
-            </a:srgbClr>
-          </a:outerShdw>
-        </a:effectLst>
+        <a:effectLst/>
       </a:spPr>
       <a:bodyPr rot="0" spcFirstLastPara="1" vertOverflow="overflow" horzOverflow="overflow" vert="horz" wrap="square" lIns="91439" tIns="45719" rIns="91439" bIns="45719" numCol="1" spcCol="38100" rtlCol="0" anchor="t" upright="0">
         <a:noAutofit/>
@@ -6405,7 +7364,7 @@
         </a:ln>
         <a:effectLst/>
       </a:spPr>
-      <a:bodyPr rot="0" spcFirstLastPara="1" vertOverflow="overflow" horzOverflow="overflow" vert="horz" wrap="square" lIns="45719" tIns="45719" rIns="45719" bIns="45719" numCol="1" spcCol="38100" rtlCol="0" anchor="t" upright="0">
+      <a:bodyPr rot="0" spcFirstLastPara="1" vertOverflow="overflow" horzOverflow="overflow" vert="horz" wrap="square" lIns="45718" tIns="45718" rIns="45718" bIns="45718" numCol="1" spcCol="38100" rtlCol="0" anchor="t" upright="0">
         <a:spAutoFit/>
       </a:bodyPr>
       <a:lstStyle>
@@ -6433,10 +7392,10 @@
             </a:solidFill>
             <a:effectLst/>
             <a:uFillTx/>
-            <a:latin typeface="Verdana"/>
-            <a:ea typeface="Verdana"/>
-            <a:cs typeface="Verdana"/>
-            <a:sym typeface="Verdana"/>
+            <a:latin typeface="+mj-lt"/>
+            <a:ea typeface="+mj-ea"/>
+            <a:cs typeface="+mj-cs"/>
+            <a:sym typeface="Avenir Roman"/>
           </a:defRPr>
         </a:defPPr>
         <a:lvl1pPr marL="0" marR="0" indent="0" algn="l" defTabSz="914400" rtl="0" fontAlgn="auto" latinLnBrk="1" hangingPunct="0">

</xml_diff>

<commit_message>
Graphic Pipeline hecha de la presentacion
</commit_message>
<xml_diff>
--- a/Docs/presentacion.pptx
+++ b/Docs/presentacion.pptx
@@ -18,6 +18,12 @@
     <p:sldId id="263" r:id="rId15"/>
     <p:sldId id="264" r:id="rId16"/>
     <p:sldId id="265" r:id="rId17"/>
+    <p:sldId id="266" r:id="rId18"/>
+    <p:sldId id="267" r:id="rId19"/>
+    <p:sldId id="268" r:id="rId20"/>
+    <p:sldId id="269" r:id="rId21"/>
+    <p:sldId id="270" r:id="rId22"/>
+    <p:sldId id="271" r:id="rId23"/>
   </p:sldIdLst>
   <p:sldSz cx="9144000" cy="6858000"/>
   <p:notesSz cx="6858000" cy="9144000"/>
@@ -30,7 +36,7 @@
         <a:latin typeface="+mj-lt"/>
         <a:ea typeface="+mj-ea"/>
         <a:cs typeface="+mj-cs"/>
-        <a:sym typeface="Avenir Roman"/>
+        <a:sym typeface="Helvetica"/>
       </a:defRPr>
     </a:lvl1pPr>
     <a:lvl2pPr>
@@ -41,7 +47,7 @@
         <a:latin typeface="+mj-lt"/>
         <a:ea typeface="+mj-ea"/>
         <a:cs typeface="+mj-cs"/>
-        <a:sym typeface="Avenir Roman"/>
+        <a:sym typeface="Helvetica"/>
       </a:defRPr>
     </a:lvl2pPr>
     <a:lvl3pPr>
@@ -52,7 +58,7 @@
         <a:latin typeface="+mj-lt"/>
         <a:ea typeface="+mj-ea"/>
         <a:cs typeface="+mj-cs"/>
-        <a:sym typeface="Avenir Roman"/>
+        <a:sym typeface="Helvetica"/>
       </a:defRPr>
     </a:lvl3pPr>
     <a:lvl4pPr>
@@ -63,7 +69,7 @@
         <a:latin typeface="+mj-lt"/>
         <a:ea typeface="+mj-ea"/>
         <a:cs typeface="+mj-cs"/>
-        <a:sym typeface="Avenir Roman"/>
+        <a:sym typeface="Helvetica"/>
       </a:defRPr>
     </a:lvl4pPr>
     <a:lvl5pPr>
@@ -74,7 +80,7 @@
         <a:latin typeface="+mj-lt"/>
         <a:ea typeface="+mj-ea"/>
         <a:cs typeface="+mj-cs"/>
-        <a:sym typeface="Avenir Roman"/>
+        <a:sym typeface="Helvetica"/>
       </a:defRPr>
     </a:lvl5pPr>
     <a:lvl6pPr>
@@ -85,7 +91,7 @@
         <a:latin typeface="+mj-lt"/>
         <a:ea typeface="+mj-ea"/>
         <a:cs typeface="+mj-cs"/>
-        <a:sym typeface="Avenir Roman"/>
+        <a:sym typeface="Helvetica"/>
       </a:defRPr>
     </a:lvl6pPr>
     <a:lvl7pPr>
@@ -96,7 +102,7 @@
         <a:latin typeface="+mj-lt"/>
         <a:ea typeface="+mj-ea"/>
         <a:cs typeface="+mj-cs"/>
-        <a:sym typeface="Avenir Roman"/>
+        <a:sym typeface="Helvetica"/>
       </a:defRPr>
     </a:lvl7pPr>
     <a:lvl8pPr>
@@ -107,7 +113,7 @@
         <a:latin typeface="+mj-lt"/>
         <a:ea typeface="+mj-ea"/>
         <a:cs typeface="+mj-cs"/>
-        <a:sym typeface="Avenir Roman"/>
+        <a:sym typeface="Helvetica"/>
       </a:defRPr>
     </a:lvl8pPr>
     <a:lvl9pPr>
@@ -118,7 +124,7 @@
         <a:latin typeface="+mj-lt"/>
         <a:ea typeface="+mj-ea"/>
         <a:cs typeface="+mj-cs"/>
-        <a:sym typeface="Avenir Roman"/>
+        <a:sym typeface="Helvetica"/>
       </a:defRPr>
     </a:lvl9pPr>
   </p:defaultTextStyle>
@@ -205,9 +211,9 @@
         <a:spcPct val="125000"/>
       </a:lnSpc>
       <a:defRPr sz="2400">
-        <a:latin typeface="+mj-lt"/>
-        <a:ea typeface="+mj-ea"/>
-        <a:cs typeface="+mj-cs"/>
+        <a:latin typeface="+mn-lt"/>
+        <a:ea typeface="+mn-ea"/>
+        <a:cs typeface="+mn-cs"/>
         <a:sym typeface="Avenir Roman"/>
       </a:defRPr>
     </a:lvl1pPr>
@@ -216,9 +222,9 @@
         <a:spcPct val="125000"/>
       </a:lnSpc>
       <a:defRPr sz="2400">
-        <a:latin typeface="+mj-lt"/>
-        <a:ea typeface="+mj-ea"/>
-        <a:cs typeface="+mj-cs"/>
+        <a:latin typeface="+mn-lt"/>
+        <a:ea typeface="+mn-ea"/>
+        <a:cs typeface="+mn-cs"/>
         <a:sym typeface="Avenir Roman"/>
       </a:defRPr>
     </a:lvl2pPr>
@@ -227,9 +233,9 @@
         <a:spcPct val="125000"/>
       </a:lnSpc>
       <a:defRPr sz="2400">
-        <a:latin typeface="+mj-lt"/>
-        <a:ea typeface="+mj-ea"/>
-        <a:cs typeface="+mj-cs"/>
+        <a:latin typeface="+mn-lt"/>
+        <a:ea typeface="+mn-ea"/>
+        <a:cs typeface="+mn-cs"/>
         <a:sym typeface="Avenir Roman"/>
       </a:defRPr>
     </a:lvl3pPr>
@@ -238,9 +244,9 @@
         <a:spcPct val="125000"/>
       </a:lnSpc>
       <a:defRPr sz="2400">
-        <a:latin typeface="+mj-lt"/>
-        <a:ea typeface="+mj-ea"/>
-        <a:cs typeface="+mj-cs"/>
+        <a:latin typeface="+mn-lt"/>
+        <a:ea typeface="+mn-ea"/>
+        <a:cs typeface="+mn-cs"/>
         <a:sym typeface="Avenir Roman"/>
       </a:defRPr>
     </a:lvl4pPr>
@@ -249,9 +255,9 @@
         <a:spcPct val="125000"/>
       </a:lnSpc>
       <a:defRPr sz="2400">
-        <a:latin typeface="+mj-lt"/>
-        <a:ea typeface="+mj-ea"/>
-        <a:cs typeface="+mj-cs"/>
+        <a:latin typeface="+mn-lt"/>
+        <a:ea typeface="+mn-ea"/>
+        <a:cs typeface="+mn-cs"/>
         <a:sym typeface="Avenir Roman"/>
       </a:defRPr>
     </a:lvl5pPr>
@@ -260,9 +266,9 @@
         <a:spcPct val="125000"/>
       </a:lnSpc>
       <a:defRPr sz="2400">
-        <a:latin typeface="+mj-lt"/>
-        <a:ea typeface="+mj-ea"/>
-        <a:cs typeface="+mj-cs"/>
+        <a:latin typeface="+mn-lt"/>
+        <a:ea typeface="+mn-ea"/>
+        <a:cs typeface="+mn-cs"/>
         <a:sym typeface="Avenir Roman"/>
       </a:defRPr>
     </a:lvl6pPr>
@@ -271,9 +277,9 @@
         <a:spcPct val="125000"/>
       </a:lnSpc>
       <a:defRPr sz="2400">
-        <a:latin typeface="+mj-lt"/>
-        <a:ea typeface="+mj-ea"/>
-        <a:cs typeface="+mj-cs"/>
+        <a:latin typeface="+mn-lt"/>
+        <a:ea typeface="+mn-ea"/>
+        <a:cs typeface="+mn-cs"/>
         <a:sym typeface="Avenir Roman"/>
       </a:defRPr>
     </a:lvl7pPr>
@@ -282,9 +288,9 @@
         <a:spcPct val="125000"/>
       </a:lnSpc>
       <a:defRPr sz="2400">
-        <a:latin typeface="+mj-lt"/>
-        <a:ea typeface="+mj-ea"/>
-        <a:cs typeface="+mj-cs"/>
+        <a:latin typeface="+mn-lt"/>
+        <a:ea typeface="+mn-ea"/>
+        <a:cs typeface="+mn-cs"/>
         <a:sym typeface="Avenir Roman"/>
       </a:defRPr>
     </a:lvl8pPr>
@@ -293,9 +299,9 @@
         <a:spcPct val="125000"/>
       </a:lnSpc>
       <a:defRPr sz="2400">
-        <a:latin typeface="+mj-lt"/>
-        <a:ea typeface="+mj-ea"/>
-        <a:cs typeface="+mj-cs"/>
+        <a:latin typeface="+mn-lt"/>
+        <a:ea typeface="+mn-ea"/>
+        <a:cs typeface="+mn-cs"/>
         <a:sym typeface="Avenir Roman"/>
       </a:defRPr>
     </a:lvl9pPr>
@@ -548,7 +554,7 @@
         <p:spPr>
           <a:xfrm>
             <a:off x="1792288" y="4800600"/>
-            <a:ext cx="5486402" cy="566738"/>
+            <a:ext cx="5486403" cy="566738"/>
           </a:xfrm>
           <a:prstGeom prst="rect">
             <a:avLst/>
@@ -596,7 +602,7 @@
         <p:spPr>
           <a:xfrm>
             <a:off x="1792288" y="5367337"/>
-            <a:ext cx="5486402" cy="804864"/>
+            <a:ext cx="5486403" cy="804865"/>
           </a:xfrm>
           <a:prstGeom prst="rect">
             <a:avLst/>
@@ -1616,7 +1622,7 @@
         <p:spPr>
           <a:xfrm>
             <a:off x="722312" y="2906713"/>
-            <a:ext cx="7772401" cy="1500189"/>
+            <a:ext cx="7772401" cy="1500190"/>
           </a:xfrm>
           <a:prstGeom prst="rect">
             <a:avLst/>
@@ -2094,7 +2100,7 @@
         <p:spPr>
           <a:xfrm>
             <a:off x="457200" y="1435464"/>
-            <a:ext cx="4040188" cy="739413"/>
+            <a:ext cx="4040188" cy="739414"/>
           </a:xfrm>
           <a:prstGeom prst="rect">
             <a:avLst/>
@@ -2435,7 +2441,7 @@
         <p:spPr>
           <a:xfrm>
             <a:off x="457200" y="0"/>
-            <a:ext cx="3008315" cy="1435100"/>
+            <a:ext cx="3008316" cy="1435100"/>
           </a:xfrm>
           <a:prstGeom prst="rect">
             <a:avLst/>
@@ -2688,10 +2694,10 @@
         </p:nvGrpSpPr>
         <p:grpSpPr>
           <a:xfrm>
-            <a:off x="-31752" y="-1"/>
-            <a:ext cx="9178135" cy="6924676"/>
+            <a:off x="-31753" y="-2"/>
+            <a:ext cx="9178138" cy="6924677"/>
             <a:chOff x="0" y="0"/>
-            <a:chExt cx="9178133" cy="6924675"/>
+            <a:chExt cx="9178137" cy="6924676"/>
           </a:xfrm>
         </p:grpSpPr>
         <p:sp>
@@ -2702,8 +2708,8 @@
           </p:nvSpPr>
           <p:spPr>
             <a:xfrm>
-              <a:off x="7937" y="7937"/>
-              <a:ext cx="9167815" cy="6843713"/>
+              <a:off x="7936" y="7936"/>
+              <a:ext cx="9167819" cy="6843715"/>
             </a:xfrm>
             <a:prstGeom prst="rect">
               <a:avLst/>
@@ -2745,7 +2751,7 @@
           <p:spPr>
             <a:xfrm>
               <a:off x="31748" y="-1"/>
-              <a:ext cx="1179516" cy="6880226"/>
+              <a:ext cx="1179517" cy="6880226"/>
             </a:xfrm>
             <a:prstGeom prst="rect">
               <a:avLst/>
@@ -2796,7 +2802,7 @@
           <p:spPr>
             <a:xfrm>
               <a:off x="1135062" y="0"/>
-              <a:ext cx="79377" cy="6924675"/>
+              <a:ext cx="79378" cy="6924676"/>
             </a:xfrm>
             <a:prstGeom prst="rect">
               <a:avLst/>
@@ -2844,8 +2850,8 @@
           </p:blipFill>
           <p:spPr>
             <a:xfrm>
-              <a:off x="31749" y="2706687"/>
-              <a:ext cx="9144004" cy="790577"/>
+              <a:off x="31748" y="2706687"/>
+              <a:ext cx="9144008" cy="790578"/>
             </a:xfrm>
             <a:prstGeom prst="rect">
               <a:avLst/>
@@ -2865,8 +2871,8 @@
           </p:nvSpPr>
           <p:spPr>
             <a:xfrm rot="5400000">
-              <a:off x="5118101" y="-628652"/>
-              <a:ext cx="74614" cy="8040691"/>
+              <a:off x="5118102" y="-628653"/>
+              <a:ext cx="74615" cy="8040694"/>
             </a:xfrm>
             <a:prstGeom prst="rect">
               <a:avLst/>
@@ -2905,8 +2911,8 @@
           </p:nvSpPr>
           <p:spPr>
             <a:xfrm rot="5400000">
-              <a:off x="5118101" y="-1352552"/>
-              <a:ext cx="74614" cy="8045453"/>
+              <a:off x="5118102" y="-1352553"/>
+              <a:ext cx="74615" cy="8045455"/>
             </a:xfrm>
             <a:prstGeom prst="rect">
               <a:avLst/>
@@ -2946,7 +2952,7 @@
           <p:spPr>
             <a:xfrm>
               <a:off x="-1" y="-1"/>
-              <a:ext cx="74614" cy="6892926"/>
+              <a:ext cx="74615" cy="6892926"/>
             </a:xfrm>
             <a:prstGeom prst="rect">
               <a:avLst/>
@@ -2986,7 +2992,7 @@
           <p:spPr>
             <a:xfrm>
               <a:off x="688975" y="3362325"/>
-              <a:ext cx="446089" cy="0"/>
+              <a:ext cx="446090" cy="1"/>
             </a:xfrm>
             <a:prstGeom prst="line">
               <a:avLst/>
@@ -3012,10 +3018,6 @@
                   <a:solidFill>
                     <a:srgbClr val="000000"/>
                   </a:solidFill>
-                  <a:latin typeface="+mn-lt"/>
-                  <a:ea typeface="+mn-ea"/>
-                  <a:cs typeface="+mn-cs"/>
-                  <a:sym typeface="Helvetica"/>
                 </a:defRPr>
               </a:pPr>
             </a:p>
@@ -3030,7 +3032,7 @@
           <p:spPr>
             <a:xfrm flipV="1">
               <a:off x="74611" y="3359150"/>
-              <a:ext cx="365127" cy="1589"/>
+              <a:ext cx="365128" cy="1590"/>
             </a:xfrm>
             <a:prstGeom prst="line">
               <a:avLst/>
@@ -3056,10 +3058,6 @@
                   <a:solidFill>
                     <a:srgbClr val="000000"/>
                   </a:solidFill>
-                  <a:latin typeface="+mn-lt"/>
-                  <a:ea typeface="+mn-ea"/>
-                  <a:cs typeface="+mn-cs"/>
-                  <a:sym typeface="Helvetica"/>
                 </a:defRPr>
               </a:pPr>
             </a:p>
@@ -3074,7 +3072,7 @@
           <p:spPr>
             <a:xfrm>
               <a:off x="436562" y="3357562"/>
-              <a:ext cx="103189" cy="136527"/>
+              <a:ext cx="103190" cy="136528"/>
             </a:xfrm>
             <a:custGeom>
               <a:avLst/>
@@ -3173,8 +3171,8 @@
           </p:nvSpPr>
           <p:spPr>
             <a:xfrm>
-              <a:off x="579262" y="3362325"/>
-              <a:ext cx="108132" cy="133350"/>
+              <a:off x="579263" y="3362325"/>
+              <a:ext cx="108132" cy="133351"/>
             </a:xfrm>
             <a:custGeom>
               <a:avLst/>
@@ -3464,7 +3462,7 @@
         <p:spPr>
           <a:xfrm>
             <a:off x="7129463" y="6416776"/>
-            <a:ext cx="1905002" cy="288822"/>
+            <a:ext cx="1905003" cy="288820"/>
           </a:xfrm>
           <a:prstGeom prst="rect">
             <a:avLst/>
@@ -3647,7 +3645,7 @@
           <a:sym typeface="Verdana"/>
         </a:defRPr>
       </a:lvl2pPr>
-      <a:lvl3pPr marL="1184562" indent="-270162" algn="ctr">
+      <a:lvl3pPr marL="1184561" indent="-270161" algn="ctr">
         <a:spcBef>
           <a:spcPts val="600"/>
         </a:spcBef>
@@ -3663,7 +3661,7 @@
           <a:sym typeface="Verdana"/>
         </a:defRPr>
       </a:lvl3pPr>
-      <a:lvl4pPr marL="1668778" indent="-297178" algn="ctr">
+      <a:lvl4pPr marL="1668777" indent="-297177" algn="ctr">
         <a:spcBef>
           <a:spcPts val="600"/>
         </a:spcBef>
@@ -3679,7 +3677,7 @@
           <a:sym typeface="Verdana"/>
         </a:defRPr>
       </a:lvl4pPr>
-      <a:lvl5pPr marL="2125978" indent="-297178" algn="ctr">
+      <a:lvl5pPr marL="2125977" indent="-297177" algn="ctr">
         <a:spcBef>
           <a:spcPts val="600"/>
         </a:spcBef>
@@ -3695,7 +3693,7 @@
           <a:sym typeface="Verdana"/>
         </a:defRPr>
       </a:lvl5pPr>
-      <a:lvl6pPr marL="2583178" indent="-297178" algn="ctr">
+      <a:lvl6pPr marL="2583177" indent="-297177" algn="ctr">
         <a:spcBef>
           <a:spcPts val="600"/>
         </a:spcBef>
@@ -3711,7 +3709,7 @@
           <a:sym typeface="Verdana"/>
         </a:defRPr>
       </a:lvl6pPr>
-      <a:lvl7pPr marL="3040378" indent="-297178" algn="ctr">
+      <a:lvl7pPr marL="3040377" indent="-297177" algn="ctr">
         <a:spcBef>
           <a:spcPts val="600"/>
         </a:spcBef>
@@ -3727,7 +3725,7 @@
           <a:sym typeface="Verdana"/>
         </a:defRPr>
       </a:lvl7pPr>
-      <a:lvl8pPr marL="3497579" indent="-297178" algn="ctr">
+      <a:lvl8pPr marL="3497579" indent="-297177" algn="ctr">
         <a:spcBef>
           <a:spcPts val="600"/>
         </a:spcBef>
@@ -4121,6 +4119,1141 @@
 <file path=ppt/slides/slide10.xml><?xml version="1.0" encoding="utf-8"?>
 <p:sld xmlns:a="http://schemas.openxmlformats.org/drawingml/2006/main" xmlns:r="http://schemas.openxmlformats.org/officeDocument/2006/relationships" xmlns:p="http://schemas.openxmlformats.org/presentationml/2006/main" showMasterSp="1" showMasterPhAnim="1">
   <p:cSld>
+    <p:spTree>
+      <p:nvGrpSpPr>
+        <p:cNvPr id="1" name=""/>
+        <p:cNvGrpSpPr/>
+        <p:nvPr/>
+      </p:nvGrpSpPr>
+      <p:grpSpPr>
+        <a:xfrm>
+          <a:off x="0" y="0"/>
+          <a:ext cx="0" cy="0"/>
+          <a:chOff x="0" y="0"/>
+          <a:chExt cx="0" cy="0"/>
+        </a:xfrm>
+      </p:grpSpPr>
+      <p:sp>
+        <p:nvSpPr>
+          <p:cNvPr id="78" name="Shape 78"/>
+          <p:cNvSpPr/>
+          <p:nvPr>
+            <p:ph type="title"/>
+          </p:nvPr>
+        </p:nvSpPr>
+        <p:spPr>
+          <a:xfrm>
+            <a:off x="685800" y="2857500"/>
+            <a:ext cx="8458200" cy="1143000"/>
+          </a:xfrm>
+          <a:prstGeom prst="rect">
+            <a:avLst/>
+          </a:prstGeom>
+        </p:spPr>
+        <p:txBody>
+          <a:bodyPr lIns="0" tIns="0" rIns="0" bIns="0"/>
+          <a:lstStyle>
+            <a:lvl1pPr>
+              <a:defRPr>
+                <a:solidFill>
+                  <a:srgbClr val="333333"/>
+                </a:solidFill>
+              </a:defRPr>
+            </a:lvl1pPr>
+          </a:lstStyle>
+          <a:p>
+            <a:pPr lvl="0">
+              <a:defRPr sz="1800">
+                <a:solidFill>
+                  <a:srgbClr val="000000"/>
+                </a:solidFill>
+              </a:defRPr>
+            </a:pPr>
+            <a:r>
+              <a:rPr sz="2800">
+                <a:solidFill>
+                  <a:srgbClr val="333333"/>
+                </a:solidFill>
+              </a:rPr>
+              <a:t>3. Graphics Pipeline</a:t>
+            </a:r>
+          </a:p>
+        </p:txBody>
+      </p:sp>
+    </p:spTree>
+  </p:cSld>
+  <p:clrMapOvr>
+    <a:masterClrMapping/>
+  </p:clrMapOvr>
+  <p:transition spd="med" advClick="1"/>
+</p:sld>
+</file>
+
+<file path=ppt/slides/slide11.xml><?xml version="1.0" encoding="utf-8"?>
+<p:sld xmlns:a="http://schemas.openxmlformats.org/drawingml/2006/main" xmlns:r="http://schemas.openxmlformats.org/officeDocument/2006/relationships" xmlns:p="http://schemas.openxmlformats.org/presentationml/2006/main" showMasterSp="1" showMasterPhAnim="1">
+  <p:cSld>
+    <p:spTree>
+      <p:nvGrpSpPr>
+        <p:cNvPr id="1" name=""/>
+        <p:cNvGrpSpPr/>
+        <p:nvPr/>
+      </p:nvGrpSpPr>
+      <p:grpSpPr>
+        <a:xfrm>
+          <a:off x="0" y="0"/>
+          <a:ext cx="0" cy="0"/>
+          <a:chOff x="0" y="0"/>
+          <a:chExt cx="0" cy="0"/>
+        </a:xfrm>
+      </p:grpSpPr>
+      <p:sp>
+        <p:nvSpPr>
+          <p:cNvPr id="80" name="Shape 80"/>
+          <p:cNvSpPr/>
+          <p:nvPr>
+            <p:ph type="title"/>
+          </p:nvPr>
+        </p:nvSpPr>
+        <p:spPr>
+          <a:prstGeom prst="rect">
+            <a:avLst/>
+          </a:prstGeom>
+        </p:spPr>
+        <p:txBody>
+          <a:bodyPr lIns="0" tIns="0" rIns="0" bIns="0">
+            <a:normAutofit fontScale="100000" lnSpcReduction="0"/>
+          </a:bodyPr>
+          <a:lstStyle/>
+          <a:p>
+            <a:pPr lvl="0">
+              <a:defRPr sz="1800">
+                <a:solidFill>
+                  <a:srgbClr val="000000"/>
+                </a:solidFill>
+              </a:defRPr>
+            </a:pPr>
+            <a:r>
+              <a:rPr sz="2800">
+                <a:solidFill>
+                  <a:srgbClr val="FFFFFF"/>
+                </a:solidFill>
+              </a:rPr>
+              <a:t>Graphics Pipeline</a:t>
+            </a:r>
+          </a:p>
+        </p:txBody>
+      </p:sp>
+      <p:sp>
+        <p:nvSpPr>
+          <p:cNvPr id="81" name="Shape 81"/>
+          <p:cNvSpPr/>
+          <p:nvPr>
+            <p:ph type="body" idx="1"/>
+          </p:nvPr>
+        </p:nvSpPr>
+        <p:spPr>
+          <a:prstGeom prst="rect">
+            <a:avLst/>
+          </a:prstGeom>
+        </p:spPr>
+        <p:txBody>
+          <a:bodyPr lIns="0" tIns="0" rIns="0" bIns="0">
+            <a:normAutofit fontScale="100000" lnSpcReduction="0"/>
+          </a:bodyPr>
+          <a:lstStyle/>
+          <a:p>
+            <a:pPr lvl="0" marL="0" indent="0">
+              <a:lnSpc>
+                <a:spcPct val="150000"/>
+              </a:lnSpc>
+              <a:buClrTx/>
+              <a:buSzTx/>
+              <a:buNone/>
+              <a:defRPr sz="1800">
+                <a:solidFill>
+                  <a:srgbClr val="000000"/>
+                </a:solidFill>
+              </a:defRPr>
+            </a:pPr>
+            <a:r>
+              <a:rPr sz="2600">
+                <a:solidFill>
+                  <a:srgbClr val="333333"/>
+                </a:solidFill>
+              </a:rPr>
+              <a:t>Con junto de pasos a realizar para transformar una escena 3D en una imagen 2D.</a:t>
+            </a:r>
+            <a:endParaRPr sz="2600">
+              <a:solidFill>
+                <a:srgbClr val="333333"/>
+              </a:solidFill>
+            </a:endParaRPr>
+          </a:p>
+          <a:p>
+            <a:pPr lvl="0" marL="0" indent="0">
+              <a:buClrTx/>
+              <a:buSzTx/>
+              <a:buNone/>
+              <a:defRPr sz="1800">
+                <a:solidFill>
+                  <a:srgbClr val="000000"/>
+                </a:solidFill>
+              </a:defRPr>
+            </a:pPr>
+            <a:endParaRPr sz="2600">
+              <a:solidFill>
+                <a:srgbClr val="333333"/>
+              </a:solidFill>
+            </a:endParaRPr>
+          </a:p>
+        </p:txBody>
+      </p:sp>
+      <p:pic>
+        <p:nvPicPr>
+          <p:cNvPr id="82" name="Untitled.tiff"/>
+          <p:cNvPicPr/>
+          <p:nvPr/>
+        </p:nvPicPr>
+        <p:blipFill>
+          <a:blip r:embed="rId2">
+            <a:extLst/>
+          </a:blip>
+          <a:stretch>
+            <a:fillRect/>
+          </a:stretch>
+        </p:blipFill>
+        <p:spPr>
+          <a:xfrm>
+            <a:off x="0" y="3621117"/>
+            <a:ext cx="9144000" cy="1723966"/>
+          </a:xfrm>
+          <a:prstGeom prst="rect">
+            <a:avLst/>
+          </a:prstGeom>
+          <a:ln w="12700">
+            <a:miter lim="400000"/>
+          </a:ln>
+        </p:spPr>
+      </p:pic>
+    </p:spTree>
+  </p:cSld>
+  <p:clrMapOvr>
+    <a:masterClrMapping/>
+  </p:clrMapOvr>
+  <p:transition spd="med" advClick="1"/>
+</p:sld>
+</file>
+
+<file path=ppt/slides/slide12.xml><?xml version="1.0" encoding="utf-8"?>
+<p:sld xmlns:a="http://schemas.openxmlformats.org/drawingml/2006/main" xmlns:r="http://schemas.openxmlformats.org/officeDocument/2006/relationships" xmlns:p="http://schemas.openxmlformats.org/presentationml/2006/main" showMasterSp="1" showMasterPhAnim="1">
+  <p:cSld>
+    <p:spTree>
+      <p:nvGrpSpPr>
+        <p:cNvPr id="1" name=""/>
+        <p:cNvGrpSpPr/>
+        <p:nvPr/>
+      </p:nvGrpSpPr>
+      <p:grpSpPr>
+        <a:xfrm>
+          <a:off x="0" y="0"/>
+          <a:ext cx="0" cy="0"/>
+          <a:chOff x="0" y="0"/>
+          <a:chExt cx="0" cy="0"/>
+        </a:xfrm>
+      </p:grpSpPr>
+      <p:pic>
+        <p:nvPicPr>
+          <p:cNvPr id="84" name="Untitled 2.tiff"/>
+          <p:cNvPicPr/>
+          <p:nvPr/>
+        </p:nvPicPr>
+        <p:blipFill>
+          <a:blip r:embed="rId2">
+            <a:extLst/>
+          </a:blip>
+          <a:stretch>
+            <a:fillRect/>
+          </a:stretch>
+        </p:blipFill>
+        <p:spPr>
+          <a:xfrm>
+            <a:off x="5728487" y="4898004"/>
+            <a:ext cx="2143585" cy="2010796"/>
+          </a:xfrm>
+          <a:prstGeom prst="rect">
+            <a:avLst/>
+          </a:prstGeom>
+          <a:ln w="12700">
+            <a:miter lim="400000"/>
+          </a:ln>
+        </p:spPr>
+      </p:pic>
+      <p:sp>
+        <p:nvSpPr>
+          <p:cNvPr id="85" name="Shape 85"/>
+          <p:cNvSpPr/>
+          <p:nvPr>
+            <p:ph type="body" idx="1"/>
+          </p:nvPr>
+        </p:nvSpPr>
+        <p:spPr>
+          <a:xfrm>
+            <a:off x="1257300" y="1968500"/>
+            <a:ext cx="7048500" cy="4876800"/>
+          </a:xfrm>
+          <a:prstGeom prst="rect">
+            <a:avLst/>
+          </a:prstGeom>
+        </p:spPr>
+        <p:txBody>
+          <a:bodyPr/>
+          <a:lstStyle/>
+          <a:p>
+            <a:pPr lvl="0" marL="0" indent="0" algn="ctr">
+              <a:lnSpc>
+                <a:spcPct val="120000"/>
+              </a:lnSpc>
+              <a:buClrTx/>
+              <a:buSzTx/>
+              <a:buNone/>
+              <a:defRPr sz="1800">
+                <a:solidFill>
+                  <a:srgbClr val="000000"/>
+                </a:solidFill>
+              </a:defRPr>
+            </a:pPr>
+            <a:r>
+              <a:rPr b="1" sz="2600">
+                <a:solidFill>
+                  <a:srgbClr val="333333"/>
+                </a:solidFill>
+              </a:rPr>
+              <a:t>Modelos de Iluminación y </a:t>
+            </a:r>
+            <a:r>
+              <a:rPr b="1" sz="2500">
+                <a:solidFill>
+                  <a:srgbClr val="333333"/>
+                </a:solidFill>
+              </a:rPr>
+              <a:t>Sombreado</a:t>
+            </a:r>
+            <a:endParaRPr b="1" sz="2600">
+              <a:solidFill>
+                <a:srgbClr val="333333"/>
+              </a:solidFill>
+            </a:endParaRPr>
+          </a:p>
+          <a:p>
+            <a:pPr lvl="0" marL="0" indent="0">
+              <a:lnSpc>
+                <a:spcPct val="120000"/>
+              </a:lnSpc>
+              <a:buClrTx/>
+              <a:buSzTx/>
+              <a:buNone/>
+              <a:defRPr sz="1800">
+                <a:solidFill>
+                  <a:srgbClr val="000000"/>
+                </a:solidFill>
+              </a:defRPr>
+            </a:pPr>
+            <a:r>
+              <a:rPr sz="1400">
+                <a:solidFill>
+                  <a:srgbClr val="333333"/>
+                </a:solidFill>
+              </a:rPr>
+              <a:t>Calculo de la intensidad de color de cada punto de la escena.</a:t>
+            </a:r>
+            <a:endParaRPr sz="1400">
+              <a:solidFill>
+                <a:srgbClr val="333333"/>
+              </a:solidFill>
+            </a:endParaRPr>
+          </a:p>
+          <a:p>
+            <a:pPr lvl="0" marL="0" indent="0">
+              <a:lnSpc>
+                <a:spcPct val="120000"/>
+              </a:lnSpc>
+              <a:buClrTx/>
+              <a:buSzTx/>
+              <a:buNone/>
+              <a:defRPr sz="1800">
+                <a:solidFill>
+                  <a:srgbClr val="000000"/>
+                </a:solidFill>
+              </a:defRPr>
+            </a:pPr>
+            <a:r>
+              <a:rPr sz="1400">
+                <a:solidFill>
+                  <a:srgbClr val="333333"/>
+                </a:solidFill>
+              </a:rPr>
+              <a:t>Tipos de luz:</a:t>
+            </a:r>
+            <a:endParaRPr sz="1400">
+              <a:solidFill>
+                <a:srgbClr val="333333"/>
+              </a:solidFill>
+            </a:endParaRPr>
+          </a:p>
+          <a:p>
+            <a:pPr lvl="0" marL="342899" indent="-342899">
+              <a:lnSpc>
+                <a:spcPct val="120000"/>
+              </a:lnSpc>
+              <a:defRPr sz="1800">
+                <a:solidFill>
+                  <a:srgbClr val="000000"/>
+                </a:solidFill>
+              </a:defRPr>
+            </a:pPr>
+            <a:r>
+              <a:rPr sz="1400">
+                <a:solidFill>
+                  <a:srgbClr val="333333"/>
+                </a:solidFill>
+                <a:latin typeface="Verdana Bold"/>
+                <a:ea typeface="Verdana Bold"/>
+                <a:cs typeface="Verdana Bold"/>
+                <a:sym typeface="Verdana Bold"/>
+              </a:rPr>
+              <a:t>Luz Direccional</a:t>
+            </a:r>
+            <a:endParaRPr sz="1400">
+              <a:solidFill>
+                <a:srgbClr val="333333"/>
+              </a:solidFill>
+              <a:latin typeface="Verdana Bold"/>
+              <a:ea typeface="Verdana Bold"/>
+              <a:cs typeface="Verdana Bold"/>
+              <a:sym typeface="Verdana Bold"/>
+            </a:endParaRPr>
+          </a:p>
+          <a:p>
+            <a:pPr lvl="0" marL="342899" indent="-342899">
+              <a:lnSpc>
+                <a:spcPct val="120000"/>
+              </a:lnSpc>
+              <a:defRPr sz="1800">
+                <a:solidFill>
+                  <a:srgbClr val="000000"/>
+                </a:solidFill>
+              </a:defRPr>
+            </a:pPr>
+            <a:r>
+              <a:rPr sz="1400">
+                <a:solidFill>
+                  <a:srgbClr val="333333"/>
+                </a:solidFill>
+                <a:latin typeface="Verdana Bold"/>
+                <a:ea typeface="Verdana Bold"/>
+                <a:cs typeface="Verdana Bold"/>
+                <a:sym typeface="Verdana Bold"/>
+              </a:rPr>
+              <a:t>Luz Posicional</a:t>
+            </a:r>
+            <a:endParaRPr sz="1400">
+              <a:solidFill>
+                <a:srgbClr val="333333"/>
+              </a:solidFill>
+              <a:latin typeface="Verdana Bold"/>
+              <a:ea typeface="Verdana Bold"/>
+              <a:cs typeface="Verdana Bold"/>
+              <a:sym typeface="Verdana Bold"/>
+            </a:endParaRPr>
+          </a:p>
+          <a:p>
+            <a:pPr lvl="1" marL="800099" indent="-342899">
+              <a:lnSpc>
+                <a:spcPct val="120000"/>
+              </a:lnSpc>
+              <a:buSzPct val="150000"/>
+              <a:buChar char="•"/>
+              <a:defRPr sz="1800">
+                <a:solidFill>
+                  <a:srgbClr val="000000"/>
+                </a:solidFill>
+              </a:defRPr>
+            </a:pPr>
+            <a:r>
+              <a:rPr sz="1400">
+                <a:solidFill>
+                  <a:srgbClr val="333333"/>
+                </a:solidFill>
+                <a:latin typeface="Verdana Bold"/>
+                <a:ea typeface="Verdana Bold"/>
+                <a:cs typeface="Verdana Bold"/>
+                <a:sym typeface="Verdana Bold"/>
+              </a:rPr>
+              <a:t>Luz Focal</a:t>
+            </a:r>
+            <a:endParaRPr sz="1400">
+              <a:solidFill>
+                <a:srgbClr val="333333"/>
+              </a:solidFill>
+              <a:latin typeface="Verdana Bold"/>
+              <a:ea typeface="Verdana Bold"/>
+              <a:cs typeface="Verdana Bold"/>
+              <a:sym typeface="Verdana Bold"/>
+            </a:endParaRPr>
+          </a:p>
+          <a:p>
+            <a:pPr lvl="0" marL="0" indent="0">
+              <a:lnSpc>
+                <a:spcPct val="120000"/>
+              </a:lnSpc>
+              <a:buClrTx/>
+              <a:buSzTx/>
+              <a:buNone/>
+              <a:defRPr sz="1800">
+                <a:solidFill>
+                  <a:srgbClr val="000000"/>
+                </a:solidFill>
+              </a:defRPr>
+            </a:pPr>
+            <a:r>
+              <a:rPr sz="1400">
+                <a:solidFill>
+                  <a:srgbClr val="333333"/>
+                </a:solidFill>
+                <a:latin typeface="Verdana Bold"/>
+                <a:ea typeface="Verdana Bold"/>
+                <a:cs typeface="Verdana Bold"/>
+                <a:sym typeface="Verdana Bold"/>
+              </a:rPr>
+              <a:t>Modelo de iluminación de Phong:</a:t>
+            </a:r>
+            <a:r>
+              <a:rPr sz="1400">
+                <a:solidFill>
+                  <a:srgbClr val="333333"/>
+                </a:solidFill>
+                <a:latin typeface="Verdana Bold"/>
+                <a:ea typeface="Verdana Bold"/>
+                <a:cs typeface="Verdana Bold"/>
+                <a:sym typeface="Verdana Bold"/>
+              </a:rPr>
+              <a:t> los objetos no emiten luz, solo reflejan la luz que les llega.</a:t>
+            </a:r>
+            <a:endParaRPr sz="1400">
+              <a:solidFill>
+                <a:srgbClr val="333333"/>
+              </a:solidFill>
+              <a:latin typeface="Verdana Bold"/>
+              <a:ea typeface="Verdana Bold"/>
+              <a:cs typeface="Verdana Bold"/>
+              <a:sym typeface="Verdana Bold"/>
+            </a:endParaRPr>
+          </a:p>
+          <a:p>
+            <a:pPr lvl="0" marL="0" indent="0">
+              <a:lnSpc>
+                <a:spcPct val="120000"/>
+              </a:lnSpc>
+              <a:buClrTx/>
+              <a:buSzTx/>
+              <a:buNone/>
+              <a:defRPr sz="1800">
+                <a:solidFill>
+                  <a:srgbClr val="000000"/>
+                </a:solidFill>
+              </a:defRPr>
+            </a:pPr>
+            <a:r>
+              <a:rPr sz="1400">
+                <a:solidFill>
+                  <a:srgbClr val="333333"/>
+                </a:solidFill>
+                <a:latin typeface="Verdana Bold"/>
+                <a:ea typeface="Verdana Bold"/>
+                <a:cs typeface="Verdana Bold"/>
+                <a:sym typeface="Verdana Bold"/>
+              </a:rPr>
+              <a:t>Sombreado: </a:t>
+            </a:r>
+            <a:r>
+              <a:rPr sz="1400">
+                <a:solidFill>
+                  <a:srgbClr val="333333"/>
+                </a:solidFill>
+                <a:latin typeface="Verdana Bold"/>
+                <a:ea typeface="Verdana Bold"/>
+                <a:cs typeface="Verdana Bold"/>
+                <a:sym typeface="Verdana Bold"/>
+              </a:rPr>
+              <a:t>Se provee de un modelo de iluminación para la visualización de los polígonos del objeto.</a:t>
+            </a:r>
+            <a:endParaRPr sz="1400">
+              <a:solidFill>
+                <a:srgbClr val="333333"/>
+              </a:solidFill>
+              <a:latin typeface="Verdana Bold"/>
+              <a:ea typeface="Verdana Bold"/>
+              <a:cs typeface="Verdana Bold"/>
+              <a:sym typeface="Verdana Bold"/>
+            </a:endParaRPr>
+          </a:p>
+          <a:p>
+            <a:pPr lvl="0" marL="0" indent="0">
+              <a:buClrTx/>
+              <a:buSzTx/>
+              <a:buNone/>
+              <a:defRPr sz="1800">
+                <a:solidFill>
+                  <a:srgbClr val="000000"/>
+                </a:solidFill>
+              </a:defRPr>
+            </a:pPr>
+            <a:endParaRPr sz="2600">
+              <a:solidFill>
+                <a:srgbClr val="333333"/>
+              </a:solidFill>
+              <a:latin typeface="Verdana Bold"/>
+              <a:ea typeface="Verdana Bold"/>
+              <a:cs typeface="Verdana Bold"/>
+              <a:sym typeface="Verdana Bold"/>
+            </a:endParaRPr>
+          </a:p>
+        </p:txBody>
+      </p:sp>
+      <p:sp>
+        <p:nvSpPr>
+          <p:cNvPr id="86" name="Shape 86"/>
+          <p:cNvSpPr/>
+          <p:nvPr>
+            <p:ph type="title"/>
+          </p:nvPr>
+        </p:nvSpPr>
+        <p:spPr>
+          <a:prstGeom prst="rect">
+            <a:avLst/>
+          </a:prstGeom>
+        </p:spPr>
+        <p:txBody>
+          <a:bodyPr/>
+          <a:lstStyle/>
+          <a:p>
+            <a:pPr lvl="0">
+              <a:defRPr sz="1800">
+                <a:solidFill>
+                  <a:srgbClr val="000000"/>
+                </a:solidFill>
+              </a:defRPr>
+            </a:pPr>
+            <a:r>
+              <a:rPr sz="2800">
+                <a:solidFill>
+                  <a:srgbClr val="FFFFFF"/>
+                </a:solidFill>
+              </a:rPr>
+              <a:t>Graphics Pipeline</a:t>
+            </a:r>
+          </a:p>
+        </p:txBody>
+      </p:sp>
+      <p:sp>
+        <p:nvSpPr>
+          <p:cNvPr id="87" name="Shape 87"/>
+          <p:cNvSpPr/>
+          <p:nvPr/>
+        </p:nvSpPr>
+        <p:spPr>
+          <a:xfrm>
+            <a:off x="4102100" y="3124200"/>
+            <a:ext cx="4829820" cy="809874"/>
+          </a:xfrm>
+          <a:prstGeom prst="rect">
+            <a:avLst/>
+          </a:prstGeom>
+          <a:solidFill>
+            <a:srgbClr val="E09142"/>
+          </a:solidFill>
+          <a:ln w="25400">
+            <a:solidFill>
+              <a:srgbClr val="A36A30"/>
+            </a:solidFill>
+          </a:ln>
+          <a:extLst>
+            <a:ext uri="{C572A759-6A51-4108-AA02-DFA0A04FC94B}">
+              <ma14:wrappingTextBoxFlag xmlns:ma14="http://schemas.microsoft.com/office/mac/drawingml/2011/main" val="1"/>
+            </a:ext>
+          </a:extLst>
+        </p:spPr>
+        <p:txBody>
+          <a:bodyPr lIns="45718" tIns="45718" rIns="45718" bIns="45718"/>
+          <a:lstStyle>
+            <a:lvl1pPr>
+              <a:defRPr>
+                <a:solidFill>
+                  <a:srgbClr val="FFFFFF"/>
+                </a:solidFill>
+              </a:defRPr>
+            </a:lvl1pPr>
+          </a:lstStyle>
+          <a:p>
+            <a:pPr lvl="0">
+              <a:defRPr sz="1800">
+                <a:solidFill>
+                  <a:srgbClr val="000000"/>
+                </a:solidFill>
+              </a:defRPr>
+            </a:pPr>
+            <a:r>
+              <a:rPr sz="2400">
+                <a:solidFill>
+                  <a:srgbClr val="FFFFFF"/>
+                </a:solidFill>
+              </a:rPr>
+              <a:t>Mostrar engine, 3 escenas con los 3 tipos de luces</a:t>
+            </a:r>
+          </a:p>
+        </p:txBody>
+      </p:sp>
+      <p:pic>
+        <p:nvPicPr>
+          <p:cNvPr id="88" name="Untitled 3.tiff"/>
+          <p:cNvPicPr/>
+          <p:nvPr/>
+        </p:nvPicPr>
+        <p:blipFill>
+          <a:blip r:embed="rId3">
+            <a:extLst/>
+          </a:blip>
+          <a:stretch>
+            <a:fillRect/>
+          </a:stretch>
+        </p:blipFill>
+        <p:spPr>
+          <a:xfrm>
+            <a:off x="1559706" y="5583778"/>
+            <a:ext cx="3028814" cy="1086997"/>
+          </a:xfrm>
+          <a:prstGeom prst="rect">
+            <a:avLst/>
+          </a:prstGeom>
+          <a:ln w="12700">
+            <a:miter lim="400000"/>
+          </a:ln>
+        </p:spPr>
+      </p:pic>
+    </p:spTree>
+  </p:cSld>
+  <p:clrMapOvr>
+    <a:masterClrMapping/>
+  </p:clrMapOvr>
+  <p:transition spd="med" advClick="1"/>
+</p:sld>
+</file>
+
+<file path=ppt/slides/slide13.xml><?xml version="1.0" encoding="utf-8"?>
+<p:sld xmlns:a="http://schemas.openxmlformats.org/drawingml/2006/main" xmlns:r="http://schemas.openxmlformats.org/officeDocument/2006/relationships" xmlns:p="http://schemas.openxmlformats.org/presentationml/2006/main" showMasterSp="1" showMasterPhAnim="1">
+  <p:cSld>
+    <p:spTree>
+      <p:nvGrpSpPr>
+        <p:cNvPr id="1" name=""/>
+        <p:cNvGrpSpPr/>
+        <p:nvPr/>
+      </p:nvGrpSpPr>
+      <p:grpSpPr>
+        <a:xfrm>
+          <a:off x="0" y="0"/>
+          <a:ext cx="0" cy="0"/>
+          <a:chOff x="0" y="0"/>
+          <a:chExt cx="0" cy="0"/>
+        </a:xfrm>
+      </p:grpSpPr>
+      <p:sp>
+        <p:nvSpPr>
+          <p:cNvPr id="90" name="Shape 90"/>
+          <p:cNvSpPr/>
+          <p:nvPr>
+            <p:ph type="title"/>
+          </p:nvPr>
+        </p:nvSpPr>
+        <p:spPr>
+          <a:prstGeom prst="rect">
+            <a:avLst/>
+          </a:prstGeom>
+        </p:spPr>
+        <p:txBody>
+          <a:bodyPr/>
+          <a:lstStyle/>
+          <a:p>
+            <a:pPr lvl="0">
+              <a:defRPr sz="1800">
+                <a:solidFill>
+                  <a:srgbClr val="000000"/>
+                </a:solidFill>
+              </a:defRPr>
+            </a:pPr>
+            <a:r>
+              <a:rPr sz="2800">
+                <a:solidFill>
+                  <a:srgbClr val="FFFFFF"/>
+                </a:solidFill>
+              </a:rPr>
+              <a:t>Graphics Pipeline</a:t>
+            </a:r>
+          </a:p>
+        </p:txBody>
+      </p:sp>
+      <p:sp>
+        <p:nvSpPr>
+          <p:cNvPr id="91" name="Shape 91"/>
+          <p:cNvSpPr/>
+          <p:nvPr>
+            <p:ph type="body" idx="1"/>
+          </p:nvPr>
+        </p:nvSpPr>
+        <p:spPr>
+          <a:prstGeom prst="rect">
+            <a:avLst/>
+          </a:prstGeom>
+        </p:spPr>
+        <p:txBody>
+          <a:bodyPr/>
+          <a:lstStyle/>
+          <a:p>
+            <a:pPr lvl="0" marL="0" indent="0" algn="ctr">
+              <a:buClrTx/>
+              <a:buSzTx/>
+              <a:buNone/>
+              <a:defRPr sz="1800">
+                <a:solidFill>
+                  <a:srgbClr val="000000"/>
+                </a:solidFill>
+              </a:defRPr>
+            </a:pPr>
+            <a:r>
+              <a:rPr b="1" sz="2500">
+                <a:solidFill>
+                  <a:srgbClr val="333333"/>
+                </a:solidFill>
+              </a:rPr>
+              <a:t>Multiples Luces</a:t>
+            </a:r>
+            <a:endParaRPr b="1" sz="2500">
+              <a:solidFill>
+                <a:srgbClr val="333333"/>
+              </a:solidFill>
+            </a:endParaRPr>
+          </a:p>
+          <a:p>
+            <a:pPr lvl="0" marL="0" indent="0" algn="ctr">
+              <a:buClrTx/>
+              <a:buSzTx/>
+              <a:buNone/>
+              <a:defRPr sz="1800">
+                <a:solidFill>
+                  <a:srgbClr val="000000"/>
+                </a:solidFill>
+              </a:defRPr>
+            </a:pPr>
+            <a:endParaRPr b="1" sz="2500">
+              <a:solidFill>
+                <a:srgbClr val="333333"/>
+              </a:solidFill>
+            </a:endParaRPr>
+          </a:p>
+          <a:p>
+            <a:pPr lvl="0" marL="342899" indent="-342899">
+              <a:lnSpc>
+                <a:spcPct val="150000"/>
+              </a:lnSpc>
+              <a:defRPr sz="1800">
+                <a:solidFill>
+                  <a:srgbClr val="000000"/>
+                </a:solidFill>
+              </a:defRPr>
+            </a:pPr>
+            <a:r>
+              <a:rPr sz="2000">
+                <a:solidFill>
+                  <a:srgbClr val="333333"/>
+                </a:solidFill>
+                <a:latin typeface="Verdana Bold"/>
+                <a:ea typeface="Verdana Bold"/>
+                <a:cs typeface="Verdana Bold"/>
+                <a:sym typeface="Verdana Bold"/>
+              </a:rPr>
+              <a:t>Multipass Lighting: </a:t>
+            </a:r>
+            <a:r>
+              <a:rPr sz="2000">
+                <a:solidFill>
+                  <a:srgbClr val="333333"/>
+                </a:solidFill>
+                <a:latin typeface="Verdana Bold"/>
+                <a:ea typeface="Verdana Bold"/>
+                <a:cs typeface="Verdana Bold"/>
+                <a:sym typeface="Verdana Bold"/>
+              </a:rPr>
+              <a:t>calcular iluminación de cada luz sobre el objeto y sumarla a la imagen real.</a:t>
+            </a:r>
+            <a:endParaRPr sz="2000">
+              <a:solidFill>
+                <a:srgbClr val="333333"/>
+              </a:solidFill>
+              <a:latin typeface="Verdana Bold"/>
+              <a:ea typeface="Verdana Bold"/>
+              <a:cs typeface="Verdana Bold"/>
+              <a:sym typeface="Verdana Bold"/>
+            </a:endParaRPr>
+          </a:p>
+          <a:p>
+            <a:pPr lvl="0" marL="342899" indent="-342899">
+              <a:lnSpc>
+                <a:spcPct val="150000"/>
+              </a:lnSpc>
+              <a:defRPr sz="1800">
+                <a:solidFill>
+                  <a:srgbClr val="000000"/>
+                </a:solidFill>
+              </a:defRPr>
+            </a:pPr>
+            <a:r>
+              <a:rPr sz="2000">
+                <a:solidFill>
+                  <a:srgbClr val="333333"/>
+                </a:solidFill>
+                <a:latin typeface="Verdana Bold"/>
+                <a:ea typeface="Verdana Bold"/>
+                <a:cs typeface="Verdana Bold"/>
+                <a:sym typeface="Verdana Bold"/>
+              </a:rPr>
+              <a:t>Varias luces por shader: </a:t>
+            </a:r>
+            <a:r>
+              <a:rPr sz="2000">
+                <a:solidFill>
+                  <a:srgbClr val="333333"/>
+                </a:solidFill>
+                <a:latin typeface="Verdana Bold"/>
+                <a:ea typeface="Verdana Bold"/>
+                <a:cs typeface="Verdana Bold"/>
+                <a:sym typeface="Verdana Bold"/>
+              </a:rPr>
+              <a:t>el shader recibe la información de un grupo de luces para realizar el calculo de iluminación.</a:t>
+            </a:r>
+            <a:endParaRPr sz="2000">
+              <a:solidFill>
+                <a:srgbClr val="333333"/>
+              </a:solidFill>
+              <a:latin typeface="Verdana Bold"/>
+              <a:ea typeface="Verdana Bold"/>
+              <a:cs typeface="Verdana Bold"/>
+              <a:sym typeface="Verdana Bold"/>
+            </a:endParaRPr>
+          </a:p>
+          <a:p>
+            <a:pPr lvl="0" marL="342899" indent="-342899">
+              <a:lnSpc>
+                <a:spcPct val="150000"/>
+              </a:lnSpc>
+              <a:defRPr sz="1800">
+                <a:solidFill>
+                  <a:srgbClr val="000000"/>
+                </a:solidFill>
+              </a:defRPr>
+            </a:pPr>
+            <a:r>
+              <a:rPr sz="2000">
+                <a:solidFill>
+                  <a:srgbClr val="333333"/>
+                </a:solidFill>
+                <a:latin typeface="Verdana Bold"/>
+                <a:ea typeface="Verdana Bold"/>
+                <a:cs typeface="Verdana Bold"/>
+                <a:sym typeface="Verdana Bold"/>
+              </a:rPr>
+              <a:t>Lightmaps: </a:t>
+            </a:r>
+            <a:r>
+              <a:rPr sz="2000">
+                <a:solidFill>
+                  <a:srgbClr val="333333"/>
+                </a:solidFill>
+                <a:latin typeface="Verdana Bold"/>
+                <a:ea typeface="Verdana Bold"/>
+                <a:cs typeface="Verdana Bold"/>
+                <a:sym typeface="Verdana Bold"/>
+              </a:rPr>
+              <a:t>estructura de datos precomputada que contiene el brillo de la superficie del objeto.</a:t>
+            </a:r>
+          </a:p>
+        </p:txBody>
+      </p:sp>
+    </p:spTree>
+  </p:cSld>
+  <p:clrMapOvr>
+    <a:masterClrMapping/>
+  </p:clrMapOvr>
+  <p:transition spd="med" advClick="1"/>
+</p:sld>
+</file>
+
+<file path=ppt/slides/slide14.xml><?xml version="1.0" encoding="utf-8"?>
+<p:sld xmlns:a="http://schemas.openxmlformats.org/drawingml/2006/main" xmlns:r="http://schemas.openxmlformats.org/officeDocument/2006/relationships" xmlns:p="http://schemas.openxmlformats.org/presentationml/2006/main" showMasterSp="1" showMasterPhAnim="1">
+  <p:cSld>
+    <p:spTree>
+      <p:nvGrpSpPr>
+        <p:cNvPr id="1" name=""/>
+        <p:cNvGrpSpPr/>
+        <p:nvPr/>
+      </p:nvGrpSpPr>
+      <p:grpSpPr>
+        <a:xfrm>
+          <a:off x="0" y="0"/>
+          <a:ext cx="0" cy="0"/>
+          <a:chOff x="0" y="0"/>
+          <a:chExt cx="0" cy="0"/>
+        </a:xfrm>
+      </p:grpSpPr>
+      <p:sp>
+        <p:nvSpPr>
+          <p:cNvPr id="93" name="Shape 93"/>
+          <p:cNvSpPr/>
+          <p:nvPr>
+            <p:ph type="title"/>
+          </p:nvPr>
+        </p:nvSpPr>
+        <p:spPr>
+          <a:xfrm>
+            <a:off x="685800" y="2857500"/>
+            <a:ext cx="8458200" cy="1143000"/>
+          </a:xfrm>
+          <a:prstGeom prst="rect">
+            <a:avLst/>
+          </a:prstGeom>
+        </p:spPr>
+        <p:txBody>
+          <a:bodyPr lIns="0" tIns="0" rIns="0" bIns="0"/>
+          <a:lstStyle>
+            <a:lvl1pPr>
+              <a:defRPr>
+                <a:solidFill>
+                  <a:srgbClr val="333333"/>
+                </a:solidFill>
+              </a:defRPr>
+            </a:lvl1pPr>
+          </a:lstStyle>
+          <a:p>
+            <a:pPr lvl="0">
+              <a:defRPr sz="1800">
+                <a:solidFill>
+                  <a:srgbClr val="000000"/>
+                </a:solidFill>
+              </a:defRPr>
+            </a:pPr>
+            <a:r>
+              <a:rPr sz="2800">
+                <a:solidFill>
+                  <a:srgbClr val="333333"/>
+                </a:solidFill>
+              </a:rPr>
+              <a:t>3.1 Forward Rendering</a:t>
+            </a:r>
+          </a:p>
+        </p:txBody>
+      </p:sp>
+    </p:spTree>
+  </p:cSld>
+  <p:clrMapOvr>
+    <a:masterClrMapping/>
+  </p:clrMapOvr>
+  <p:transition spd="med" advClick="1"/>
+</p:sld>
+</file>
+
+<file path=ppt/slides/slide15.xml><?xml version="1.0" encoding="utf-8"?>
+<p:sld xmlns:a="http://schemas.openxmlformats.org/drawingml/2006/main" xmlns:r="http://schemas.openxmlformats.org/officeDocument/2006/relationships" xmlns:p="http://schemas.openxmlformats.org/presentationml/2006/main" showMasterSp="1" showMasterPhAnim="1">
+  <p:cSld>
+    <p:spTree>
+      <p:nvGrpSpPr>
+        <p:cNvPr id="1" name=""/>
+        <p:cNvGrpSpPr/>
+        <p:nvPr/>
+      </p:nvGrpSpPr>
+      <p:grpSpPr>
+        <a:xfrm>
+          <a:off x="0" y="0"/>
+          <a:ext cx="0" cy="0"/>
+          <a:chOff x="0" y="0"/>
+          <a:chExt cx="0" cy="0"/>
+        </a:xfrm>
+      </p:grpSpPr>
+      <p:sp>
+        <p:nvSpPr>
+          <p:cNvPr id="95" name="Shape 95"/>
+          <p:cNvSpPr/>
+          <p:nvPr>
+            <p:ph type="title"/>
+          </p:nvPr>
+        </p:nvSpPr>
+        <p:spPr>
+          <a:prstGeom prst="rect">
+            <a:avLst/>
+          </a:prstGeom>
+        </p:spPr>
+        <p:txBody>
+          <a:bodyPr/>
+          <a:lstStyle/>
+          <a:p>
+            <a:pPr lvl="0">
+              <a:defRPr sz="1800">
+                <a:solidFill>
+                  <a:srgbClr val="000000"/>
+                </a:solidFill>
+              </a:defRPr>
+            </a:pPr>
+            <a:r>
+              <a:rPr sz="2800">
+                <a:solidFill>
+                  <a:srgbClr val="FFFFFF"/>
+                </a:solidFill>
+              </a:rPr>
+              <a:t>Forward Rendering</a:t>
+            </a:r>
+          </a:p>
+        </p:txBody>
+      </p:sp>
+      <p:sp>
+        <p:nvSpPr>
+          <p:cNvPr id="96" name="Shape 96"/>
+          <p:cNvSpPr/>
+          <p:nvPr>
+            <p:ph type="body" idx="1"/>
+          </p:nvPr>
+        </p:nvSpPr>
+        <p:spPr>
+          <a:prstGeom prst="rect">
+            <a:avLst/>
+          </a:prstGeom>
+        </p:spPr>
+        <p:txBody>
+          <a:bodyPr/>
+          <a:lstStyle/>
+          <a:p>
+            <a:pPr lvl="0"/>
+          </a:p>
+        </p:txBody>
+      </p:sp>
+    </p:spTree>
+  </p:cSld>
+  <p:clrMapOvr>
+    <a:masterClrMapping/>
+  </p:clrMapOvr>
+  <p:transition spd="med" advClick="1"/>
+</p:sld>
+</file>
+
+<file path=ppt/slides/slide16.xml><?xml version="1.0" encoding="utf-8"?>
+<p:sld xmlns:a="http://schemas.openxmlformats.org/drawingml/2006/main" xmlns:r="http://schemas.openxmlformats.org/officeDocument/2006/relationships" xmlns:p="http://schemas.openxmlformats.org/presentationml/2006/main" showMasterSp="1" showMasterPhAnim="1">
+  <p:cSld>
     <p:bg>
       <p:bgPr>
         <a:blipFill rotWithShape="1">
@@ -4345,7 +5478,7 @@
           </a:bodyPr>
           <a:lstStyle/>
           <a:p>
-            <a:pPr lvl="0" marL="173511" indent="-173511" defTabSz="456467">
+            <a:pPr lvl="0" marL="144592" indent="-144592" defTabSz="456467">
               <a:lnSpc>
                 <a:spcPct val="150000"/>
               </a:lnSpc>
@@ -4362,13 +5495,13 @@
               </a:defRPr>
             </a:pPr>
             <a:r>
-              <a:rPr sz="1536"/>
+              <a:rPr sz="1500"/>
               <a:t>Introducción</a:t>
             </a:r>
-            <a:endParaRPr sz="1536"/>
-          </a:p>
-          <a:p>
-            <a:pPr lvl="0" marL="173511" indent="-173511" defTabSz="456467">
+            <a:endParaRPr sz="1500"/>
+          </a:p>
+          <a:p>
+            <a:pPr lvl="0" marL="144592" indent="-144592" defTabSz="456467">
               <a:lnSpc>
                 <a:spcPct val="150000"/>
               </a:lnSpc>
@@ -4385,13 +5518,13 @@
               </a:defRPr>
             </a:pPr>
             <a:r>
-              <a:rPr sz="1536"/>
+              <a:rPr sz="1500"/>
               <a:t>La Web</a:t>
             </a:r>
-            <a:endParaRPr sz="1536"/>
-          </a:p>
-          <a:p>
-            <a:pPr lvl="0" marL="173511" indent="-173511" defTabSz="456467">
+            <a:endParaRPr sz="1500"/>
+          </a:p>
+          <a:p>
+            <a:pPr lvl="0" marL="144592" indent="-144592" defTabSz="456467">
               <a:lnSpc>
                 <a:spcPct val="150000"/>
               </a:lnSpc>
@@ -4408,13 +5541,13 @@
               </a:defRPr>
             </a:pPr>
             <a:r>
-              <a:rPr sz="1536"/>
+              <a:rPr sz="1500"/>
               <a:t>Graphics Pipeline</a:t>
             </a:r>
-            <a:endParaRPr sz="1536"/>
-          </a:p>
-          <a:p>
-            <a:pPr lvl="1" marL="320328" indent="-130133" defTabSz="456467">
+            <a:endParaRPr sz="1500"/>
+          </a:p>
+          <a:p>
+            <a:pPr lvl="1" marL="298639" indent="-108444" defTabSz="456467">
               <a:lnSpc>
                 <a:spcPct val="150000"/>
               </a:lnSpc>
@@ -4431,13 +5564,13 @@
               </a:defRPr>
             </a:pPr>
             <a:r>
-              <a:rPr sz="1536"/>
+              <a:rPr sz="1500"/>
               <a:t>Forward Rendering</a:t>
             </a:r>
-            <a:endParaRPr sz="1536"/>
-          </a:p>
-          <a:p>
-            <a:pPr lvl="1" marL="320328" indent="-130133" defTabSz="456467">
+            <a:endParaRPr sz="1500"/>
+          </a:p>
+          <a:p>
+            <a:pPr lvl="1" marL="298639" indent="-108444" defTabSz="456467">
               <a:lnSpc>
                 <a:spcPct val="150000"/>
               </a:lnSpc>
@@ -4454,13 +5587,13 @@
               </a:defRPr>
             </a:pPr>
             <a:r>
-              <a:rPr sz="1536"/>
+              <a:rPr sz="1500"/>
               <a:t>Deferred Rendering</a:t>
             </a:r>
-            <a:endParaRPr sz="1536"/>
-          </a:p>
-          <a:p>
-            <a:pPr lvl="0" marL="173511" indent="-173511" defTabSz="456467">
+            <a:endParaRPr sz="1500"/>
+          </a:p>
+          <a:p>
+            <a:pPr lvl="0" marL="144592" indent="-144592" defTabSz="456467">
               <a:lnSpc>
                 <a:spcPct val="150000"/>
               </a:lnSpc>
@@ -4477,13 +5610,13 @@
               </a:defRPr>
             </a:pPr>
             <a:r>
-              <a:rPr sz="1536"/>
+              <a:rPr sz="1500"/>
               <a:t>WebGL</a:t>
             </a:r>
-            <a:endParaRPr sz="1536"/>
-          </a:p>
-          <a:p>
-            <a:pPr lvl="0" marL="173511" indent="-173511" defTabSz="456467">
+            <a:endParaRPr sz="1500"/>
+          </a:p>
+          <a:p>
+            <a:pPr lvl="0" marL="144592" indent="-144592" defTabSz="456467">
               <a:lnSpc>
                 <a:spcPct val="150000"/>
               </a:lnSpc>
@@ -4500,13 +5633,13 @@
               </a:defRPr>
             </a:pPr>
             <a:r>
-              <a:rPr sz="1536"/>
+              <a:rPr sz="1500"/>
               <a:t>Engine Desarrollado</a:t>
             </a:r>
-            <a:endParaRPr sz="1536"/>
-          </a:p>
-          <a:p>
-            <a:pPr lvl="1" marL="320328" indent="-130133" defTabSz="456467">
+            <a:endParaRPr sz="1500"/>
+          </a:p>
+          <a:p>
+            <a:pPr lvl="1" marL="298639" indent="-108444" defTabSz="456467">
               <a:lnSpc>
                 <a:spcPct val="150000"/>
               </a:lnSpc>
@@ -4523,13 +5656,13 @@
               </a:defRPr>
             </a:pPr>
             <a:r>
-              <a:rPr sz="1536"/>
+              <a:rPr sz="1500"/>
               <a:t>Diseño</a:t>
             </a:r>
-            <a:endParaRPr sz="1536"/>
-          </a:p>
-          <a:p>
-            <a:pPr lvl="1" marL="320328" indent="-130133" defTabSz="456467">
+            <a:endParaRPr sz="1500"/>
+          </a:p>
+          <a:p>
+            <a:pPr lvl="1" marL="298639" indent="-108444" defTabSz="456467">
               <a:lnSpc>
                 <a:spcPct val="150000"/>
               </a:lnSpc>
@@ -4546,13 +5679,13 @@
               </a:defRPr>
             </a:pPr>
             <a:r>
-              <a:rPr sz="1536"/>
+              <a:rPr sz="1500"/>
               <a:t>Estructura</a:t>
             </a:r>
-            <a:endParaRPr sz="1536"/>
-          </a:p>
-          <a:p>
-            <a:pPr lvl="0" marL="173511" indent="-173511" defTabSz="456467">
+            <a:endParaRPr sz="1500"/>
+          </a:p>
+          <a:p>
+            <a:pPr lvl="0" marL="144592" indent="-144592" defTabSz="456467">
               <a:lnSpc>
                 <a:spcPct val="150000"/>
               </a:lnSpc>
@@ -4569,13 +5702,13 @@
               </a:defRPr>
             </a:pPr>
             <a:r>
-              <a:rPr sz="1536"/>
+              <a:rPr sz="1500"/>
               <a:t>Resultados</a:t>
             </a:r>
-            <a:endParaRPr sz="1536"/>
-          </a:p>
-          <a:p>
-            <a:pPr lvl="0" marL="173511" indent="-173511" defTabSz="456467">
+            <a:endParaRPr sz="1500"/>
+          </a:p>
+          <a:p>
+            <a:pPr lvl="0" marL="144592" indent="-144592" defTabSz="456467">
               <a:lnSpc>
                 <a:spcPct val="150000"/>
               </a:lnSpc>
@@ -4592,7 +5725,7 @@
               </a:defRPr>
             </a:pPr>
             <a:r>
-              <a:rPr sz="1536"/>
+              <a:rPr sz="1500"/>
               <a:t>Conclusiones</a:t>
             </a:r>
           </a:p>
@@ -4633,13 +5766,25 @@
           </p:nvPr>
         </p:nvSpPr>
         <p:spPr>
+          <a:xfrm>
+            <a:off x="685800" y="2857500"/>
+            <a:ext cx="8458200" cy="1143000"/>
+          </a:xfrm>
           <a:prstGeom prst="rect">
             <a:avLst/>
           </a:prstGeom>
         </p:spPr>
         <p:txBody>
           <a:bodyPr/>
-          <a:lstStyle/>
+          <a:lstStyle>
+            <a:lvl1pPr>
+              <a:defRPr>
+                <a:solidFill>
+                  <a:srgbClr val="333333"/>
+                </a:solidFill>
+              </a:defRPr>
+            </a:lvl1pPr>
+          </a:lstStyle>
           <a:p>
             <a:pPr lvl="0">
               <a:defRPr sz="1800">
@@ -4651,153 +5796,10 @@
             <a:r>
               <a:rPr sz="2800">
                 <a:solidFill>
-                  <a:srgbClr val="FFFFFF"/>
-                </a:solidFill>
-              </a:rPr>
-              <a:t>Introducción</a:t>
-            </a:r>
-          </a:p>
-        </p:txBody>
-      </p:sp>
-      <p:sp>
-        <p:nvSpPr>
-          <p:cNvPr id="63" name="Shape 63"/>
-          <p:cNvSpPr/>
-          <p:nvPr>
-            <p:ph type="body" idx="1"/>
-          </p:nvPr>
-        </p:nvSpPr>
-        <p:spPr>
-          <a:xfrm>
-            <a:off x="1295400" y="1930400"/>
-            <a:ext cx="7048500" cy="4876800"/>
-          </a:xfrm>
-          <a:prstGeom prst="rect">
-            <a:avLst/>
-          </a:prstGeom>
-        </p:spPr>
-        <p:txBody>
-          <a:bodyPr lIns="0" tIns="0" rIns="0" bIns="0" anchor="ctr"/>
-          <a:lstStyle/>
-          <a:p>
-            <a:pPr lvl="0" marL="0" indent="0" algn="just">
-              <a:lnSpc>
-                <a:spcPct val="150000"/>
-              </a:lnSpc>
-              <a:buClrTx/>
-              <a:buSzTx/>
-              <a:buNone/>
-              <a:defRPr sz="1800">
-                <a:solidFill>
-                  <a:srgbClr val="000000"/>
-                </a:solidFill>
-              </a:defRPr>
-            </a:pPr>
-            <a:r>
-              <a:rPr sz="2400">
-                <a:solidFill>
-                  <a:srgbClr val="333333"/>
-                </a:solidFill>
-              </a:rPr>
-              <a:t>La gran evolución de los navegadores web nos permite renderizar imágenes 2D/3D.</a:t>
-            </a:r>
-            <a:endParaRPr sz="2400">
-              <a:solidFill>
-                <a:srgbClr val="333333"/>
-              </a:solidFill>
-            </a:endParaRPr>
-          </a:p>
-          <a:p>
-            <a:pPr lvl="0" marL="0" indent="0" algn="just">
-              <a:lnSpc>
-                <a:spcPct val="150000"/>
-              </a:lnSpc>
-              <a:buClrTx/>
-              <a:buSzTx/>
-              <a:buNone/>
-              <a:defRPr sz="1800">
-                <a:solidFill>
-                  <a:srgbClr val="000000"/>
-                </a:solidFill>
-              </a:defRPr>
-            </a:pPr>
-            <a:r>
-              <a:rPr sz="2400">
-                <a:solidFill>
-                  <a:srgbClr val="333333"/>
-                </a:solidFill>
-              </a:rPr>
-              <a:t>2 subcampos dentro de la generación de imágenes:</a:t>
-            </a:r>
-            <a:endParaRPr sz="2400">
-              <a:solidFill>
-                <a:srgbClr val="333333"/>
-              </a:solidFill>
-            </a:endParaRPr>
-          </a:p>
-          <a:p>
-            <a:pPr lvl="1" marL="800100" indent="-342900" algn="just">
-              <a:lnSpc>
-                <a:spcPct val="150000"/>
-              </a:lnSpc>
-              <a:buSzPct val="150000"/>
-              <a:buChar char="•"/>
-              <a:defRPr sz="1800">
-                <a:solidFill>
-                  <a:srgbClr val="000000"/>
-                </a:solidFill>
-              </a:defRPr>
-            </a:pPr>
-            <a:r>
-              <a:rPr b="1" sz="1900">
-                <a:solidFill>
-                  <a:srgbClr val="333333"/>
-                </a:solidFill>
-              </a:rPr>
-              <a:t>Generación off-line:</a:t>
-            </a:r>
-            <a:r>
-              <a:rPr sz="1900">
-                <a:solidFill>
-                  <a:srgbClr val="333333"/>
-                </a:solidFill>
-              </a:rPr>
-              <a:t> proceso mas elaborado y detallado.</a:t>
-            </a:r>
-            <a:endParaRPr sz="1900">
-              <a:solidFill>
-                <a:srgbClr val="333333"/>
-              </a:solidFill>
-            </a:endParaRPr>
-          </a:p>
-          <a:p>
-            <a:pPr lvl="1" marL="800100" indent="-342900" algn="just">
-              <a:lnSpc>
-                <a:spcPct val="150000"/>
-              </a:lnSpc>
-              <a:buSzPct val="150000"/>
-              <a:buChar char="•"/>
-              <a:defRPr sz="1800">
-                <a:solidFill>
-                  <a:srgbClr val="000000"/>
-                </a:solidFill>
-              </a:defRPr>
-            </a:pPr>
-            <a:r>
-              <a:rPr b="1" sz="1900">
-                <a:solidFill>
-                  <a:srgbClr val="333333"/>
-                </a:solidFill>
-              </a:rPr>
-              <a:t>Generación en tiempo real:</a:t>
-            </a:r>
-            <a:r>
-              <a:rPr sz="1900">
-                <a:solidFill>
-                  <a:srgbClr val="333333"/>
-                </a:solidFill>
-              </a:rPr>
-              <a:t> a partir de un modelo 2D o 3D, utilizando la GPU para la mayoría de los cálculos.</a:t>
+                  <a:srgbClr val="333333"/>
+                </a:solidFill>
+              </a:rPr>
+              <a:t>1. Introducción</a:t>
             </a:r>
           </a:p>
         </p:txBody>
@@ -4830,7 +5832,7 @@
       </p:grpSpPr>
       <p:sp>
         <p:nvSpPr>
-          <p:cNvPr id="65" name="Shape 65"/>
+          <p:cNvPr id="64" name="Shape 64"/>
           <p:cNvSpPr/>
           <p:nvPr>
             <p:ph type="title"/>
@@ -4842,7 +5844,9 @@
           </a:prstGeom>
         </p:spPr>
         <p:txBody>
-          <a:bodyPr/>
+          <a:bodyPr lIns="0" tIns="0" rIns="0" bIns="0">
+            <a:normAutofit fontScale="100000" lnSpcReduction="0"/>
+          </a:bodyPr>
           <a:lstStyle/>
           <a:p>
             <a:pPr lvl="0">
@@ -4865,59 +5869,31 @@
       </p:sp>
       <p:sp>
         <p:nvSpPr>
-          <p:cNvPr id="66" name="Shape 66"/>
+          <p:cNvPr id="65" name="Shape 65"/>
           <p:cNvSpPr/>
           <p:nvPr>
             <p:ph type="body" idx="1"/>
           </p:nvPr>
         </p:nvSpPr>
         <p:spPr>
+          <a:xfrm>
+            <a:off x="1295400" y="1930400"/>
+            <a:ext cx="7048500" cy="4876800"/>
+          </a:xfrm>
           <a:prstGeom prst="rect">
             <a:avLst/>
           </a:prstGeom>
         </p:spPr>
         <p:txBody>
-          <a:bodyPr lIns="0" tIns="0" rIns="0" bIns="0" anchor="ctr"/>
+          <a:bodyPr lIns="0" tIns="0" rIns="0" bIns="0" anchor="ctr">
+            <a:normAutofit fontScale="100000" lnSpcReduction="0"/>
+          </a:bodyPr>
           <a:lstStyle/>
-          <a:p>
-            <a:pPr lvl="0" algn="just">
-              <a:lnSpc>
-                <a:spcPct val="150000"/>
-              </a:lnSpc>
-              <a:defRPr sz="1800">
-                <a:solidFill>
-                  <a:srgbClr val="000000"/>
-                </a:solidFill>
-              </a:defRPr>
-            </a:pPr>
-            <a:r>
-              <a:rPr b="1" sz="2400">
-                <a:solidFill>
-                  <a:srgbClr val="333333"/>
-                </a:solidFill>
-              </a:rPr>
-              <a:t>Motivación:</a:t>
-            </a:r>
-            <a:r>
-              <a:rPr sz="2400">
-                <a:solidFill>
-                  <a:srgbClr val="333333"/>
-                </a:solidFill>
-              </a:rPr>
-              <a:t> estudiar diferentes técnicas de renderizado, y su rendimiento en WebGL sobre un engine desarrollado expresamente para el proyecto.</a:t>
-            </a:r>
-            <a:endParaRPr sz="2400">
-              <a:solidFill>
-                <a:srgbClr val="333333"/>
-              </a:solidFill>
-            </a:endParaRPr>
-          </a:p>
           <a:p>
             <a:pPr lvl="0" marL="0" indent="0" algn="just">
               <a:lnSpc>
                 <a:spcPct val="150000"/>
               </a:lnSpc>
-              <a:buClrTx/>
               <a:buSzTx/>
               <a:buNone/>
               <a:defRPr sz="1800">
@@ -4926,38 +5902,106 @@
                 </a:solidFill>
               </a:defRPr>
             </a:pPr>
-            <a:endParaRPr sz="2400">
-              <a:solidFill>
-                <a:srgbClr val="333333"/>
-              </a:solidFill>
-            </a:endParaRPr>
-          </a:p>
-          <a:p>
-            <a:pPr lvl="0" algn="just">
+            <a:r>
+              <a:rPr sz="2400">
+                <a:solidFill>
+                  <a:srgbClr val="333333"/>
+                </a:solidFill>
+              </a:rPr>
+              <a:t>La gran evolución de los navegadores web nos permite renderizar imágenes 2D/3D.</a:t>
+            </a:r>
+            <a:endParaRPr sz="2400"/>
+          </a:p>
+          <a:p>
+            <a:pPr lvl="0" marL="0" indent="0" algn="just">
               <a:lnSpc>
                 <a:spcPct val="150000"/>
               </a:lnSpc>
-              <a:defRPr sz="1800">
-                <a:solidFill>
-                  <a:srgbClr val="000000"/>
-                </a:solidFill>
-              </a:defRPr>
-            </a:pPr>
-            <a:r>
-              <a:rPr b="1" sz="2400">
-                <a:solidFill>
-                  <a:srgbClr val="333333"/>
-                </a:solidFill>
-              </a:rPr>
-              <a:t>Background personal:</a:t>
-            </a:r>
+              <a:buSzTx/>
+              <a:buNone/>
+              <a:defRPr sz="1800">
+                <a:solidFill>
+                  <a:srgbClr val="000000"/>
+                </a:solidFill>
+              </a:defRPr>
+            </a:pPr>
             <a:r>
               <a:rPr sz="2400">
                 <a:solidFill>
                   <a:srgbClr val="333333"/>
                 </a:solidFill>
               </a:rPr>
-              <a:t> gran interés por la Computación Gráfica y la Ingeniería de Videojuegos.</a:t>
+              <a:t>2 subcampos dentro de la generación de imágenes:</a:t>
+            </a:r>
+            <a:endParaRPr sz="2400"/>
+          </a:p>
+          <a:p>
+            <a:pPr lvl="1" marL="819150" indent="-361950" algn="just">
+              <a:lnSpc>
+                <a:spcPct val="150000"/>
+              </a:lnSpc>
+              <a:buSzPct val="150000"/>
+              <a:buChar char="•"/>
+              <a:defRPr sz="1800">
+                <a:solidFill>
+                  <a:srgbClr val="000000"/>
+                </a:solidFill>
+              </a:defRPr>
+            </a:pPr>
+            <a:r>
+              <a:rPr sz="1900">
+                <a:solidFill>
+                  <a:srgbClr val="333333"/>
+                </a:solidFill>
+                <a:latin typeface="Verdana Bold"/>
+                <a:ea typeface="Verdana Bold"/>
+                <a:cs typeface="Verdana Bold"/>
+                <a:sym typeface="Verdana Bold"/>
+              </a:rPr>
+              <a:t>Generación off-line:</a:t>
+            </a:r>
+            <a:r>
+              <a:rPr sz="1900">
+                <a:solidFill>
+                  <a:srgbClr val="333333"/>
+                </a:solidFill>
+              </a:rPr>
+              <a:t> proceso mas elaborado y detallado.</a:t>
+            </a:r>
+            <a:endParaRPr sz="1900"/>
+          </a:p>
+          <a:p>
+            <a:pPr lvl="1" marL="819150" indent="-361950" algn="just">
+              <a:lnSpc>
+                <a:spcPct val="150000"/>
+              </a:lnSpc>
+              <a:buSzPct val="150000"/>
+              <a:buChar char="•"/>
+              <a:defRPr sz="1800">
+                <a:solidFill>
+                  <a:srgbClr val="000000"/>
+                </a:solidFill>
+              </a:defRPr>
+            </a:pPr>
+            <a:r>
+              <a:rPr sz="1900">
+                <a:solidFill>
+                  <a:srgbClr val="333333"/>
+                </a:solidFill>
+                <a:latin typeface="Verdana Bold"/>
+                <a:ea typeface="Verdana Bold"/>
+                <a:cs typeface="Verdana Bold"/>
+                <a:sym typeface="Verdana Bold"/>
+              </a:rPr>
+              <a:t>Generación en tiempo real:</a:t>
+            </a:r>
+            <a:r>
+              <a:rPr sz="1900">
+                <a:solidFill>
+                  <a:srgbClr val="333333"/>
+                </a:solidFill>
+              </a:rPr>
+              <a:t> a partir de un modelo 2D o 3D, utilizando la GPU para la mayoría de los cálculos.</a:t>
             </a:r>
           </a:p>
         </p:txBody>
@@ -4990,26 +6034,138 @@
       </p:grpSpPr>
       <p:sp>
         <p:nvSpPr>
-          <p:cNvPr id="68" name="Shape 68"/>
+          <p:cNvPr id="67" name="Shape 67"/>
           <p:cNvSpPr/>
           <p:nvPr>
             <p:ph type="title"/>
           </p:nvPr>
         </p:nvSpPr>
         <p:spPr>
-          <a:xfrm>
-            <a:off x="685800" y="25400"/>
-            <a:ext cx="8458200" cy="1143000"/>
-          </a:xfrm>
           <a:prstGeom prst="rect">
             <a:avLst/>
           </a:prstGeom>
         </p:spPr>
         <p:txBody>
-          <a:bodyPr/>
+          <a:bodyPr lIns="0" tIns="0" rIns="0" bIns="0">
+            <a:normAutofit fontScale="100000" lnSpcReduction="0"/>
+          </a:bodyPr>
           <a:lstStyle/>
           <a:p>
-            <a:pPr lvl="0"/>
+            <a:pPr lvl="0">
+              <a:defRPr sz="1800">
+                <a:solidFill>
+                  <a:srgbClr val="000000"/>
+                </a:solidFill>
+              </a:defRPr>
+            </a:pPr>
+            <a:r>
+              <a:rPr sz="2800">
+                <a:solidFill>
+                  <a:srgbClr val="FFFFFF"/>
+                </a:solidFill>
+              </a:rPr>
+              <a:t>Introducción</a:t>
+            </a:r>
+          </a:p>
+        </p:txBody>
+      </p:sp>
+      <p:sp>
+        <p:nvSpPr>
+          <p:cNvPr id="68" name="Shape 68"/>
+          <p:cNvSpPr/>
+          <p:nvPr>
+            <p:ph type="body" idx="1"/>
+          </p:nvPr>
+        </p:nvSpPr>
+        <p:spPr>
+          <a:prstGeom prst="rect">
+            <a:avLst/>
+          </a:prstGeom>
+        </p:spPr>
+        <p:txBody>
+          <a:bodyPr lIns="0" tIns="0" rIns="0" bIns="0" anchor="ctr">
+            <a:normAutofit fontScale="100000" lnSpcReduction="0"/>
+          </a:bodyPr>
+          <a:lstStyle/>
+          <a:p>
+            <a:pPr lvl="0" marL="457200" indent="-457200" algn="just">
+              <a:lnSpc>
+                <a:spcPct val="150000"/>
+              </a:lnSpc>
+              <a:defRPr sz="1800">
+                <a:solidFill>
+                  <a:srgbClr val="000000"/>
+                </a:solidFill>
+              </a:defRPr>
+            </a:pPr>
+            <a:r>
+              <a:rPr sz="2400">
+                <a:solidFill>
+                  <a:srgbClr val="333333"/>
+                </a:solidFill>
+                <a:latin typeface="Verdana Bold"/>
+                <a:ea typeface="Verdana Bold"/>
+                <a:cs typeface="Verdana Bold"/>
+                <a:sym typeface="Verdana Bold"/>
+              </a:rPr>
+              <a:t>Motivación:</a:t>
+            </a:r>
+            <a:r>
+              <a:rPr sz="2400">
+                <a:solidFill>
+                  <a:srgbClr val="333333"/>
+                </a:solidFill>
+              </a:rPr>
+              <a:t> estudiar diferentes técnicas de renderizado, y su rendimiento en WebGL sobre un engine desarrollado expresamente para el proyecto.</a:t>
+            </a:r>
+            <a:endParaRPr sz="2400"/>
+          </a:p>
+          <a:p>
+            <a:pPr lvl="0" marL="0" indent="0" algn="just">
+              <a:lnSpc>
+                <a:spcPct val="150000"/>
+              </a:lnSpc>
+              <a:buSzTx/>
+              <a:buNone/>
+              <a:defRPr sz="1800">
+                <a:solidFill>
+                  <a:srgbClr val="000000"/>
+                </a:solidFill>
+              </a:defRPr>
+            </a:pPr>
+            <a:endParaRPr sz="2400"/>
+          </a:p>
+          <a:p>
+            <a:pPr lvl="0" marL="457200" indent="-457200" algn="just">
+              <a:lnSpc>
+                <a:spcPct val="150000"/>
+              </a:lnSpc>
+              <a:defRPr sz="1800">
+                <a:solidFill>
+                  <a:srgbClr val="000000"/>
+                </a:solidFill>
+              </a:defRPr>
+            </a:pPr>
+            <a:r>
+              <a:rPr sz="2400">
+                <a:solidFill>
+                  <a:srgbClr val="333333"/>
+                </a:solidFill>
+                <a:latin typeface="Verdana Bold"/>
+                <a:ea typeface="Verdana Bold"/>
+                <a:cs typeface="Verdana Bold"/>
+                <a:sym typeface="Verdana Bold"/>
+              </a:rPr>
+              <a:t>Background personal:</a:t>
+            </a:r>
+            <a:r>
+              <a:rPr sz="2400">
+                <a:solidFill>
+                  <a:srgbClr val="333333"/>
+                </a:solidFill>
+              </a:rPr>
+              <a:t> gran interés por la Computación Gráfica y la Ingeniería de Videojuegos.</a:t>
+            </a:r>
           </a:p>
         </p:txBody>
       </p:sp>
@@ -5048,13 +6204,25 @@
           </p:nvPr>
         </p:nvSpPr>
         <p:spPr>
+          <a:xfrm>
+            <a:off x="685800" y="2857500"/>
+            <a:ext cx="8458200" cy="1143000"/>
+          </a:xfrm>
           <a:prstGeom prst="rect">
             <a:avLst/>
           </a:prstGeom>
         </p:spPr>
         <p:txBody>
-          <a:bodyPr/>
-          <a:lstStyle/>
+          <a:bodyPr lIns="0" tIns="0" rIns="0" bIns="0"/>
+          <a:lstStyle>
+            <a:lvl1pPr>
+              <a:defRPr>
+                <a:solidFill>
+                  <a:srgbClr val="333333"/>
+                </a:solidFill>
+              </a:defRPr>
+            </a:lvl1pPr>
+          </a:lstStyle>
           <a:p>
             <a:pPr lvl="0">
               <a:defRPr sz="1800">
@@ -5066,163 +6234,10 @@
             <a:r>
               <a:rPr sz="2800">
                 <a:solidFill>
-                  <a:srgbClr val="FFFFFF"/>
-                </a:solidFill>
-              </a:rPr>
-              <a:t>La Web</a:t>
-            </a:r>
-          </a:p>
-        </p:txBody>
-      </p:sp>
-      <p:sp>
-        <p:nvSpPr>
-          <p:cNvPr id="71" name="Shape 71"/>
-          <p:cNvSpPr/>
-          <p:nvPr>
-            <p:ph type="body" idx="1"/>
-          </p:nvPr>
-        </p:nvSpPr>
-        <p:spPr>
-          <a:prstGeom prst="rect">
-            <a:avLst/>
-          </a:prstGeom>
-        </p:spPr>
-        <p:txBody>
-          <a:bodyPr lIns="0" tIns="0" rIns="0" bIns="0" anchor="ctr"/>
-          <a:lstStyle/>
-          <a:p>
-            <a:pPr lvl="0" marL="0" indent="0" algn="just">
-              <a:lnSpc>
-                <a:spcPct val="150000"/>
-              </a:lnSpc>
-              <a:buClrTx/>
-              <a:buSzTx/>
-              <a:buNone/>
-              <a:defRPr sz="1800">
-                <a:solidFill>
-                  <a:srgbClr val="000000"/>
-                </a:solidFill>
-              </a:defRPr>
-            </a:pPr>
-            <a:r>
-              <a:rPr b="1" sz="2400">
-                <a:solidFill>
-                  <a:srgbClr val="333333"/>
-                </a:solidFill>
-              </a:rPr>
-              <a:t>W</a:t>
-            </a:r>
-            <a:r>
-              <a:rPr sz="2400">
-                <a:solidFill>
-                  <a:srgbClr val="333333"/>
-                </a:solidFill>
-              </a:rPr>
-              <a:t>orld </a:t>
-            </a:r>
-            <a:r>
-              <a:rPr b="1" sz="2400">
-                <a:solidFill>
-                  <a:srgbClr val="333333"/>
-                </a:solidFill>
-              </a:rPr>
-              <a:t>W</a:t>
-            </a:r>
-            <a:r>
-              <a:rPr sz="2400">
-                <a:solidFill>
-                  <a:srgbClr val="333333"/>
-                </a:solidFill>
-              </a:rPr>
-              <a:t>ide </a:t>
-            </a:r>
-            <a:r>
-              <a:rPr b="1" sz="2400">
-                <a:solidFill>
-                  <a:srgbClr val="333333"/>
-                </a:solidFill>
-              </a:rPr>
-              <a:t>W</a:t>
-            </a:r>
-            <a:r>
-              <a:rPr sz="2400">
-                <a:solidFill>
-                  <a:srgbClr val="333333"/>
-                </a:solidFill>
-              </a:rPr>
-              <a:t>eb (</a:t>
-            </a:r>
-            <a:r>
-              <a:rPr b="1" sz="2400">
-                <a:solidFill>
-                  <a:srgbClr val="333333"/>
-                </a:solidFill>
-              </a:rPr>
-              <a:t>WWW</a:t>
-            </a:r>
-            <a:r>
-              <a:rPr sz="2400">
-                <a:solidFill>
-                  <a:srgbClr val="333333"/>
-                </a:solidFill>
-              </a:rPr>
-              <a:t>):   conjunto de documentos y otros recursos interconectados.</a:t>
-            </a:r>
-            <a:endParaRPr sz="2400">
-              <a:solidFill>
-                <a:srgbClr val="333333"/>
-              </a:solidFill>
-            </a:endParaRPr>
-          </a:p>
-          <a:p>
-            <a:pPr lvl="0" marL="0" indent="0" algn="just">
-              <a:lnSpc>
-                <a:spcPct val="150000"/>
-              </a:lnSpc>
-              <a:buClrTx/>
-              <a:buSzTx/>
-              <a:buNone/>
-              <a:defRPr sz="1800">
-                <a:solidFill>
-                  <a:srgbClr val="000000"/>
-                </a:solidFill>
-              </a:defRPr>
-            </a:pPr>
-            <a:r>
-              <a:rPr sz="2400">
-                <a:solidFill>
-                  <a:srgbClr val="333333"/>
-                </a:solidFill>
-              </a:rPr>
-              <a:t>Documentos web inicialmente estáticos formados por texto plano.</a:t>
-            </a:r>
-            <a:endParaRPr sz="2400">
-              <a:solidFill>
-                <a:srgbClr val="333333"/>
-              </a:solidFill>
-            </a:endParaRPr>
-          </a:p>
-          <a:p>
-            <a:pPr lvl="0" marL="0" indent="0" algn="just">
-              <a:lnSpc>
-                <a:spcPct val="150000"/>
-              </a:lnSpc>
-              <a:buClrTx/>
-              <a:buSzTx/>
-              <a:buNone/>
-              <a:defRPr sz="1800">
-                <a:solidFill>
-                  <a:srgbClr val="000000"/>
-                </a:solidFill>
-              </a:defRPr>
-            </a:pPr>
-            <a:r>
-              <a:rPr sz="2400">
-                <a:solidFill>
-                  <a:srgbClr val="333333"/>
-                </a:solidFill>
-              </a:rPr>
-              <a:t>Con los años aparecieron lenguajes de programación, librerías y elementos que mejoraron las capacidades de la web.</a:t>
+                  <a:srgbClr val="333333"/>
+                </a:solidFill>
+              </a:rPr>
+              <a:t>2. La Web</a:t>
             </a:r>
           </a:p>
         </p:txBody>
@@ -5255,7 +6270,7 @@
       </p:grpSpPr>
       <p:sp>
         <p:nvSpPr>
-          <p:cNvPr id="73" name="Shape 73"/>
+          <p:cNvPr id="72" name="Shape 72"/>
           <p:cNvSpPr/>
           <p:nvPr>
             <p:ph type="title"/>
@@ -5267,7 +6282,9 @@
           </a:prstGeom>
         </p:spPr>
         <p:txBody>
-          <a:bodyPr/>
+          <a:bodyPr lIns="0" tIns="0" rIns="0" bIns="0">
+            <a:normAutofit fontScale="100000" lnSpcReduction="0"/>
+          </a:bodyPr>
           <a:lstStyle/>
           <a:p>
             <a:pPr lvl="0">
@@ -5290,7 +6307,7 @@
       </p:sp>
       <p:sp>
         <p:nvSpPr>
-          <p:cNvPr id="74" name="Shape 74"/>
+          <p:cNvPr id="73" name="Shape 73"/>
           <p:cNvSpPr/>
           <p:nvPr>
             <p:ph type="body" idx="1"/>
@@ -5302,151 +6319,148 @@
           </a:prstGeom>
         </p:spPr>
         <p:txBody>
-          <a:bodyPr lIns="0" tIns="0" rIns="0" bIns="0" anchor="ctr"/>
+          <a:bodyPr lIns="0" tIns="0" rIns="0" bIns="0" anchor="ctr">
+            <a:normAutofit fontScale="100000" lnSpcReduction="0"/>
+          </a:bodyPr>
           <a:lstStyle/>
           <a:p>
-            <a:pPr lvl="0">
+            <a:pPr lvl="0" marL="0" indent="0" algn="just">
               <a:lnSpc>
                 <a:spcPct val="150000"/>
               </a:lnSpc>
-              <a:defRPr sz="1800">
-                <a:solidFill>
-                  <a:srgbClr val="000000"/>
-                </a:solidFill>
-              </a:defRPr>
-            </a:pPr>
-            <a:r>
-              <a:rPr b="1" sz="2600">
-                <a:solidFill>
-                  <a:srgbClr val="333333"/>
-                </a:solidFill>
-              </a:rPr>
-              <a:t>HyperText Markup Language (HTML)</a:t>
-            </a:r>
-            <a:endParaRPr b="1" sz="2600">
-              <a:solidFill>
-                <a:srgbClr val="333333"/>
-              </a:solidFill>
-            </a:endParaRPr>
-          </a:p>
-          <a:p>
-            <a:pPr lvl="0">
+              <a:buSzTx/>
+              <a:buNone/>
+              <a:defRPr sz="1800">
+                <a:solidFill>
+                  <a:srgbClr val="000000"/>
+                </a:solidFill>
+              </a:defRPr>
+            </a:pPr>
+            <a:r>
+              <a:rPr sz="2400">
+                <a:solidFill>
+                  <a:srgbClr val="333333"/>
+                </a:solidFill>
+                <a:latin typeface="Verdana Bold"/>
+                <a:ea typeface="Verdana Bold"/>
+                <a:cs typeface="Verdana Bold"/>
+                <a:sym typeface="Verdana Bold"/>
+              </a:rPr>
+              <a:t>W</a:t>
+            </a:r>
+            <a:r>
+              <a:rPr sz="2400">
+                <a:solidFill>
+                  <a:srgbClr val="333333"/>
+                </a:solidFill>
+              </a:rPr>
+              <a:t>orld </a:t>
+            </a:r>
+            <a:r>
+              <a:rPr sz="2400">
+                <a:solidFill>
+                  <a:srgbClr val="333333"/>
+                </a:solidFill>
+                <a:latin typeface="Verdana Bold"/>
+                <a:ea typeface="Verdana Bold"/>
+                <a:cs typeface="Verdana Bold"/>
+                <a:sym typeface="Verdana Bold"/>
+              </a:rPr>
+              <a:t>W</a:t>
+            </a:r>
+            <a:r>
+              <a:rPr sz="2400">
+                <a:solidFill>
+                  <a:srgbClr val="333333"/>
+                </a:solidFill>
+              </a:rPr>
+              <a:t>ide </a:t>
+            </a:r>
+            <a:r>
+              <a:rPr sz="2400">
+                <a:solidFill>
+                  <a:srgbClr val="333333"/>
+                </a:solidFill>
+                <a:latin typeface="Verdana Bold"/>
+                <a:ea typeface="Verdana Bold"/>
+                <a:cs typeface="Verdana Bold"/>
+                <a:sym typeface="Verdana Bold"/>
+              </a:rPr>
+              <a:t>W</a:t>
+            </a:r>
+            <a:r>
+              <a:rPr sz="2400">
+                <a:solidFill>
+                  <a:srgbClr val="333333"/>
+                </a:solidFill>
+              </a:rPr>
+              <a:t>eb (</a:t>
+            </a:r>
+            <a:r>
+              <a:rPr sz="2400">
+                <a:solidFill>
+                  <a:srgbClr val="333333"/>
+                </a:solidFill>
+                <a:latin typeface="Verdana Bold"/>
+                <a:ea typeface="Verdana Bold"/>
+                <a:cs typeface="Verdana Bold"/>
+                <a:sym typeface="Verdana Bold"/>
+              </a:rPr>
+              <a:t>WWW</a:t>
+            </a:r>
+            <a:r>
+              <a:rPr sz="2400">
+                <a:solidFill>
+                  <a:srgbClr val="333333"/>
+                </a:solidFill>
+              </a:rPr>
+              <a:t>):   conjunto de documentos y otros recursos interconectados.</a:t>
+            </a:r>
+            <a:endParaRPr sz="2400"/>
+          </a:p>
+          <a:p>
+            <a:pPr lvl="0" marL="0" indent="0" algn="just">
               <a:lnSpc>
                 <a:spcPct val="150000"/>
               </a:lnSpc>
-              <a:defRPr sz="1800">
-                <a:solidFill>
-                  <a:srgbClr val="000000"/>
-                </a:solidFill>
-              </a:defRPr>
-            </a:pPr>
-            <a:r>
-              <a:rPr b="1" sz="2600">
-                <a:solidFill>
-                  <a:srgbClr val="333333"/>
-                </a:solidFill>
-              </a:rPr>
-              <a:t>Cascading Style Sheets (CSS)</a:t>
-            </a:r>
-            <a:endParaRPr b="1" sz="2600">
-              <a:solidFill>
-                <a:srgbClr val="333333"/>
-              </a:solidFill>
-            </a:endParaRPr>
-          </a:p>
-          <a:p>
-            <a:pPr lvl="0">
+              <a:buSzTx/>
+              <a:buNone/>
+              <a:defRPr sz="1800">
+                <a:solidFill>
+                  <a:srgbClr val="000000"/>
+                </a:solidFill>
+              </a:defRPr>
+            </a:pPr>
+            <a:r>
+              <a:rPr sz="2400">
+                <a:solidFill>
+                  <a:srgbClr val="333333"/>
+                </a:solidFill>
+              </a:rPr>
+              <a:t>Documentos web inicialmente estáticos formados por texto plano.</a:t>
+            </a:r>
+            <a:endParaRPr sz="2400"/>
+          </a:p>
+          <a:p>
+            <a:pPr lvl="0" marL="0" indent="0" algn="just">
               <a:lnSpc>
                 <a:spcPct val="150000"/>
               </a:lnSpc>
-              <a:defRPr sz="1800">
-                <a:solidFill>
-                  <a:srgbClr val="000000"/>
-                </a:solidFill>
-              </a:defRPr>
-            </a:pPr>
-            <a:r>
-              <a:rPr b="1" sz="2600">
-                <a:solidFill>
-                  <a:srgbClr val="333333"/>
-                </a:solidFill>
-              </a:rPr>
-              <a:t>JavaScript</a:t>
-            </a:r>
-            <a:endParaRPr b="1" sz="2600">
-              <a:solidFill>
-                <a:srgbClr val="333333"/>
-              </a:solidFill>
-            </a:endParaRPr>
-          </a:p>
-          <a:p>
-            <a:pPr lvl="0">
-              <a:lnSpc>
-                <a:spcPct val="150000"/>
-              </a:lnSpc>
-              <a:defRPr sz="1800">
-                <a:solidFill>
-                  <a:srgbClr val="000000"/>
-                </a:solidFill>
-              </a:defRPr>
-            </a:pPr>
-            <a:r>
-              <a:rPr b="1" sz="2600">
-                <a:solidFill>
-                  <a:srgbClr val="333333"/>
-                </a:solidFill>
-              </a:rPr>
-              <a:t>&lt;canvas&gt;</a:t>
-            </a:r>
-            <a:endParaRPr b="1" sz="2600">
-              <a:solidFill>
-                <a:srgbClr val="333333"/>
-              </a:solidFill>
-            </a:endParaRPr>
-          </a:p>
-          <a:p>
-            <a:pPr lvl="0">
-              <a:lnSpc>
-                <a:spcPct val="150000"/>
-              </a:lnSpc>
-              <a:defRPr sz="1800">
-                <a:solidFill>
-                  <a:srgbClr val="000000"/>
-                </a:solidFill>
-              </a:defRPr>
-            </a:pPr>
-            <a:r>
-              <a:rPr b="1" sz="2600">
-                <a:solidFill>
-                  <a:srgbClr val="333333"/>
-                </a:solidFill>
-              </a:rPr>
-              <a:t>CSS3</a:t>
-            </a:r>
-            <a:endParaRPr b="1" sz="2600">
-              <a:solidFill>
-                <a:srgbClr val="333333"/>
-              </a:solidFill>
-            </a:endParaRPr>
-          </a:p>
-          <a:p>
-            <a:pPr lvl="0">
-              <a:lnSpc>
-                <a:spcPct val="150000"/>
-              </a:lnSpc>
-              <a:defRPr sz="1800">
-                <a:solidFill>
-                  <a:srgbClr val="000000"/>
-                </a:solidFill>
-              </a:defRPr>
-            </a:pPr>
-            <a:r>
-              <a:rPr b="1" sz="2600">
-                <a:solidFill>
-                  <a:srgbClr val="333333"/>
-                </a:solidFill>
-              </a:rPr>
-              <a:t>WebGL</a:t>
+              <a:buSzTx/>
+              <a:buNone/>
+              <a:defRPr sz="1800">
+                <a:solidFill>
+                  <a:srgbClr val="000000"/>
+                </a:solidFill>
+              </a:defRPr>
+            </a:pPr>
+            <a:r>
+              <a:rPr sz="2400">
+                <a:solidFill>
+                  <a:srgbClr val="333333"/>
+                </a:solidFill>
+              </a:rPr>
+              <a:t>Con los años aparecieron lenguajes de programación, librerías y elementos que mejoraron las capacidades de la web.</a:t>
             </a:r>
           </a:p>
         </p:txBody>
@@ -5479,7 +6493,7 @@
       </p:grpSpPr>
       <p:sp>
         <p:nvSpPr>
-          <p:cNvPr id="76" name="Shape 76"/>
+          <p:cNvPr id="75" name="Shape 75"/>
           <p:cNvSpPr/>
           <p:nvPr>
             <p:ph type="title"/>
@@ -5491,7 +6505,9 @@
           </a:prstGeom>
         </p:spPr>
         <p:txBody>
-          <a:bodyPr/>
+          <a:bodyPr lIns="0" tIns="0" rIns="0" bIns="0">
+            <a:normAutofit fontScale="100000" lnSpcReduction="0"/>
+          </a:bodyPr>
           <a:lstStyle/>
           <a:p>
             <a:pPr lvl="0">
@@ -5507,14 +6523,14 @@
                   <a:srgbClr val="FFFFFF"/>
                 </a:solidFill>
               </a:rPr>
-              <a:t>Graphics Pipeline</a:t>
+              <a:t>La Web</a:t>
             </a:r>
           </a:p>
         </p:txBody>
       </p:sp>
       <p:sp>
         <p:nvSpPr>
-          <p:cNvPr id="77" name="Shape 77"/>
+          <p:cNvPr id="76" name="Shape 76"/>
           <p:cNvSpPr/>
           <p:nvPr>
             <p:ph type="body" idx="1"/>
@@ -5526,10 +6542,183 @@
           </a:prstGeom>
         </p:spPr>
         <p:txBody>
-          <a:bodyPr/>
+          <a:bodyPr lIns="0" tIns="0" rIns="0" bIns="0" anchor="ctr">
+            <a:normAutofit fontScale="100000" lnSpcReduction="0"/>
+          </a:bodyPr>
           <a:lstStyle/>
           <a:p>
-            <a:pPr lvl="0"/>
+            <a:pPr lvl="0" marL="495300" indent="-495300">
+              <a:lnSpc>
+                <a:spcPct val="150000"/>
+              </a:lnSpc>
+              <a:defRPr sz="1800">
+                <a:solidFill>
+                  <a:srgbClr val="000000"/>
+                </a:solidFill>
+              </a:defRPr>
+            </a:pPr>
+            <a:r>
+              <a:rPr sz="2600">
+                <a:solidFill>
+                  <a:srgbClr val="333333"/>
+                </a:solidFill>
+                <a:latin typeface="Verdana Bold"/>
+                <a:ea typeface="Verdana Bold"/>
+                <a:cs typeface="Verdana Bold"/>
+                <a:sym typeface="Verdana Bold"/>
+              </a:rPr>
+              <a:t>HyperText Markup Language (HTML)</a:t>
+            </a:r>
+            <a:endParaRPr>
+              <a:latin typeface="Verdana Bold"/>
+              <a:ea typeface="Verdana Bold"/>
+              <a:cs typeface="Verdana Bold"/>
+              <a:sym typeface="Verdana Bold"/>
+            </a:endParaRPr>
+          </a:p>
+          <a:p>
+            <a:pPr lvl="0" marL="495300" indent="-495300">
+              <a:lnSpc>
+                <a:spcPct val="150000"/>
+              </a:lnSpc>
+              <a:defRPr sz="1800">
+                <a:solidFill>
+                  <a:srgbClr val="000000"/>
+                </a:solidFill>
+              </a:defRPr>
+            </a:pPr>
+            <a:r>
+              <a:rPr sz="2600">
+                <a:solidFill>
+                  <a:srgbClr val="333333"/>
+                </a:solidFill>
+                <a:latin typeface="Verdana Bold"/>
+                <a:ea typeface="Verdana Bold"/>
+                <a:cs typeface="Verdana Bold"/>
+                <a:sym typeface="Verdana Bold"/>
+              </a:rPr>
+              <a:t>Cascading Style Sheets (CSS)</a:t>
+            </a:r>
+            <a:endParaRPr>
+              <a:latin typeface="Verdana Bold"/>
+              <a:ea typeface="Verdana Bold"/>
+              <a:cs typeface="Verdana Bold"/>
+              <a:sym typeface="Verdana Bold"/>
+            </a:endParaRPr>
+          </a:p>
+          <a:p>
+            <a:pPr lvl="0" marL="495300" indent="-495300">
+              <a:lnSpc>
+                <a:spcPct val="150000"/>
+              </a:lnSpc>
+              <a:defRPr sz="1800">
+                <a:solidFill>
+                  <a:srgbClr val="000000"/>
+                </a:solidFill>
+              </a:defRPr>
+            </a:pPr>
+            <a:r>
+              <a:rPr sz="2600">
+                <a:solidFill>
+                  <a:srgbClr val="333333"/>
+                </a:solidFill>
+                <a:latin typeface="Verdana Bold"/>
+                <a:ea typeface="Verdana Bold"/>
+                <a:cs typeface="Verdana Bold"/>
+                <a:sym typeface="Verdana Bold"/>
+              </a:rPr>
+              <a:t>JavaScript</a:t>
+            </a:r>
+            <a:endParaRPr>
+              <a:latin typeface="Verdana Bold"/>
+              <a:ea typeface="Verdana Bold"/>
+              <a:cs typeface="Verdana Bold"/>
+              <a:sym typeface="Verdana Bold"/>
+            </a:endParaRPr>
+          </a:p>
+          <a:p>
+            <a:pPr lvl="0" marL="495300" indent="-495300">
+              <a:lnSpc>
+                <a:spcPct val="150000"/>
+              </a:lnSpc>
+              <a:defRPr sz="1800">
+                <a:solidFill>
+                  <a:srgbClr val="000000"/>
+                </a:solidFill>
+              </a:defRPr>
+            </a:pPr>
+            <a:r>
+              <a:rPr sz="2600">
+                <a:solidFill>
+                  <a:srgbClr val="333333"/>
+                </a:solidFill>
+                <a:latin typeface="Verdana Bold"/>
+                <a:ea typeface="Verdana Bold"/>
+                <a:cs typeface="Verdana Bold"/>
+                <a:sym typeface="Verdana Bold"/>
+              </a:rPr>
+              <a:t>&lt;canvas&gt;</a:t>
+            </a:r>
+            <a:endParaRPr>
+              <a:latin typeface="Verdana Bold"/>
+              <a:ea typeface="Verdana Bold"/>
+              <a:cs typeface="Verdana Bold"/>
+              <a:sym typeface="Verdana Bold"/>
+            </a:endParaRPr>
+          </a:p>
+          <a:p>
+            <a:pPr lvl="0" marL="495300" indent="-495300">
+              <a:lnSpc>
+                <a:spcPct val="150000"/>
+              </a:lnSpc>
+              <a:defRPr sz="1800">
+                <a:solidFill>
+                  <a:srgbClr val="000000"/>
+                </a:solidFill>
+              </a:defRPr>
+            </a:pPr>
+            <a:r>
+              <a:rPr sz="2600">
+                <a:solidFill>
+                  <a:srgbClr val="333333"/>
+                </a:solidFill>
+                <a:latin typeface="Verdana Bold"/>
+                <a:ea typeface="Verdana Bold"/>
+                <a:cs typeface="Verdana Bold"/>
+                <a:sym typeface="Verdana Bold"/>
+              </a:rPr>
+              <a:t>CSS3</a:t>
+            </a:r>
+            <a:endParaRPr>
+              <a:latin typeface="Verdana Bold"/>
+              <a:ea typeface="Verdana Bold"/>
+              <a:cs typeface="Verdana Bold"/>
+              <a:sym typeface="Verdana Bold"/>
+            </a:endParaRPr>
+          </a:p>
+          <a:p>
+            <a:pPr lvl="0" marL="495300" indent="-495300">
+              <a:lnSpc>
+                <a:spcPct val="150000"/>
+              </a:lnSpc>
+              <a:defRPr sz="1800">
+                <a:solidFill>
+                  <a:srgbClr val="000000"/>
+                </a:solidFill>
+              </a:defRPr>
+            </a:pPr>
+            <a:r>
+              <a:rPr sz="2600">
+                <a:solidFill>
+                  <a:srgbClr val="333333"/>
+                </a:solidFill>
+                <a:latin typeface="Verdana Bold"/>
+                <a:ea typeface="Verdana Bold"/>
+                <a:cs typeface="Verdana Bold"/>
+                <a:sym typeface="Verdana Bold"/>
+              </a:rPr>
+              <a:t>WebGL</a:t>
+            </a:r>
           </a:p>
         </p:txBody>
       </p:sp>
@@ -5585,14 +6774,14 @@
     </a:clrScheme>
     <a:fontScheme name="Default">
       <a:majorFont>
+        <a:latin typeface="Helvetica"/>
+        <a:ea typeface="Helvetica"/>
+        <a:cs typeface="Helvetica"/>
+      </a:majorFont>
+      <a:minorFont>
         <a:latin typeface="Avenir Roman"/>
         <a:ea typeface="Avenir Roman"/>
         <a:cs typeface="Avenir Roman"/>
-      </a:majorFont>
-      <a:minorFont>
-        <a:latin typeface="Helvetica"/>
-        <a:ea typeface="Helvetica"/>
-        <a:cs typeface="Helvetica"/>
       </a:minorFont>
     </a:fontScheme>
     <a:fmtScheme name="Default">
@@ -5775,7 +6964,7 @@
             <a:latin typeface="+mj-lt"/>
             <a:ea typeface="+mj-ea"/>
             <a:cs typeface="+mj-cs"/>
-            <a:sym typeface="Avenir Roman"/>
+            <a:sym typeface="Helvetica"/>
           </a:defRPr>
         </a:defPPr>
         <a:lvl1pPr marL="0" marR="0" indent="0" algn="l" defTabSz="914400" rtl="0" fontAlgn="auto" latinLnBrk="1" hangingPunct="0">
@@ -6344,7 +7533,7 @@
             <a:latin typeface="+mj-lt"/>
             <a:ea typeface="+mj-ea"/>
             <a:cs typeface="+mj-cs"/>
-            <a:sym typeface="Avenir Roman"/>
+            <a:sym typeface="Helvetica"/>
           </a:defRPr>
         </a:defPPr>
         <a:lvl1pPr marL="0" marR="0" indent="0" algn="l" defTabSz="914400" rtl="0" fontAlgn="auto" latinLnBrk="1" hangingPunct="0">
@@ -6636,14 +7825,14 @@
     </a:clrScheme>
     <a:fontScheme name="Default">
       <a:majorFont>
+        <a:latin typeface="Helvetica"/>
+        <a:ea typeface="Helvetica"/>
+        <a:cs typeface="Helvetica"/>
+      </a:majorFont>
+      <a:minorFont>
         <a:latin typeface="Avenir Roman"/>
         <a:ea typeface="Avenir Roman"/>
         <a:cs typeface="Avenir Roman"/>
-      </a:majorFont>
-      <a:minorFont>
-        <a:latin typeface="Helvetica"/>
-        <a:ea typeface="Helvetica"/>
-        <a:cs typeface="Helvetica"/>
       </a:minorFont>
     </a:fontScheme>
     <a:fmtScheme name="Default">
@@ -6826,7 +8015,7 @@
             <a:latin typeface="+mj-lt"/>
             <a:ea typeface="+mj-ea"/>
             <a:cs typeface="+mj-cs"/>
-            <a:sym typeface="Avenir Roman"/>
+            <a:sym typeface="Helvetica"/>
           </a:defRPr>
         </a:defPPr>
         <a:lvl1pPr marL="0" marR="0" indent="0" algn="l" defTabSz="914400" rtl="0" fontAlgn="auto" latinLnBrk="1" hangingPunct="0">
@@ -7395,7 +8584,7 @@
             <a:latin typeface="+mj-lt"/>
             <a:ea typeface="+mj-ea"/>
             <a:cs typeface="+mj-cs"/>
-            <a:sym typeface="Avenir Roman"/>
+            <a:sym typeface="Helvetica"/>
           </a:defRPr>
         </a:defPPr>
         <a:lvl1pPr marL="0" marR="0" indent="0" algn="l" defTabSz="914400" rtl="0" fontAlgn="auto" latinLnBrk="1" hangingPunct="0">

</xml_diff>